<commit_message>
updated what is iter8
</commit_message>
<xml_diff>
--- a/mkdocs/src/assets/images/iter8++images.pptx
+++ b/mkdocs/src/assets/images/iter8++images.pptx
@@ -218,7 +218,7 @@
           <a:p>
             <a:fld id="{38B78CBE-37FA-D241-BB4C-CAC5D3B25F49}" type="datetimeFigureOut">
               <a:rPr lang="en-US" smtClean="0"/>
-              <a:t>3/3/21</a:t>
+              <a:t>3/5/21</a:t>
             </a:fld>
             <a:endParaRPr lang="en-US"/>
           </a:p>
@@ -800,7 +800,7 @@
           <a:p>
             <a:fld id="{79212C04-F6AE-AE48-B29D-E5DED656B647}" type="datetimeFigureOut">
               <a:rPr lang="en-US" smtClean="0"/>
-              <a:t>3/3/21</a:t>
+              <a:t>3/5/21</a:t>
             </a:fld>
             <a:endParaRPr lang="en-US"/>
           </a:p>
@@ -998,7 +998,7 @@
           <a:p>
             <a:fld id="{79212C04-F6AE-AE48-B29D-E5DED656B647}" type="datetimeFigureOut">
               <a:rPr lang="en-US" smtClean="0"/>
-              <a:t>3/3/21</a:t>
+              <a:t>3/5/21</a:t>
             </a:fld>
             <a:endParaRPr lang="en-US"/>
           </a:p>
@@ -1206,7 +1206,7 @@
           <a:p>
             <a:fld id="{79212C04-F6AE-AE48-B29D-E5DED656B647}" type="datetimeFigureOut">
               <a:rPr lang="en-US" smtClean="0"/>
-              <a:t>3/3/21</a:t>
+              <a:t>3/5/21</a:t>
             </a:fld>
             <a:endParaRPr lang="en-US"/>
           </a:p>
@@ -1404,7 +1404,7 @@
           <a:p>
             <a:fld id="{79212C04-F6AE-AE48-B29D-E5DED656B647}" type="datetimeFigureOut">
               <a:rPr lang="en-US" smtClean="0"/>
-              <a:t>3/3/21</a:t>
+              <a:t>3/5/21</a:t>
             </a:fld>
             <a:endParaRPr lang="en-US"/>
           </a:p>
@@ -1679,7 +1679,7 @@
           <a:p>
             <a:fld id="{79212C04-F6AE-AE48-B29D-E5DED656B647}" type="datetimeFigureOut">
               <a:rPr lang="en-US" smtClean="0"/>
-              <a:t>3/3/21</a:t>
+              <a:t>3/5/21</a:t>
             </a:fld>
             <a:endParaRPr lang="en-US"/>
           </a:p>
@@ -1944,7 +1944,7 @@
           <a:p>
             <a:fld id="{79212C04-F6AE-AE48-B29D-E5DED656B647}" type="datetimeFigureOut">
               <a:rPr lang="en-US" smtClean="0"/>
-              <a:t>3/3/21</a:t>
+              <a:t>3/5/21</a:t>
             </a:fld>
             <a:endParaRPr lang="en-US"/>
           </a:p>
@@ -2356,7 +2356,7 @@
           <a:p>
             <a:fld id="{79212C04-F6AE-AE48-B29D-E5DED656B647}" type="datetimeFigureOut">
               <a:rPr lang="en-US" smtClean="0"/>
-              <a:t>3/3/21</a:t>
+              <a:t>3/5/21</a:t>
             </a:fld>
             <a:endParaRPr lang="en-US"/>
           </a:p>
@@ -2497,7 +2497,7 @@
           <a:p>
             <a:fld id="{79212C04-F6AE-AE48-B29D-E5DED656B647}" type="datetimeFigureOut">
               <a:rPr lang="en-US" smtClean="0"/>
-              <a:t>3/3/21</a:t>
+              <a:t>3/5/21</a:t>
             </a:fld>
             <a:endParaRPr lang="en-US"/>
           </a:p>
@@ -2610,7 +2610,7 @@
           <a:p>
             <a:fld id="{79212C04-F6AE-AE48-B29D-E5DED656B647}" type="datetimeFigureOut">
               <a:rPr lang="en-US" smtClean="0"/>
-              <a:t>3/3/21</a:t>
+              <a:t>3/5/21</a:t>
             </a:fld>
             <a:endParaRPr lang="en-US"/>
           </a:p>
@@ -2921,7 +2921,7 @@
           <a:p>
             <a:fld id="{79212C04-F6AE-AE48-B29D-E5DED656B647}" type="datetimeFigureOut">
               <a:rPr lang="en-US" smtClean="0"/>
-              <a:t>3/3/21</a:t>
+              <a:t>3/5/21</a:t>
             </a:fld>
             <a:endParaRPr lang="en-US"/>
           </a:p>
@@ -3209,7 +3209,7 @@
           <a:p>
             <a:fld id="{79212C04-F6AE-AE48-B29D-E5DED656B647}" type="datetimeFigureOut">
               <a:rPr lang="en-US" smtClean="0"/>
-              <a:t>3/3/21</a:t>
+              <a:t>3/5/21</a:t>
             </a:fld>
             <a:endParaRPr lang="en-US"/>
           </a:p>
@@ -3450,7 +3450,7 @@
           <a:p>
             <a:fld id="{79212C04-F6AE-AE48-B29D-E5DED656B647}" type="datetimeFigureOut">
               <a:rPr lang="en-US" smtClean="0"/>
-              <a:t>3/3/21</a:t>
+              <a:t>3/5/21</a:t>
             </a:fld>
             <a:endParaRPr lang="en-US"/>
           </a:p>
@@ -20624,15 +20624,153 @@
             <a:off x="333494" y="1764256"/>
             <a:ext cx="730906" cy="338554"/>
           </a:xfrm>
-          <a:prstGeom prst="rect">
-            <a:avLst/>
-          </a:prstGeom>
-          <a:solidFill>
-            <a:schemeClr val="accent3">
-              <a:lumMod val="20000"/>
-              <a:lumOff val="80000"/>
-            </a:schemeClr>
-          </a:solidFill>
+          <a:custGeom>
+            <a:avLst/>
+            <a:gdLst>
+              <a:gd name="connsiteX0" fmla="*/ 0 w 730906"/>
+              <a:gd name="connsiteY0" fmla="*/ 0 h 338554"/>
+              <a:gd name="connsiteX1" fmla="*/ 350835 w 730906"/>
+              <a:gd name="connsiteY1" fmla="*/ 0 h 338554"/>
+              <a:gd name="connsiteX2" fmla="*/ 730906 w 730906"/>
+              <a:gd name="connsiteY2" fmla="*/ 0 h 338554"/>
+              <a:gd name="connsiteX3" fmla="*/ 730906 w 730906"/>
+              <a:gd name="connsiteY3" fmla="*/ 338554 h 338554"/>
+              <a:gd name="connsiteX4" fmla="*/ 365453 w 730906"/>
+              <a:gd name="connsiteY4" fmla="*/ 338554 h 338554"/>
+              <a:gd name="connsiteX5" fmla="*/ 0 w 730906"/>
+              <a:gd name="connsiteY5" fmla="*/ 338554 h 338554"/>
+              <a:gd name="connsiteX6" fmla="*/ 0 w 730906"/>
+              <a:gd name="connsiteY6" fmla="*/ 0 h 338554"/>
+            </a:gdLst>
+            <a:ahLst/>
+            <a:cxnLst>
+              <a:cxn ang="0">
+                <a:pos x="connsiteX0" y="connsiteY0"/>
+              </a:cxn>
+              <a:cxn ang="0">
+                <a:pos x="connsiteX1" y="connsiteY1"/>
+              </a:cxn>
+              <a:cxn ang="0">
+                <a:pos x="connsiteX2" y="connsiteY2"/>
+              </a:cxn>
+              <a:cxn ang="0">
+                <a:pos x="connsiteX3" y="connsiteY3"/>
+              </a:cxn>
+              <a:cxn ang="0">
+                <a:pos x="connsiteX4" y="connsiteY4"/>
+              </a:cxn>
+              <a:cxn ang="0">
+                <a:pos x="connsiteX5" y="connsiteY5"/>
+              </a:cxn>
+              <a:cxn ang="0">
+                <a:pos x="connsiteX6" y="connsiteY6"/>
+              </a:cxn>
+            </a:cxnLst>
+            <a:rect l="l" t="t" r="r" b="b"/>
+            <a:pathLst>
+              <a:path w="730906" h="338554" fill="none" extrusionOk="0">
+                <a:moveTo>
+                  <a:pt x="0" y="0"/>
+                </a:moveTo>
+                <a:cubicBezTo>
+                  <a:pt x="153533" y="6617"/>
+                  <a:pt x="227415" y="9615"/>
+                  <a:pt x="350835" y="0"/>
+                </a:cubicBezTo>
+                <a:cubicBezTo>
+                  <a:pt x="474255" y="-9615"/>
+                  <a:pt x="654286" y="17157"/>
+                  <a:pt x="730906" y="0"/>
+                </a:cubicBezTo>
+                <a:cubicBezTo>
+                  <a:pt x="719405" y="158334"/>
+                  <a:pt x="730581" y="187065"/>
+                  <a:pt x="730906" y="338554"/>
+                </a:cubicBezTo>
+                <a:cubicBezTo>
+                  <a:pt x="589404" y="346546"/>
+                  <a:pt x="496737" y="322336"/>
+                  <a:pt x="365453" y="338554"/>
+                </a:cubicBezTo>
+                <a:cubicBezTo>
+                  <a:pt x="234169" y="354772"/>
+                  <a:pt x="108419" y="339219"/>
+                  <a:pt x="0" y="338554"/>
+                </a:cubicBezTo>
+                <a:cubicBezTo>
+                  <a:pt x="-9337" y="207396"/>
+                  <a:pt x="988" y="140872"/>
+                  <a:pt x="0" y="0"/>
+                </a:cubicBezTo>
+                <a:close/>
+              </a:path>
+              <a:path w="730906" h="338554" stroke="0" extrusionOk="0">
+                <a:moveTo>
+                  <a:pt x="0" y="0"/>
+                </a:moveTo>
+                <a:cubicBezTo>
+                  <a:pt x="119442" y="7756"/>
+                  <a:pt x="244994" y="8954"/>
+                  <a:pt x="343526" y="0"/>
+                </a:cubicBezTo>
+                <a:cubicBezTo>
+                  <a:pt x="442058" y="-8954"/>
+                  <a:pt x="607651" y="-3184"/>
+                  <a:pt x="730906" y="0"/>
+                </a:cubicBezTo>
+                <a:cubicBezTo>
+                  <a:pt x="740189" y="113049"/>
+                  <a:pt x="718167" y="186784"/>
+                  <a:pt x="730906" y="338554"/>
+                </a:cubicBezTo>
+                <a:cubicBezTo>
+                  <a:pt x="592808" y="344452"/>
+                  <a:pt x="523783" y="346715"/>
+                  <a:pt x="380071" y="338554"/>
+                </a:cubicBezTo>
+                <a:cubicBezTo>
+                  <a:pt x="236360" y="330393"/>
+                  <a:pt x="106907" y="329989"/>
+                  <a:pt x="0" y="338554"/>
+                </a:cubicBezTo>
+                <a:cubicBezTo>
+                  <a:pt x="15614" y="189241"/>
+                  <a:pt x="16539" y="131487"/>
+                  <a:pt x="0" y="0"/>
+                </a:cubicBezTo>
+                <a:close/>
+              </a:path>
+            </a:pathLst>
+          </a:custGeom>
+          <a:pattFill prst="pct5">
+            <a:fgClr>
+              <a:schemeClr val="accent3">
+                <a:lumMod val="20000"/>
+                <a:lumOff val="80000"/>
+              </a:schemeClr>
+            </a:fgClr>
+            <a:bgClr>
+              <a:schemeClr val="bg1"/>
+            </a:bgClr>
+          </a:pattFill>
+          <a:ln>
+            <a:solidFill>
+              <a:schemeClr val="accent1"/>
+            </a:solidFill>
+            <a:prstDash val="dash"/>
+            <a:extLst>
+              <a:ext uri="{C807C97D-BFC1-408E-A445-0C87EB9F89A2}">
+                <ask:lineSketchStyleProps xmlns:ask="http://schemas.microsoft.com/office/drawing/2018/sketchyshapes" sd="1048302887">
+                  <a:prstGeom prst="rect">
+                    <a:avLst/>
+                  </a:prstGeom>
+                  <ask:type>
+                    <ask:lineSketchFreehand/>
+                  </ask:type>
+                </ask:lineSketchStyleProps>
+              </a:ext>
+            </a:extLst>
+          </a:ln>
         </p:spPr>
         <p:txBody>
           <a:bodyPr wrap="none" rtlCol="0">
@@ -20705,15 +20843,153 @@
             <a:off x="2264647" y="1882406"/>
             <a:ext cx="730906" cy="338554"/>
           </a:xfrm>
-          <a:prstGeom prst="rect">
-            <a:avLst/>
-          </a:prstGeom>
-          <a:solidFill>
-            <a:schemeClr val="accent3">
-              <a:lumMod val="20000"/>
-              <a:lumOff val="80000"/>
-            </a:schemeClr>
-          </a:solidFill>
+          <a:custGeom>
+            <a:avLst/>
+            <a:gdLst>
+              <a:gd name="connsiteX0" fmla="*/ 0 w 730906"/>
+              <a:gd name="connsiteY0" fmla="*/ 0 h 338554"/>
+              <a:gd name="connsiteX1" fmla="*/ 380071 w 730906"/>
+              <a:gd name="connsiteY1" fmla="*/ 0 h 338554"/>
+              <a:gd name="connsiteX2" fmla="*/ 730906 w 730906"/>
+              <a:gd name="connsiteY2" fmla="*/ 0 h 338554"/>
+              <a:gd name="connsiteX3" fmla="*/ 730906 w 730906"/>
+              <a:gd name="connsiteY3" fmla="*/ 338554 h 338554"/>
+              <a:gd name="connsiteX4" fmla="*/ 350835 w 730906"/>
+              <a:gd name="connsiteY4" fmla="*/ 338554 h 338554"/>
+              <a:gd name="connsiteX5" fmla="*/ 0 w 730906"/>
+              <a:gd name="connsiteY5" fmla="*/ 338554 h 338554"/>
+              <a:gd name="connsiteX6" fmla="*/ 0 w 730906"/>
+              <a:gd name="connsiteY6" fmla="*/ 0 h 338554"/>
+            </a:gdLst>
+            <a:ahLst/>
+            <a:cxnLst>
+              <a:cxn ang="0">
+                <a:pos x="connsiteX0" y="connsiteY0"/>
+              </a:cxn>
+              <a:cxn ang="0">
+                <a:pos x="connsiteX1" y="connsiteY1"/>
+              </a:cxn>
+              <a:cxn ang="0">
+                <a:pos x="connsiteX2" y="connsiteY2"/>
+              </a:cxn>
+              <a:cxn ang="0">
+                <a:pos x="connsiteX3" y="connsiteY3"/>
+              </a:cxn>
+              <a:cxn ang="0">
+                <a:pos x="connsiteX4" y="connsiteY4"/>
+              </a:cxn>
+              <a:cxn ang="0">
+                <a:pos x="connsiteX5" y="connsiteY5"/>
+              </a:cxn>
+              <a:cxn ang="0">
+                <a:pos x="connsiteX6" y="connsiteY6"/>
+              </a:cxn>
+            </a:cxnLst>
+            <a:rect l="l" t="t" r="r" b="b"/>
+            <a:pathLst>
+              <a:path w="730906" h="338554" fill="none" extrusionOk="0">
+                <a:moveTo>
+                  <a:pt x="0" y="0"/>
+                </a:moveTo>
+                <a:cubicBezTo>
+                  <a:pt x="117543" y="-11106"/>
+                  <a:pt x="227059" y="-7456"/>
+                  <a:pt x="380071" y="0"/>
+                </a:cubicBezTo>
+                <a:cubicBezTo>
+                  <a:pt x="533083" y="7456"/>
+                  <a:pt x="575590" y="17502"/>
+                  <a:pt x="730906" y="0"/>
+                </a:cubicBezTo>
+                <a:cubicBezTo>
+                  <a:pt x="721310" y="141203"/>
+                  <a:pt x="737415" y="195965"/>
+                  <a:pt x="730906" y="338554"/>
+                </a:cubicBezTo>
+                <a:cubicBezTo>
+                  <a:pt x="553191" y="354256"/>
+                  <a:pt x="473889" y="329505"/>
+                  <a:pt x="350835" y="338554"/>
+                </a:cubicBezTo>
+                <a:cubicBezTo>
+                  <a:pt x="227781" y="347603"/>
+                  <a:pt x="106478" y="322514"/>
+                  <a:pt x="0" y="338554"/>
+                </a:cubicBezTo>
+                <a:cubicBezTo>
+                  <a:pt x="-5596" y="177985"/>
+                  <a:pt x="5054" y="106581"/>
+                  <a:pt x="0" y="0"/>
+                </a:cubicBezTo>
+                <a:close/>
+              </a:path>
+              <a:path w="730906" h="338554" stroke="0" extrusionOk="0">
+                <a:moveTo>
+                  <a:pt x="0" y="0"/>
+                </a:moveTo>
+                <a:cubicBezTo>
+                  <a:pt x="107593" y="3263"/>
+                  <a:pt x="206979" y="-7732"/>
+                  <a:pt x="380071" y="0"/>
+                </a:cubicBezTo>
+                <a:cubicBezTo>
+                  <a:pt x="553163" y="7732"/>
+                  <a:pt x="643645" y="7347"/>
+                  <a:pt x="730906" y="0"/>
+                </a:cubicBezTo>
+                <a:cubicBezTo>
+                  <a:pt x="742290" y="165101"/>
+                  <a:pt x="745449" y="183331"/>
+                  <a:pt x="730906" y="338554"/>
+                </a:cubicBezTo>
+                <a:cubicBezTo>
+                  <a:pt x="575731" y="327530"/>
+                  <a:pt x="491782" y="338530"/>
+                  <a:pt x="365453" y="338554"/>
+                </a:cubicBezTo>
+                <a:cubicBezTo>
+                  <a:pt x="239124" y="338578"/>
+                  <a:pt x="122726" y="342389"/>
+                  <a:pt x="0" y="338554"/>
+                </a:cubicBezTo>
+                <a:cubicBezTo>
+                  <a:pt x="-13705" y="218660"/>
+                  <a:pt x="-10648" y="126499"/>
+                  <a:pt x="0" y="0"/>
+                </a:cubicBezTo>
+                <a:close/>
+              </a:path>
+            </a:pathLst>
+          </a:custGeom>
+          <a:pattFill prst="pct5">
+            <a:fgClr>
+              <a:schemeClr val="accent3">
+                <a:lumMod val="20000"/>
+                <a:lumOff val="80000"/>
+              </a:schemeClr>
+            </a:fgClr>
+            <a:bgClr>
+              <a:schemeClr val="bg1"/>
+            </a:bgClr>
+          </a:pattFill>
+          <a:ln>
+            <a:solidFill>
+              <a:schemeClr val="accent1"/>
+            </a:solidFill>
+            <a:prstDash val="dash"/>
+            <a:extLst>
+              <a:ext uri="{C807C97D-BFC1-408E-A445-0C87EB9F89A2}">
+                <ask:lineSketchStyleProps xmlns:ask="http://schemas.microsoft.com/office/drawing/2018/sketchyshapes" sd="3330592986">
+                  <a:prstGeom prst="rect">
+                    <a:avLst/>
+                  </a:prstGeom>
+                  <ask:type>
+                    <ask:lineSketchFreehand/>
+                  </ask:type>
+                </ask:lineSketchStyleProps>
+              </a:ext>
+            </a:extLst>
+          </a:ln>
         </p:spPr>
         <p:txBody>
           <a:bodyPr wrap="none" rtlCol="0">
@@ -20838,15 +21114,153 @@
             <a:off x="6886814" y="2007352"/>
             <a:ext cx="777777" cy="338554"/>
           </a:xfrm>
-          <a:prstGeom prst="rect">
-            <a:avLst/>
-          </a:prstGeom>
-          <a:solidFill>
-            <a:schemeClr val="accent3">
-              <a:lumMod val="20000"/>
-              <a:lumOff val="80000"/>
-            </a:schemeClr>
-          </a:solidFill>
+          <a:custGeom>
+            <a:avLst/>
+            <a:gdLst>
+              <a:gd name="connsiteX0" fmla="*/ 0 w 777777"/>
+              <a:gd name="connsiteY0" fmla="*/ 0 h 338554"/>
+              <a:gd name="connsiteX1" fmla="*/ 404444 w 777777"/>
+              <a:gd name="connsiteY1" fmla="*/ 0 h 338554"/>
+              <a:gd name="connsiteX2" fmla="*/ 777777 w 777777"/>
+              <a:gd name="connsiteY2" fmla="*/ 0 h 338554"/>
+              <a:gd name="connsiteX3" fmla="*/ 777777 w 777777"/>
+              <a:gd name="connsiteY3" fmla="*/ 338554 h 338554"/>
+              <a:gd name="connsiteX4" fmla="*/ 412222 w 777777"/>
+              <a:gd name="connsiteY4" fmla="*/ 338554 h 338554"/>
+              <a:gd name="connsiteX5" fmla="*/ 0 w 777777"/>
+              <a:gd name="connsiteY5" fmla="*/ 338554 h 338554"/>
+              <a:gd name="connsiteX6" fmla="*/ 0 w 777777"/>
+              <a:gd name="connsiteY6" fmla="*/ 0 h 338554"/>
+            </a:gdLst>
+            <a:ahLst/>
+            <a:cxnLst>
+              <a:cxn ang="0">
+                <a:pos x="connsiteX0" y="connsiteY0"/>
+              </a:cxn>
+              <a:cxn ang="0">
+                <a:pos x="connsiteX1" y="connsiteY1"/>
+              </a:cxn>
+              <a:cxn ang="0">
+                <a:pos x="connsiteX2" y="connsiteY2"/>
+              </a:cxn>
+              <a:cxn ang="0">
+                <a:pos x="connsiteX3" y="connsiteY3"/>
+              </a:cxn>
+              <a:cxn ang="0">
+                <a:pos x="connsiteX4" y="connsiteY4"/>
+              </a:cxn>
+              <a:cxn ang="0">
+                <a:pos x="connsiteX5" y="connsiteY5"/>
+              </a:cxn>
+              <a:cxn ang="0">
+                <a:pos x="connsiteX6" y="connsiteY6"/>
+              </a:cxn>
+            </a:cxnLst>
+            <a:rect l="l" t="t" r="r" b="b"/>
+            <a:pathLst>
+              <a:path w="777777" h="338554" fill="none" extrusionOk="0">
+                <a:moveTo>
+                  <a:pt x="0" y="0"/>
+                </a:moveTo>
+                <a:cubicBezTo>
+                  <a:pt x="97610" y="-1494"/>
+                  <a:pt x="295892" y="13922"/>
+                  <a:pt x="404444" y="0"/>
+                </a:cubicBezTo>
+                <a:cubicBezTo>
+                  <a:pt x="512996" y="-13922"/>
+                  <a:pt x="636104" y="17750"/>
+                  <a:pt x="777777" y="0"/>
+                </a:cubicBezTo>
+                <a:cubicBezTo>
+                  <a:pt x="788800" y="100445"/>
+                  <a:pt x="782982" y="179525"/>
+                  <a:pt x="777777" y="338554"/>
+                </a:cubicBezTo>
+                <a:cubicBezTo>
+                  <a:pt x="599207" y="338769"/>
+                  <a:pt x="529662" y="341505"/>
+                  <a:pt x="412222" y="338554"/>
+                </a:cubicBezTo>
+                <a:cubicBezTo>
+                  <a:pt x="294783" y="335603"/>
+                  <a:pt x="157500" y="319775"/>
+                  <a:pt x="0" y="338554"/>
+                </a:cubicBezTo>
+                <a:cubicBezTo>
+                  <a:pt x="11524" y="265154"/>
+                  <a:pt x="-4956" y="117900"/>
+                  <a:pt x="0" y="0"/>
+                </a:cubicBezTo>
+                <a:close/>
+              </a:path>
+              <a:path w="777777" h="338554" stroke="0" extrusionOk="0">
+                <a:moveTo>
+                  <a:pt x="0" y="0"/>
+                </a:moveTo>
+                <a:cubicBezTo>
+                  <a:pt x="140737" y="-13847"/>
+                  <a:pt x="315488" y="-16025"/>
+                  <a:pt x="396666" y="0"/>
+                </a:cubicBezTo>
+                <a:cubicBezTo>
+                  <a:pt x="477844" y="16025"/>
+                  <a:pt x="669233" y="17892"/>
+                  <a:pt x="777777" y="0"/>
+                </a:cubicBezTo>
+                <a:cubicBezTo>
+                  <a:pt x="771858" y="118629"/>
+                  <a:pt x="778974" y="247982"/>
+                  <a:pt x="777777" y="338554"/>
+                </a:cubicBezTo>
+                <a:cubicBezTo>
+                  <a:pt x="611690" y="343882"/>
+                  <a:pt x="507792" y="330219"/>
+                  <a:pt x="404444" y="338554"/>
+                </a:cubicBezTo>
+                <a:cubicBezTo>
+                  <a:pt x="301096" y="346889"/>
+                  <a:pt x="152218" y="319166"/>
+                  <a:pt x="0" y="338554"/>
+                </a:cubicBezTo>
+                <a:cubicBezTo>
+                  <a:pt x="10930" y="215275"/>
+                  <a:pt x="1993" y="102261"/>
+                  <a:pt x="0" y="0"/>
+                </a:cubicBezTo>
+                <a:close/>
+              </a:path>
+            </a:pathLst>
+          </a:custGeom>
+          <a:pattFill prst="pct5">
+            <a:fgClr>
+              <a:schemeClr val="accent3">
+                <a:lumMod val="20000"/>
+                <a:lumOff val="80000"/>
+              </a:schemeClr>
+            </a:fgClr>
+            <a:bgClr>
+              <a:schemeClr val="bg1"/>
+            </a:bgClr>
+          </a:pattFill>
+          <a:ln>
+            <a:solidFill>
+              <a:schemeClr val="accent1"/>
+            </a:solidFill>
+            <a:prstDash val="dash"/>
+            <a:extLst>
+              <a:ext uri="{C807C97D-BFC1-408E-A445-0C87EB9F89A2}">
+                <ask:lineSketchStyleProps xmlns:ask="http://schemas.microsoft.com/office/drawing/2018/sketchyshapes" sd="1027299719">
+                  <a:prstGeom prst="rect">
+                    <a:avLst/>
+                  </a:prstGeom>
+                  <ask:type>
+                    <ask:lineSketchFreehand/>
+                  </ask:type>
+                </ask:lineSketchStyleProps>
+              </a:ext>
+            </a:extLst>
+          </a:ln>
         </p:spPr>
         <p:txBody>
           <a:bodyPr wrap="none" rtlCol="0">
@@ -20971,15 +21385,333 @@
             <a:off x="3566358" y="2901548"/>
             <a:ext cx="5052477" cy="338554"/>
           </a:xfrm>
-          <a:prstGeom prst="rect">
-            <a:avLst/>
-          </a:prstGeom>
-          <a:solidFill>
-            <a:schemeClr val="accent3">
-              <a:lumMod val="20000"/>
-              <a:lumOff val="80000"/>
-            </a:schemeClr>
-          </a:solidFill>
+          <a:custGeom>
+            <a:avLst/>
+            <a:gdLst>
+              <a:gd name="connsiteX0" fmla="*/ 0 w 5052477"/>
+              <a:gd name="connsiteY0" fmla="*/ 0 h 338554"/>
+              <a:gd name="connsiteX1" fmla="*/ 631560 w 5052477"/>
+              <a:gd name="connsiteY1" fmla="*/ 0 h 338554"/>
+              <a:gd name="connsiteX2" fmla="*/ 1162070 w 5052477"/>
+              <a:gd name="connsiteY2" fmla="*/ 0 h 338554"/>
+              <a:gd name="connsiteX3" fmla="*/ 1793629 w 5052477"/>
+              <a:gd name="connsiteY3" fmla="*/ 0 h 338554"/>
+              <a:gd name="connsiteX4" fmla="*/ 2273615 w 5052477"/>
+              <a:gd name="connsiteY4" fmla="*/ 0 h 338554"/>
+              <a:gd name="connsiteX5" fmla="*/ 3006224 w 5052477"/>
+              <a:gd name="connsiteY5" fmla="*/ 0 h 338554"/>
+              <a:gd name="connsiteX6" fmla="*/ 3536734 w 5052477"/>
+              <a:gd name="connsiteY6" fmla="*/ 0 h 338554"/>
+              <a:gd name="connsiteX7" fmla="*/ 4067244 w 5052477"/>
+              <a:gd name="connsiteY7" fmla="*/ 0 h 338554"/>
+              <a:gd name="connsiteX8" fmla="*/ 5052477 w 5052477"/>
+              <a:gd name="connsiteY8" fmla="*/ 0 h 338554"/>
+              <a:gd name="connsiteX9" fmla="*/ 5052477 w 5052477"/>
+              <a:gd name="connsiteY9" fmla="*/ 338554 h 338554"/>
+              <a:gd name="connsiteX10" fmla="*/ 4471442 w 5052477"/>
+              <a:gd name="connsiteY10" fmla="*/ 338554 h 338554"/>
+              <a:gd name="connsiteX11" fmla="*/ 3738833 w 5052477"/>
+              <a:gd name="connsiteY11" fmla="*/ 338554 h 338554"/>
+              <a:gd name="connsiteX12" fmla="*/ 3258848 w 5052477"/>
+              <a:gd name="connsiteY12" fmla="*/ 338554 h 338554"/>
+              <a:gd name="connsiteX13" fmla="*/ 2728338 w 5052477"/>
+              <a:gd name="connsiteY13" fmla="*/ 338554 h 338554"/>
+              <a:gd name="connsiteX14" fmla="*/ 2147303 w 5052477"/>
+              <a:gd name="connsiteY14" fmla="*/ 338554 h 338554"/>
+              <a:gd name="connsiteX15" fmla="*/ 1465218 w 5052477"/>
+              <a:gd name="connsiteY15" fmla="*/ 338554 h 338554"/>
+              <a:gd name="connsiteX16" fmla="*/ 934708 w 5052477"/>
+              <a:gd name="connsiteY16" fmla="*/ 338554 h 338554"/>
+              <a:gd name="connsiteX17" fmla="*/ 0 w 5052477"/>
+              <a:gd name="connsiteY17" fmla="*/ 338554 h 338554"/>
+              <a:gd name="connsiteX18" fmla="*/ 0 w 5052477"/>
+              <a:gd name="connsiteY18" fmla="*/ 0 h 338554"/>
+            </a:gdLst>
+            <a:ahLst/>
+            <a:cxnLst>
+              <a:cxn ang="0">
+                <a:pos x="connsiteX0" y="connsiteY0"/>
+              </a:cxn>
+              <a:cxn ang="0">
+                <a:pos x="connsiteX1" y="connsiteY1"/>
+              </a:cxn>
+              <a:cxn ang="0">
+                <a:pos x="connsiteX2" y="connsiteY2"/>
+              </a:cxn>
+              <a:cxn ang="0">
+                <a:pos x="connsiteX3" y="connsiteY3"/>
+              </a:cxn>
+              <a:cxn ang="0">
+                <a:pos x="connsiteX4" y="connsiteY4"/>
+              </a:cxn>
+              <a:cxn ang="0">
+                <a:pos x="connsiteX5" y="connsiteY5"/>
+              </a:cxn>
+              <a:cxn ang="0">
+                <a:pos x="connsiteX6" y="connsiteY6"/>
+              </a:cxn>
+              <a:cxn ang="0">
+                <a:pos x="connsiteX7" y="connsiteY7"/>
+              </a:cxn>
+              <a:cxn ang="0">
+                <a:pos x="connsiteX8" y="connsiteY8"/>
+              </a:cxn>
+              <a:cxn ang="0">
+                <a:pos x="connsiteX9" y="connsiteY9"/>
+              </a:cxn>
+              <a:cxn ang="0">
+                <a:pos x="connsiteX10" y="connsiteY10"/>
+              </a:cxn>
+              <a:cxn ang="0">
+                <a:pos x="connsiteX11" y="connsiteY11"/>
+              </a:cxn>
+              <a:cxn ang="0">
+                <a:pos x="connsiteX12" y="connsiteY12"/>
+              </a:cxn>
+              <a:cxn ang="0">
+                <a:pos x="connsiteX13" y="connsiteY13"/>
+              </a:cxn>
+              <a:cxn ang="0">
+                <a:pos x="connsiteX14" y="connsiteY14"/>
+              </a:cxn>
+              <a:cxn ang="0">
+                <a:pos x="connsiteX15" y="connsiteY15"/>
+              </a:cxn>
+              <a:cxn ang="0">
+                <a:pos x="connsiteX16" y="connsiteY16"/>
+              </a:cxn>
+              <a:cxn ang="0">
+                <a:pos x="connsiteX17" y="connsiteY17"/>
+              </a:cxn>
+              <a:cxn ang="0">
+                <a:pos x="connsiteX18" y="connsiteY18"/>
+              </a:cxn>
+            </a:cxnLst>
+            <a:rect l="l" t="t" r="r" b="b"/>
+            <a:pathLst>
+              <a:path w="5052477" h="338554" fill="none" extrusionOk="0">
+                <a:moveTo>
+                  <a:pt x="0" y="0"/>
+                </a:moveTo>
+                <a:cubicBezTo>
+                  <a:pt x="149673" y="-3577"/>
+                  <a:pt x="464438" y="12949"/>
+                  <a:pt x="631560" y="0"/>
+                </a:cubicBezTo>
+                <a:cubicBezTo>
+                  <a:pt x="798682" y="-12949"/>
+                  <a:pt x="1049122" y="22218"/>
+                  <a:pt x="1162070" y="0"/>
+                </a:cubicBezTo>
+                <a:cubicBezTo>
+                  <a:pt x="1275018" y="-22218"/>
+                  <a:pt x="1542163" y="6044"/>
+                  <a:pt x="1793629" y="0"/>
+                </a:cubicBezTo>
+                <a:cubicBezTo>
+                  <a:pt x="2045095" y="-6044"/>
+                  <a:pt x="2148812" y="17929"/>
+                  <a:pt x="2273615" y="0"/>
+                </a:cubicBezTo>
+                <a:cubicBezTo>
+                  <a:pt x="2398418" y="-17929"/>
+                  <a:pt x="2742019" y="-35284"/>
+                  <a:pt x="3006224" y="0"/>
+                </a:cubicBezTo>
+                <a:cubicBezTo>
+                  <a:pt x="3270429" y="35284"/>
+                  <a:pt x="3286157" y="-355"/>
+                  <a:pt x="3536734" y="0"/>
+                </a:cubicBezTo>
+                <a:cubicBezTo>
+                  <a:pt x="3787311" y="355"/>
+                  <a:pt x="3945637" y="-20363"/>
+                  <a:pt x="4067244" y="0"/>
+                </a:cubicBezTo>
+                <a:cubicBezTo>
+                  <a:pt x="4188851" y="20363"/>
+                  <a:pt x="4626408" y="-30338"/>
+                  <a:pt x="5052477" y="0"/>
+                </a:cubicBezTo>
+                <a:cubicBezTo>
+                  <a:pt x="5058470" y="139779"/>
+                  <a:pt x="5067500" y="194360"/>
+                  <a:pt x="5052477" y="338554"/>
+                </a:cubicBezTo>
+                <a:cubicBezTo>
+                  <a:pt x="4887711" y="315827"/>
+                  <a:pt x="4665846" y="342300"/>
+                  <a:pt x="4471442" y="338554"/>
+                </a:cubicBezTo>
+                <a:cubicBezTo>
+                  <a:pt x="4277039" y="334808"/>
+                  <a:pt x="4031322" y="344739"/>
+                  <a:pt x="3738833" y="338554"/>
+                </a:cubicBezTo>
+                <a:cubicBezTo>
+                  <a:pt x="3446344" y="332369"/>
+                  <a:pt x="3447733" y="358476"/>
+                  <a:pt x="3258848" y="338554"/>
+                </a:cubicBezTo>
+                <a:cubicBezTo>
+                  <a:pt x="3069964" y="318632"/>
+                  <a:pt x="2988187" y="350073"/>
+                  <a:pt x="2728338" y="338554"/>
+                </a:cubicBezTo>
+                <a:cubicBezTo>
+                  <a:pt x="2468489" y="327036"/>
+                  <a:pt x="2414807" y="362208"/>
+                  <a:pt x="2147303" y="338554"/>
+                </a:cubicBezTo>
+                <a:cubicBezTo>
+                  <a:pt x="1879800" y="314900"/>
+                  <a:pt x="1700189" y="344936"/>
+                  <a:pt x="1465218" y="338554"/>
+                </a:cubicBezTo>
+                <a:cubicBezTo>
+                  <a:pt x="1230248" y="332172"/>
+                  <a:pt x="1080370" y="357831"/>
+                  <a:pt x="934708" y="338554"/>
+                </a:cubicBezTo>
+                <a:cubicBezTo>
+                  <a:pt x="789046" y="319278"/>
+                  <a:pt x="450758" y="295391"/>
+                  <a:pt x="0" y="338554"/>
+                </a:cubicBezTo>
+                <a:cubicBezTo>
+                  <a:pt x="-12501" y="269751"/>
+                  <a:pt x="10486" y="77604"/>
+                  <a:pt x="0" y="0"/>
+                </a:cubicBezTo>
+                <a:close/>
+              </a:path>
+              <a:path w="5052477" h="338554" stroke="0" extrusionOk="0">
+                <a:moveTo>
+                  <a:pt x="0" y="0"/>
+                </a:moveTo>
+                <a:cubicBezTo>
+                  <a:pt x="155864" y="-3260"/>
+                  <a:pt x="480426" y="21656"/>
+                  <a:pt x="631560" y="0"/>
+                </a:cubicBezTo>
+                <a:cubicBezTo>
+                  <a:pt x="782694" y="-21656"/>
+                  <a:pt x="946612" y="-880"/>
+                  <a:pt x="1212594" y="0"/>
+                </a:cubicBezTo>
+                <a:cubicBezTo>
+                  <a:pt x="1478576" y="880"/>
+                  <a:pt x="1553653" y="33907"/>
+                  <a:pt x="1894679" y="0"/>
+                </a:cubicBezTo>
+                <a:cubicBezTo>
+                  <a:pt x="2235705" y="-33907"/>
+                  <a:pt x="2370866" y="25383"/>
+                  <a:pt x="2576763" y="0"/>
+                </a:cubicBezTo>
+                <a:cubicBezTo>
+                  <a:pt x="2782660" y="-25383"/>
+                  <a:pt x="2961332" y="-21667"/>
+                  <a:pt x="3107273" y="0"/>
+                </a:cubicBezTo>
+                <a:cubicBezTo>
+                  <a:pt x="3253214" y="21667"/>
+                  <a:pt x="3480265" y="7135"/>
+                  <a:pt x="3637783" y="0"/>
+                </a:cubicBezTo>
+                <a:cubicBezTo>
+                  <a:pt x="3795301" y="-7135"/>
+                  <a:pt x="3969540" y="10074"/>
+                  <a:pt x="4218818" y="0"/>
+                </a:cubicBezTo>
+                <a:cubicBezTo>
+                  <a:pt x="4468096" y="-10074"/>
+                  <a:pt x="4703632" y="40605"/>
+                  <a:pt x="5052477" y="0"/>
+                </a:cubicBezTo>
+                <a:cubicBezTo>
+                  <a:pt x="5044706" y="162284"/>
+                  <a:pt x="5038234" y="209173"/>
+                  <a:pt x="5052477" y="338554"/>
+                </a:cubicBezTo>
+                <a:cubicBezTo>
+                  <a:pt x="4815224" y="318934"/>
+                  <a:pt x="4769522" y="320600"/>
+                  <a:pt x="4572492" y="338554"/>
+                </a:cubicBezTo>
+                <a:cubicBezTo>
+                  <a:pt x="4375462" y="356508"/>
+                  <a:pt x="4234884" y="315249"/>
+                  <a:pt x="3991457" y="338554"/>
+                </a:cubicBezTo>
+                <a:cubicBezTo>
+                  <a:pt x="3748030" y="361859"/>
+                  <a:pt x="3665680" y="317144"/>
+                  <a:pt x="3511472" y="338554"/>
+                </a:cubicBezTo>
+                <a:cubicBezTo>
+                  <a:pt x="3357264" y="359964"/>
+                  <a:pt x="3058123" y="360140"/>
+                  <a:pt x="2930437" y="338554"/>
+                </a:cubicBezTo>
+                <a:cubicBezTo>
+                  <a:pt x="2802752" y="316968"/>
+                  <a:pt x="2633019" y="359486"/>
+                  <a:pt x="2349402" y="338554"/>
+                </a:cubicBezTo>
+                <a:cubicBezTo>
+                  <a:pt x="2065786" y="317622"/>
+                  <a:pt x="1799510" y="324629"/>
+                  <a:pt x="1616793" y="338554"/>
+                </a:cubicBezTo>
+                <a:cubicBezTo>
+                  <a:pt x="1434076" y="352479"/>
+                  <a:pt x="1241721" y="357018"/>
+                  <a:pt x="1136807" y="338554"/>
+                </a:cubicBezTo>
+                <a:cubicBezTo>
+                  <a:pt x="1031893" y="320090"/>
+                  <a:pt x="314387" y="383631"/>
+                  <a:pt x="0" y="338554"/>
+                </a:cubicBezTo>
+                <a:cubicBezTo>
+                  <a:pt x="-7651" y="240294"/>
+                  <a:pt x="-503" y="116030"/>
+                  <a:pt x="0" y="0"/>
+                </a:cubicBezTo>
+                <a:close/>
+              </a:path>
+            </a:pathLst>
+          </a:custGeom>
+          <a:pattFill prst="pct5">
+            <a:fgClr>
+              <a:schemeClr val="accent3">
+                <a:lumMod val="20000"/>
+                <a:lumOff val="80000"/>
+              </a:schemeClr>
+            </a:fgClr>
+            <a:bgClr>
+              <a:schemeClr val="bg1"/>
+            </a:bgClr>
+          </a:pattFill>
+          <a:ln>
+            <a:solidFill>
+              <a:schemeClr val="accent1"/>
+            </a:solidFill>
+            <a:prstDash val="dash"/>
+            <a:extLst>
+              <a:ext uri="{C807C97D-BFC1-408E-A445-0C87EB9F89A2}">
+                <ask:lineSketchStyleProps xmlns:ask="http://schemas.microsoft.com/office/drawing/2018/sketchyshapes" sd="487723824">
+                  <a:prstGeom prst="rect">
+                    <a:avLst/>
+                  </a:prstGeom>
+                  <ask:type>
+                    <ask:lineSketchFreehand/>
+                  </ask:type>
+                </ask:lineSketchStyleProps>
+              </a:ext>
+            </a:extLst>
+          </a:ln>
         </p:spPr>
         <p:txBody>
           <a:bodyPr wrap="square" rtlCol="0">
@@ -20990,7 +21722,7 @@
             <a:pPr algn="ctr"/>
             <a:r>
               <a:rPr lang="en-US" sz="1600" dirty="0"/>
-              <a:t>Initialize variables/field references for traffic splitting</a:t>
+              <a:t>Initialize experiment</a:t>
             </a:r>
           </a:p>
         </p:txBody>
@@ -21009,8 +21741,8 @@
         </p:nvSpPr>
         <p:spPr>
           <a:xfrm flipH="1">
-            <a:off x="7186677" y="3675972"/>
-            <a:ext cx="143415" cy="985890"/>
+            <a:off x="7193746" y="3412348"/>
+            <a:ext cx="136343" cy="1451947"/>
           </a:xfrm>
           <a:prstGeom prst="rect">
             <a:avLst/>
@@ -21119,172 +21851,8 @@
         </p:nvCxnSpPr>
         <p:spPr>
           <a:xfrm>
-            <a:off x="5029195" y="3674643"/>
+            <a:off x="5029195" y="3403382"/>
             <a:ext cx="2247182" cy="0"/>
-          </a:xfrm>
-          <a:prstGeom prst="straightConnector1">
-            <a:avLst/>
-          </a:prstGeom>
-          <a:ln>
-            <a:tailEnd type="stealth" w="lg" len="lg"/>
-          </a:ln>
-        </p:spPr>
-        <p:style>
-          <a:lnRef idx="1">
-            <a:schemeClr val="accent1"/>
-          </a:lnRef>
-          <a:fillRef idx="0">
-            <a:schemeClr val="accent1"/>
-          </a:fillRef>
-          <a:effectRef idx="0">
-            <a:schemeClr val="accent1"/>
-          </a:effectRef>
-          <a:fontRef idx="minor">
-            <a:schemeClr val="tx1"/>
-          </a:fontRef>
-        </p:style>
-      </p:cxnSp>
-      <p:cxnSp>
-        <p:nvCxnSpPr>
-          <p:cNvPr id="77" name="Straight Arrow Connector 76">
-            <a:extLst>
-              <a:ext uri="{FF2B5EF4-FFF2-40B4-BE49-F238E27FC236}">
-                <a16:creationId xmlns:a16="http://schemas.microsoft.com/office/drawing/2014/main" id="{03615D93-0833-534C-A029-9D092072F8AD}"/>
-              </a:ext>
-            </a:extLst>
-          </p:cNvPr>
-          <p:cNvCxnSpPr>
-            <a:cxnSpLocks/>
-          </p:cNvCxnSpPr>
-          <p:nvPr/>
-        </p:nvCxnSpPr>
-        <p:spPr>
-          <a:xfrm flipH="1">
-            <a:off x="5012455" y="3761318"/>
-            <a:ext cx="2263922" cy="0"/>
-          </a:xfrm>
-          <a:prstGeom prst="straightConnector1">
-            <a:avLst/>
-          </a:prstGeom>
-          <a:ln>
-            <a:tailEnd type="stealth" w="lg" len="lg"/>
-          </a:ln>
-        </p:spPr>
-        <p:style>
-          <a:lnRef idx="1">
-            <a:schemeClr val="accent1"/>
-          </a:lnRef>
-          <a:fillRef idx="0">
-            <a:schemeClr val="accent1"/>
-          </a:fillRef>
-          <a:effectRef idx="0">
-            <a:schemeClr val="accent1"/>
-          </a:effectRef>
-          <a:fontRef idx="minor">
-            <a:schemeClr val="tx1"/>
-          </a:fontRef>
-        </p:style>
-      </p:cxnSp>
-      <p:cxnSp>
-        <p:nvCxnSpPr>
-          <p:cNvPr id="80" name="Straight Arrow Connector 79">
-            <a:extLst>
-              <a:ext uri="{FF2B5EF4-FFF2-40B4-BE49-F238E27FC236}">
-                <a16:creationId xmlns:a16="http://schemas.microsoft.com/office/drawing/2014/main" id="{F1C03B0C-9810-A945-AE0D-5372C365ABD2}"/>
-              </a:ext>
-            </a:extLst>
-          </p:cNvPr>
-          <p:cNvCxnSpPr>
-            <a:cxnSpLocks/>
-          </p:cNvCxnSpPr>
-          <p:nvPr/>
-        </p:nvCxnSpPr>
-        <p:spPr>
-          <a:xfrm>
-            <a:off x="5047951" y="4123058"/>
-            <a:ext cx="2282141" cy="0"/>
-          </a:xfrm>
-          <a:prstGeom prst="straightConnector1">
-            <a:avLst/>
-          </a:prstGeom>
-          <a:ln>
-            <a:tailEnd type="stealth" w="lg" len="lg"/>
-          </a:ln>
-        </p:spPr>
-        <p:style>
-          <a:lnRef idx="1">
-            <a:schemeClr val="accent1"/>
-          </a:lnRef>
-          <a:fillRef idx="0">
-            <a:schemeClr val="accent1"/>
-          </a:fillRef>
-          <a:effectRef idx="0">
-            <a:schemeClr val="accent1"/>
-          </a:effectRef>
-          <a:fontRef idx="minor">
-            <a:schemeClr val="tx1"/>
-          </a:fontRef>
-        </p:style>
-      </p:cxnSp>
-      <p:cxnSp>
-        <p:nvCxnSpPr>
-          <p:cNvPr id="81" name="Straight Arrow Connector 80">
-            <a:extLst>
-              <a:ext uri="{FF2B5EF4-FFF2-40B4-BE49-F238E27FC236}">
-                <a16:creationId xmlns:a16="http://schemas.microsoft.com/office/drawing/2014/main" id="{4C49FD1C-886E-F246-9BB9-FC4C10FC9CD5}"/>
-              </a:ext>
-            </a:extLst>
-          </p:cNvPr>
-          <p:cNvCxnSpPr>
-            <a:cxnSpLocks/>
-          </p:cNvCxnSpPr>
-          <p:nvPr/>
-        </p:nvCxnSpPr>
-        <p:spPr>
-          <a:xfrm flipH="1">
-            <a:off x="5020825" y="4204663"/>
-            <a:ext cx="2228426" cy="0"/>
-          </a:xfrm>
-          <a:prstGeom prst="straightConnector1">
-            <a:avLst/>
-          </a:prstGeom>
-          <a:ln>
-            <a:tailEnd type="stealth" w="lg" len="lg"/>
-          </a:ln>
-        </p:spPr>
-        <p:style>
-          <a:lnRef idx="1">
-            <a:schemeClr val="accent1"/>
-          </a:lnRef>
-          <a:fillRef idx="0">
-            <a:schemeClr val="accent1"/>
-          </a:fillRef>
-          <a:effectRef idx="0">
-            <a:schemeClr val="accent1"/>
-          </a:effectRef>
-          <a:fontRef idx="minor">
-            <a:schemeClr val="tx1"/>
-          </a:fontRef>
-        </p:style>
-      </p:cxnSp>
-      <p:cxnSp>
-        <p:nvCxnSpPr>
-          <p:cNvPr id="82" name="Straight Arrow Connector 81">
-            <a:extLst>
-              <a:ext uri="{FF2B5EF4-FFF2-40B4-BE49-F238E27FC236}">
-                <a16:creationId xmlns:a16="http://schemas.microsoft.com/office/drawing/2014/main" id="{81F06543-AB84-7E46-875F-26A89EDF2292}"/>
-              </a:ext>
-            </a:extLst>
-          </p:cNvPr>
-          <p:cNvCxnSpPr>
-            <a:cxnSpLocks/>
-          </p:cNvCxnSpPr>
-          <p:nvPr/>
-        </p:nvCxnSpPr>
-        <p:spPr>
-          <a:xfrm>
-            <a:off x="5015654" y="4569866"/>
-            <a:ext cx="2314438" cy="0"/>
           </a:xfrm>
           <a:prstGeom prst="straightConnector1">
             <a:avLst/>
@@ -21324,7 +21892,7 @@
         </p:nvCxnSpPr>
         <p:spPr>
           <a:xfrm flipH="1">
-            <a:off x="4988528" y="4661862"/>
+            <a:off x="4988528" y="4864296"/>
             <a:ext cx="2287849" cy="0"/>
           </a:xfrm>
           <a:prstGeom prst="straightConnector1">
@@ -21489,15 +22057,243 @@
             <a:off x="1395848" y="4263986"/>
             <a:ext cx="3438572" cy="338554"/>
           </a:xfrm>
-          <a:prstGeom prst="rect">
-            <a:avLst/>
-          </a:prstGeom>
-          <a:solidFill>
-            <a:schemeClr val="accent3">
-              <a:lumMod val="20000"/>
-              <a:lumOff val="80000"/>
-            </a:schemeClr>
-          </a:solidFill>
+          <a:custGeom>
+            <a:avLst/>
+            <a:gdLst>
+              <a:gd name="connsiteX0" fmla="*/ 0 w 3438572"/>
+              <a:gd name="connsiteY0" fmla="*/ 0 h 338554"/>
+              <a:gd name="connsiteX1" fmla="*/ 653329 w 3438572"/>
+              <a:gd name="connsiteY1" fmla="*/ 0 h 338554"/>
+              <a:gd name="connsiteX2" fmla="*/ 1306657 w 3438572"/>
+              <a:gd name="connsiteY2" fmla="*/ 0 h 338554"/>
+              <a:gd name="connsiteX3" fmla="*/ 1891215 w 3438572"/>
+              <a:gd name="connsiteY3" fmla="*/ 0 h 338554"/>
+              <a:gd name="connsiteX4" fmla="*/ 2578929 w 3438572"/>
+              <a:gd name="connsiteY4" fmla="*/ 0 h 338554"/>
+              <a:gd name="connsiteX5" fmla="*/ 3438572 w 3438572"/>
+              <a:gd name="connsiteY5" fmla="*/ 0 h 338554"/>
+              <a:gd name="connsiteX6" fmla="*/ 3438572 w 3438572"/>
+              <a:gd name="connsiteY6" fmla="*/ 338554 h 338554"/>
+              <a:gd name="connsiteX7" fmla="*/ 2750858 w 3438572"/>
+              <a:gd name="connsiteY7" fmla="*/ 338554 h 338554"/>
+              <a:gd name="connsiteX8" fmla="*/ 1994372 w 3438572"/>
+              <a:gd name="connsiteY8" fmla="*/ 338554 h 338554"/>
+              <a:gd name="connsiteX9" fmla="*/ 1306657 w 3438572"/>
+              <a:gd name="connsiteY9" fmla="*/ 338554 h 338554"/>
+              <a:gd name="connsiteX10" fmla="*/ 687714 w 3438572"/>
+              <a:gd name="connsiteY10" fmla="*/ 338554 h 338554"/>
+              <a:gd name="connsiteX11" fmla="*/ 0 w 3438572"/>
+              <a:gd name="connsiteY11" fmla="*/ 338554 h 338554"/>
+              <a:gd name="connsiteX12" fmla="*/ 0 w 3438572"/>
+              <a:gd name="connsiteY12" fmla="*/ 0 h 338554"/>
+            </a:gdLst>
+            <a:ahLst/>
+            <a:cxnLst>
+              <a:cxn ang="0">
+                <a:pos x="connsiteX0" y="connsiteY0"/>
+              </a:cxn>
+              <a:cxn ang="0">
+                <a:pos x="connsiteX1" y="connsiteY1"/>
+              </a:cxn>
+              <a:cxn ang="0">
+                <a:pos x="connsiteX2" y="connsiteY2"/>
+              </a:cxn>
+              <a:cxn ang="0">
+                <a:pos x="connsiteX3" y="connsiteY3"/>
+              </a:cxn>
+              <a:cxn ang="0">
+                <a:pos x="connsiteX4" y="connsiteY4"/>
+              </a:cxn>
+              <a:cxn ang="0">
+                <a:pos x="connsiteX5" y="connsiteY5"/>
+              </a:cxn>
+              <a:cxn ang="0">
+                <a:pos x="connsiteX6" y="connsiteY6"/>
+              </a:cxn>
+              <a:cxn ang="0">
+                <a:pos x="connsiteX7" y="connsiteY7"/>
+              </a:cxn>
+              <a:cxn ang="0">
+                <a:pos x="connsiteX8" y="connsiteY8"/>
+              </a:cxn>
+              <a:cxn ang="0">
+                <a:pos x="connsiteX9" y="connsiteY9"/>
+              </a:cxn>
+              <a:cxn ang="0">
+                <a:pos x="connsiteX10" y="connsiteY10"/>
+              </a:cxn>
+              <a:cxn ang="0">
+                <a:pos x="connsiteX11" y="connsiteY11"/>
+              </a:cxn>
+              <a:cxn ang="0">
+                <a:pos x="connsiteX12" y="connsiteY12"/>
+              </a:cxn>
+            </a:cxnLst>
+            <a:rect l="l" t="t" r="r" b="b"/>
+            <a:pathLst>
+              <a:path w="3438572" h="338554" fill="none" extrusionOk="0">
+                <a:moveTo>
+                  <a:pt x="0" y="0"/>
+                </a:moveTo>
+                <a:cubicBezTo>
+                  <a:pt x="133686" y="10606"/>
+                  <a:pt x="404639" y="7365"/>
+                  <a:pt x="653329" y="0"/>
+                </a:cubicBezTo>
+                <a:cubicBezTo>
+                  <a:pt x="902019" y="-7365"/>
+                  <a:pt x="1086206" y="15545"/>
+                  <a:pt x="1306657" y="0"/>
+                </a:cubicBezTo>
+                <a:cubicBezTo>
+                  <a:pt x="1527108" y="-15545"/>
+                  <a:pt x="1656443" y="24800"/>
+                  <a:pt x="1891215" y="0"/>
+                </a:cubicBezTo>
+                <a:cubicBezTo>
+                  <a:pt x="2125987" y="-24800"/>
+                  <a:pt x="2324818" y="-5515"/>
+                  <a:pt x="2578929" y="0"/>
+                </a:cubicBezTo>
+                <a:cubicBezTo>
+                  <a:pt x="2833040" y="5515"/>
+                  <a:pt x="3015929" y="-5734"/>
+                  <a:pt x="3438572" y="0"/>
+                </a:cubicBezTo>
+                <a:cubicBezTo>
+                  <a:pt x="3432510" y="106024"/>
+                  <a:pt x="3435682" y="268731"/>
+                  <a:pt x="3438572" y="338554"/>
+                </a:cubicBezTo>
+                <a:cubicBezTo>
+                  <a:pt x="3285942" y="337309"/>
+                  <a:pt x="2965871" y="350178"/>
+                  <a:pt x="2750858" y="338554"/>
+                </a:cubicBezTo>
+                <a:cubicBezTo>
+                  <a:pt x="2535845" y="326930"/>
+                  <a:pt x="2267089" y="337375"/>
+                  <a:pt x="1994372" y="338554"/>
+                </a:cubicBezTo>
+                <a:cubicBezTo>
+                  <a:pt x="1721655" y="339733"/>
+                  <a:pt x="1607019" y="351509"/>
+                  <a:pt x="1306657" y="338554"/>
+                </a:cubicBezTo>
+                <a:cubicBezTo>
+                  <a:pt x="1006296" y="325599"/>
+                  <a:pt x="978268" y="327723"/>
+                  <a:pt x="687714" y="338554"/>
+                </a:cubicBezTo>
+                <a:cubicBezTo>
+                  <a:pt x="397160" y="349385"/>
+                  <a:pt x="246285" y="371637"/>
+                  <a:pt x="0" y="338554"/>
+                </a:cubicBezTo>
+                <a:cubicBezTo>
+                  <a:pt x="11738" y="224619"/>
+                  <a:pt x="-16398" y="111746"/>
+                  <a:pt x="0" y="0"/>
+                </a:cubicBezTo>
+                <a:close/>
+              </a:path>
+              <a:path w="3438572" h="338554" stroke="0" extrusionOk="0">
+                <a:moveTo>
+                  <a:pt x="0" y="0"/>
+                </a:moveTo>
+                <a:cubicBezTo>
+                  <a:pt x="173545" y="29466"/>
+                  <a:pt x="561064" y="-16018"/>
+                  <a:pt x="756486" y="0"/>
+                </a:cubicBezTo>
+                <a:cubicBezTo>
+                  <a:pt x="951908" y="16018"/>
+                  <a:pt x="1245906" y="-10319"/>
+                  <a:pt x="1409815" y="0"/>
+                </a:cubicBezTo>
+                <a:cubicBezTo>
+                  <a:pt x="1573724" y="10319"/>
+                  <a:pt x="1801122" y="-10377"/>
+                  <a:pt x="1994372" y="0"/>
+                </a:cubicBezTo>
+                <a:cubicBezTo>
+                  <a:pt x="2187622" y="10377"/>
+                  <a:pt x="2333192" y="-7938"/>
+                  <a:pt x="2578929" y="0"/>
+                </a:cubicBezTo>
+                <a:cubicBezTo>
+                  <a:pt x="2824666" y="7938"/>
+                  <a:pt x="3117898" y="11480"/>
+                  <a:pt x="3438572" y="0"/>
+                </a:cubicBezTo>
+                <a:cubicBezTo>
+                  <a:pt x="3432030" y="111313"/>
+                  <a:pt x="3442069" y="185153"/>
+                  <a:pt x="3438572" y="338554"/>
+                </a:cubicBezTo>
+                <a:cubicBezTo>
+                  <a:pt x="3312348" y="318194"/>
+                  <a:pt x="3031067" y="335829"/>
+                  <a:pt x="2819629" y="338554"/>
+                </a:cubicBezTo>
+                <a:cubicBezTo>
+                  <a:pt x="2608191" y="341279"/>
+                  <a:pt x="2366297" y="348365"/>
+                  <a:pt x="2200686" y="338554"/>
+                </a:cubicBezTo>
+                <a:cubicBezTo>
+                  <a:pt x="2035075" y="328743"/>
+                  <a:pt x="1739408" y="314850"/>
+                  <a:pt x="1547357" y="338554"/>
+                </a:cubicBezTo>
+                <a:cubicBezTo>
+                  <a:pt x="1355306" y="362258"/>
+                  <a:pt x="1160614" y="319371"/>
+                  <a:pt x="928414" y="338554"/>
+                </a:cubicBezTo>
+                <a:cubicBezTo>
+                  <a:pt x="696214" y="357737"/>
+                  <a:pt x="368855" y="294927"/>
+                  <a:pt x="0" y="338554"/>
+                </a:cubicBezTo>
+                <a:cubicBezTo>
+                  <a:pt x="-984" y="269855"/>
+                  <a:pt x="16340" y="104171"/>
+                  <a:pt x="0" y="0"/>
+                </a:cubicBezTo>
+                <a:close/>
+              </a:path>
+            </a:pathLst>
+          </a:custGeom>
+          <a:pattFill prst="pct5">
+            <a:fgClr>
+              <a:schemeClr val="accent3">
+                <a:lumMod val="20000"/>
+                <a:lumOff val="80000"/>
+              </a:schemeClr>
+            </a:fgClr>
+            <a:bgClr>
+              <a:schemeClr val="bg1"/>
+            </a:bgClr>
+          </a:pattFill>
+          <a:ln>
+            <a:solidFill>
+              <a:schemeClr val="accent1"/>
+            </a:solidFill>
+            <a:prstDash val="dash"/>
+            <a:extLst>
+              <a:ext uri="{C807C97D-BFC1-408E-A445-0C87EB9F89A2}">
+                <ask:lineSketchStyleProps xmlns:ask="http://schemas.microsoft.com/office/drawing/2018/sketchyshapes" sd="3664814286">
+                  <a:prstGeom prst="rect">
+                    <a:avLst/>
+                  </a:prstGeom>
+                  <ask:type>
+                    <ask:lineSketchFreehand/>
+                  </ask:type>
+                </ask:lineSketchStyleProps>
+              </a:ext>
+            </a:extLst>
+          </a:ln>
         </p:spPr>
         <p:txBody>
           <a:bodyPr wrap="square" rtlCol="0">
@@ -21571,15 +22367,153 @@
             <a:off x="9787656" y="5091448"/>
             <a:ext cx="777777" cy="338554"/>
           </a:xfrm>
-          <a:prstGeom prst="rect">
-            <a:avLst/>
-          </a:prstGeom>
-          <a:solidFill>
-            <a:schemeClr val="accent3">
-              <a:lumMod val="20000"/>
-              <a:lumOff val="80000"/>
-            </a:schemeClr>
-          </a:solidFill>
+          <a:custGeom>
+            <a:avLst/>
+            <a:gdLst>
+              <a:gd name="connsiteX0" fmla="*/ 0 w 777777"/>
+              <a:gd name="connsiteY0" fmla="*/ 0 h 338554"/>
+              <a:gd name="connsiteX1" fmla="*/ 388889 w 777777"/>
+              <a:gd name="connsiteY1" fmla="*/ 0 h 338554"/>
+              <a:gd name="connsiteX2" fmla="*/ 777777 w 777777"/>
+              <a:gd name="connsiteY2" fmla="*/ 0 h 338554"/>
+              <a:gd name="connsiteX3" fmla="*/ 777777 w 777777"/>
+              <a:gd name="connsiteY3" fmla="*/ 338554 h 338554"/>
+              <a:gd name="connsiteX4" fmla="*/ 412222 w 777777"/>
+              <a:gd name="connsiteY4" fmla="*/ 338554 h 338554"/>
+              <a:gd name="connsiteX5" fmla="*/ 0 w 777777"/>
+              <a:gd name="connsiteY5" fmla="*/ 338554 h 338554"/>
+              <a:gd name="connsiteX6" fmla="*/ 0 w 777777"/>
+              <a:gd name="connsiteY6" fmla="*/ 0 h 338554"/>
+            </a:gdLst>
+            <a:ahLst/>
+            <a:cxnLst>
+              <a:cxn ang="0">
+                <a:pos x="connsiteX0" y="connsiteY0"/>
+              </a:cxn>
+              <a:cxn ang="0">
+                <a:pos x="connsiteX1" y="connsiteY1"/>
+              </a:cxn>
+              <a:cxn ang="0">
+                <a:pos x="connsiteX2" y="connsiteY2"/>
+              </a:cxn>
+              <a:cxn ang="0">
+                <a:pos x="connsiteX3" y="connsiteY3"/>
+              </a:cxn>
+              <a:cxn ang="0">
+                <a:pos x="connsiteX4" y="connsiteY4"/>
+              </a:cxn>
+              <a:cxn ang="0">
+                <a:pos x="connsiteX5" y="connsiteY5"/>
+              </a:cxn>
+              <a:cxn ang="0">
+                <a:pos x="connsiteX6" y="connsiteY6"/>
+              </a:cxn>
+            </a:cxnLst>
+            <a:rect l="l" t="t" r="r" b="b"/>
+            <a:pathLst>
+              <a:path w="777777" h="338554" fill="none" extrusionOk="0">
+                <a:moveTo>
+                  <a:pt x="0" y="0"/>
+                </a:moveTo>
+                <a:cubicBezTo>
+                  <a:pt x="92367" y="-16524"/>
+                  <a:pt x="232200" y="534"/>
+                  <a:pt x="388889" y="0"/>
+                </a:cubicBezTo>
+                <a:cubicBezTo>
+                  <a:pt x="545578" y="-534"/>
+                  <a:pt x="692836" y="16451"/>
+                  <a:pt x="777777" y="0"/>
+                </a:cubicBezTo>
+                <a:cubicBezTo>
+                  <a:pt x="776799" y="107777"/>
+                  <a:pt x="767917" y="195723"/>
+                  <a:pt x="777777" y="338554"/>
+                </a:cubicBezTo>
+                <a:cubicBezTo>
+                  <a:pt x="691337" y="339434"/>
+                  <a:pt x="589637" y="332309"/>
+                  <a:pt x="412222" y="338554"/>
+                </a:cubicBezTo>
+                <a:cubicBezTo>
+                  <a:pt x="234808" y="344799"/>
+                  <a:pt x="135064" y="318271"/>
+                  <a:pt x="0" y="338554"/>
+                </a:cubicBezTo>
+                <a:cubicBezTo>
+                  <a:pt x="16312" y="182694"/>
+                  <a:pt x="15202" y="76868"/>
+                  <a:pt x="0" y="0"/>
+                </a:cubicBezTo>
+                <a:close/>
+              </a:path>
+              <a:path w="777777" h="338554" stroke="0" extrusionOk="0">
+                <a:moveTo>
+                  <a:pt x="0" y="0"/>
+                </a:moveTo>
+                <a:cubicBezTo>
+                  <a:pt x="109828" y="-8672"/>
+                  <a:pt x="255497" y="-7708"/>
+                  <a:pt x="388889" y="0"/>
+                </a:cubicBezTo>
+                <a:cubicBezTo>
+                  <a:pt x="522281" y="7708"/>
+                  <a:pt x="684665" y="11358"/>
+                  <a:pt x="777777" y="0"/>
+                </a:cubicBezTo>
+                <a:cubicBezTo>
+                  <a:pt x="765316" y="127640"/>
+                  <a:pt x="773161" y="173838"/>
+                  <a:pt x="777777" y="338554"/>
+                </a:cubicBezTo>
+                <a:cubicBezTo>
+                  <a:pt x="695688" y="322411"/>
+                  <a:pt x="503487" y="351661"/>
+                  <a:pt x="381111" y="338554"/>
+                </a:cubicBezTo>
+                <a:cubicBezTo>
+                  <a:pt x="258735" y="325447"/>
+                  <a:pt x="182116" y="346509"/>
+                  <a:pt x="0" y="338554"/>
+                </a:cubicBezTo>
+                <a:cubicBezTo>
+                  <a:pt x="-12306" y="208974"/>
+                  <a:pt x="-10615" y="69977"/>
+                  <a:pt x="0" y="0"/>
+                </a:cubicBezTo>
+                <a:close/>
+              </a:path>
+            </a:pathLst>
+          </a:custGeom>
+          <a:pattFill prst="pct5">
+            <a:fgClr>
+              <a:schemeClr val="accent3">
+                <a:lumMod val="20000"/>
+                <a:lumOff val="80000"/>
+              </a:schemeClr>
+            </a:fgClr>
+            <a:bgClr>
+              <a:schemeClr val="bg1"/>
+            </a:bgClr>
+          </a:pattFill>
+          <a:ln>
+            <a:solidFill>
+              <a:schemeClr val="accent1"/>
+            </a:solidFill>
+            <a:prstDash val="dash"/>
+            <a:extLst>
+              <a:ext uri="{C807C97D-BFC1-408E-A445-0C87EB9F89A2}">
+                <ask:lineSketchStyleProps xmlns:ask="http://schemas.microsoft.com/office/drawing/2018/sketchyshapes" sd="1936591246">
+                  <a:prstGeom prst="rect">
+                    <a:avLst/>
+                  </a:prstGeom>
+                  <ask:type>
+                    <ask:lineSketchFreehand/>
+                  </ask:type>
+                </ask:lineSketchStyleProps>
+              </a:ext>
+            </a:extLst>
+          </a:ln>
         </p:spPr>
         <p:txBody>
           <a:bodyPr wrap="none" rtlCol="0">
@@ -21702,17 +22636,245 @@
         <p:spPr>
           <a:xfrm>
             <a:off x="1392407" y="5537776"/>
-            <a:ext cx="3423220" cy="338554"/>
-          </a:xfrm>
-          <a:prstGeom prst="rect">
-            <a:avLst/>
-          </a:prstGeom>
-          <a:solidFill>
-            <a:schemeClr val="accent3">
-              <a:lumMod val="20000"/>
-              <a:lumOff val="80000"/>
-            </a:schemeClr>
-          </a:solidFill>
+            <a:ext cx="3423220" cy="584775"/>
+          </a:xfrm>
+          <a:custGeom>
+            <a:avLst/>
+            <a:gdLst>
+              <a:gd name="connsiteX0" fmla="*/ 0 w 3423220"/>
+              <a:gd name="connsiteY0" fmla="*/ 0 h 584775"/>
+              <a:gd name="connsiteX1" fmla="*/ 718876 w 3423220"/>
+              <a:gd name="connsiteY1" fmla="*/ 0 h 584775"/>
+              <a:gd name="connsiteX2" fmla="*/ 1437752 w 3423220"/>
+              <a:gd name="connsiteY2" fmla="*/ 0 h 584775"/>
+              <a:gd name="connsiteX3" fmla="*/ 2019700 w 3423220"/>
+              <a:gd name="connsiteY3" fmla="*/ 0 h 584775"/>
+              <a:gd name="connsiteX4" fmla="*/ 2635879 w 3423220"/>
+              <a:gd name="connsiteY4" fmla="*/ 0 h 584775"/>
+              <a:gd name="connsiteX5" fmla="*/ 3423220 w 3423220"/>
+              <a:gd name="connsiteY5" fmla="*/ 0 h 584775"/>
+              <a:gd name="connsiteX6" fmla="*/ 3423220 w 3423220"/>
+              <a:gd name="connsiteY6" fmla="*/ 584775 h 584775"/>
+              <a:gd name="connsiteX7" fmla="*/ 2670112 w 3423220"/>
+              <a:gd name="connsiteY7" fmla="*/ 584775 h 584775"/>
+              <a:gd name="connsiteX8" fmla="*/ 1985468 w 3423220"/>
+              <a:gd name="connsiteY8" fmla="*/ 584775 h 584775"/>
+              <a:gd name="connsiteX9" fmla="*/ 1369288 w 3423220"/>
+              <a:gd name="connsiteY9" fmla="*/ 584775 h 584775"/>
+              <a:gd name="connsiteX10" fmla="*/ 718876 w 3423220"/>
+              <a:gd name="connsiteY10" fmla="*/ 584775 h 584775"/>
+              <a:gd name="connsiteX11" fmla="*/ 0 w 3423220"/>
+              <a:gd name="connsiteY11" fmla="*/ 584775 h 584775"/>
+              <a:gd name="connsiteX12" fmla="*/ 0 w 3423220"/>
+              <a:gd name="connsiteY12" fmla="*/ 0 h 584775"/>
+            </a:gdLst>
+            <a:ahLst/>
+            <a:cxnLst>
+              <a:cxn ang="0">
+                <a:pos x="connsiteX0" y="connsiteY0"/>
+              </a:cxn>
+              <a:cxn ang="0">
+                <a:pos x="connsiteX1" y="connsiteY1"/>
+              </a:cxn>
+              <a:cxn ang="0">
+                <a:pos x="connsiteX2" y="connsiteY2"/>
+              </a:cxn>
+              <a:cxn ang="0">
+                <a:pos x="connsiteX3" y="connsiteY3"/>
+              </a:cxn>
+              <a:cxn ang="0">
+                <a:pos x="connsiteX4" y="connsiteY4"/>
+              </a:cxn>
+              <a:cxn ang="0">
+                <a:pos x="connsiteX5" y="connsiteY5"/>
+              </a:cxn>
+              <a:cxn ang="0">
+                <a:pos x="connsiteX6" y="connsiteY6"/>
+              </a:cxn>
+              <a:cxn ang="0">
+                <a:pos x="connsiteX7" y="connsiteY7"/>
+              </a:cxn>
+              <a:cxn ang="0">
+                <a:pos x="connsiteX8" y="connsiteY8"/>
+              </a:cxn>
+              <a:cxn ang="0">
+                <a:pos x="connsiteX9" y="connsiteY9"/>
+              </a:cxn>
+              <a:cxn ang="0">
+                <a:pos x="connsiteX10" y="connsiteY10"/>
+              </a:cxn>
+              <a:cxn ang="0">
+                <a:pos x="connsiteX11" y="connsiteY11"/>
+              </a:cxn>
+              <a:cxn ang="0">
+                <a:pos x="connsiteX12" y="connsiteY12"/>
+              </a:cxn>
+            </a:cxnLst>
+            <a:rect l="l" t="t" r="r" b="b"/>
+            <a:pathLst>
+              <a:path w="3423220" h="584775" fill="none" extrusionOk="0">
+                <a:moveTo>
+                  <a:pt x="0" y="0"/>
+                </a:moveTo>
+                <a:cubicBezTo>
+                  <a:pt x="261554" y="-27734"/>
+                  <a:pt x="530716" y="20883"/>
+                  <a:pt x="718876" y="0"/>
+                </a:cubicBezTo>
+                <a:cubicBezTo>
+                  <a:pt x="907036" y="-20883"/>
+                  <a:pt x="1165781" y="10378"/>
+                  <a:pt x="1437752" y="0"/>
+                </a:cubicBezTo>
+                <a:cubicBezTo>
+                  <a:pt x="1709723" y="-10378"/>
+                  <a:pt x="1798428" y="20180"/>
+                  <a:pt x="2019700" y="0"/>
+                </a:cubicBezTo>
+                <a:cubicBezTo>
+                  <a:pt x="2240972" y="-20180"/>
+                  <a:pt x="2508056" y="-3321"/>
+                  <a:pt x="2635879" y="0"/>
+                </a:cubicBezTo>
+                <a:cubicBezTo>
+                  <a:pt x="2763702" y="3321"/>
+                  <a:pt x="3152782" y="18090"/>
+                  <a:pt x="3423220" y="0"/>
+                </a:cubicBezTo>
+                <a:cubicBezTo>
+                  <a:pt x="3413202" y="121188"/>
+                  <a:pt x="3409783" y="335915"/>
+                  <a:pt x="3423220" y="584775"/>
+                </a:cubicBezTo>
+                <a:cubicBezTo>
+                  <a:pt x="3104147" y="584799"/>
+                  <a:pt x="2836996" y="610653"/>
+                  <a:pt x="2670112" y="584775"/>
+                </a:cubicBezTo>
+                <a:cubicBezTo>
+                  <a:pt x="2503228" y="558897"/>
+                  <a:pt x="2306865" y="557131"/>
+                  <a:pt x="1985468" y="584775"/>
+                </a:cubicBezTo>
+                <a:cubicBezTo>
+                  <a:pt x="1664071" y="612419"/>
+                  <a:pt x="1645221" y="579517"/>
+                  <a:pt x="1369288" y="584775"/>
+                </a:cubicBezTo>
+                <a:cubicBezTo>
+                  <a:pt x="1093355" y="590033"/>
+                  <a:pt x="963197" y="565240"/>
+                  <a:pt x="718876" y="584775"/>
+                </a:cubicBezTo>
+                <a:cubicBezTo>
+                  <a:pt x="474555" y="604310"/>
+                  <a:pt x="205624" y="580312"/>
+                  <a:pt x="0" y="584775"/>
+                </a:cubicBezTo>
+                <a:cubicBezTo>
+                  <a:pt x="25539" y="461173"/>
+                  <a:pt x="-17919" y="268215"/>
+                  <a:pt x="0" y="0"/>
+                </a:cubicBezTo>
+                <a:close/>
+              </a:path>
+              <a:path w="3423220" h="584775" stroke="0" extrusionOk="0">
+                <a:moveTo>
+                  <a:pt x="0" y="0"/>
+                </a:moveTo>
+                <a:cubicBezTo>
+                  <a:pt x="236264" y="-5797"/>
+                  <a:pt x="496779" y="30871"/>
+                  <a:pt x="718876" y="0"/>
+                </a:cubicBezTo>
+                <a:cubicBezTo>
+                  <a:pt x="940973" y="-30871"/>
+                  <a:pt x="1101168" y="8346"/>
+                  <a:pt x="1300824" y="0"/>
+                </a:cubicBezTo>
+                <a:cubicBezTo>
+                  <a:pt x="1500480" y="-8346"/>
+                  <a:pt x="1802487" y="33092"/>
+                  <a:pt x="1985468" y="0"/>
+                </a:cubicBezTo>
+                <a:cubicBezTo>
+                  <a:pt x="2168449" y="-33092"/>
+                  <a:pt x="2374795" y="-6565"/>
+                  <a:pt x="2670112" y="0"/>
+                </a:cubicBezTo>
+                <a:cubicBezTo>
+                  <a:pt x="2965429" y="6565"/>
+                  <a:pt x="3213822" y="34000"/>
+                  <a:pt x="3423220" y="0"/>
+                </a:cubicBezTo>
+                <a:cubicBezTo>
+                  <a:pt x="3433944" y="270084"/>
+                  <a:pt x="3448539" y="299375"/>
+                  <a:pt x="3423220" y="584775"/>
+                </a:cubicBezTo>
+                <a:cubicBezTo>
+                  <a:pt x="3088339" y="552681"/>
+                  <a:pt x="2854042" y="610709"/>
+                  <a:pt x="2670112" y="584775"/>
+                </a:cubicBezTo>
+                <a:cubicBezTo>
+                  <a:pt x="2486182" y="558841"/>
+                  <a:pt x="2283494" y="582260"/>
+                  <a:pt x="2019700" y="584775"/>
+                </a:cubicBezTo>
+                <a:cubicBezTo>
+                  <a:pt x="1755906" y="587290"/>
+                  <a:pt x="1582674" y="603479"/>
+                  <a:pt x="1437752" y="584775"/>
+                </a:cubicBezTo>
+                <a:cubicBezTo>
+                  <a:pt x="1292830" y="566071"/>
+                  <a:pt x="1015782" y="598925"/>
+                  <a:pt x="821573" y="584775"/>
+                </a:cubicBezTo>
+                <a:cubicBezTo>
+                  <a:pt x="627364" y="570625"/>
+                  <a:pt x="205779" y="597872"/>
+                  <a:pt x="0" y="584775"/>
+                </a:cubicBezTo>
+                <a:cubicBezTo>
+                  <a:pt x="-14597" y="300448"/>
+                  <a:pt x="15864" y="149485"/>
+                  <a:pt x="0" y="0"/>
+                </a:cubicBezTo>
+                <a:close/>
+              </a:path>
+            </a:pathLst>
+          </a:custGeom>
+          <a:pattFill prst="pct5">
+            <a:fgClr>
+              <a:schemeClr val="accent3">
+                <a:lumMod val="20000"/>
+                <a:lumOff val="80000"/>
+              </a:schemeClr>
+            </a:fgClr>
+            <a:bgClr>
+              <a:schemeClr val="bg1"/>
+            </a:bgClr>
+          </a:pattFill>
+          <a:ln>
+            <a:solidFill>
+              <a:schemeClr val="accent1"/>
+            </a:solidFill>
+            <a:prstDash val="dash"/>
+            <a:extLst>
+              <a:ext uri="{C807C97D-BFC1-408E-A445-0C87EB9F89A2}">
+                <ask:lineSketchStyleProps xmlns:ask="http://schemas.microsoft.com/office/drawing/2018/sketchyshapes" sd="2896009873">
+                  <a:prstGeom prst="rect">
+                    <a:avLst/>
+                  </a:prstGeom>
+                  <ask:type>
+                    <ask:lineSketchFreehand/>
+                  </ask:type>
+                </ask:lineSketchStyleProps>
+              </a:ext>
+            </a:extLst>
+          </a:ln>
         </p:spPr>
         <p:txBody>
           <a:bodyPr wrap="square" rtlCol="0">
@@ -21723,7 +22885,7 @@
             <a:pPr algn="ctr"/>
             <a:r>
               <a:rPr lang="en-US" sz="1600" dirty="0"/>
-              <a:t>Promote winning version. Clean up.</a:t>
+              <a:t>Promote winner. Clean up after experiment</a:t>
             </a:r>
           </a:p>
         </p:txBody>
@@ -21742,8 +22904,8 @@
         </p:nvSpPr>
         <p:spPr>
           <a:xfrm>
-            <a:off x="7457774" y="3674643"/>
-            <a:ext cx="429360" cy="985890"/>
+            <a:off x="7457774" y="3403382"/>
+            <a:ext cx="429360" cy="1460914"/>
           </a:xfrm>
           <a:prstGeom prst="rightBrace">
             <a:avLst/>
@@ -21905,47 +23067,6 @@
                 </a:solidFill>
               </a:rPr>
               <a:t>Experiment iterations</a:t>
-            </a:r>
-          </a:p>
-        </p:txBody>
-      </p:sp>
-      <p:sp>
-        <p:nvSpPr>
-          <p:cNvPr id="78" name="TextBox 77">
-            <a:extLst>
-              <a:ext uri="{FF2B5EF4-FFF2-40B4-BE49-F238E27FC236}">
-                <a16:creationId xmlns:a16="http://schemas.microsoft.com/office/drawing/2014/main" id="{4C8585BD-47CA-6B42-8E2B-1C05C0CF778C}"/>
-              </a:ext>
-            </a:extLst>
-          </p:cNvPr>
-          <p:cNvSpPr txBox="1"/>
-          <p:nvPr/>
-        </p:nvSpPr>
-        <p:spPr>
-          <a:xfrm>
-            <a:off x="5028596" y="3740023"/>
-            <a:ext cx="2217134" cy="830997"/>
-          </a:xfrm>
-          <a:prstGeom prst="rect">
-            <a:avLst/>
-          </a:prstGeom>
-          <a:solidFill>
-            <a:schemeClr val="accent3">
-              <a:lumMod val="20000"/>
-              <a:lumOff val="80000"/>
-            </a:schemeClr>
-          </a:solidFill>
-        </p:spPr>
-        <p:txBody>
-          <a:bodyPr wrap="square" rtlCol="0">
-            <a:spAutoFit/>
-          </a:bodyPr>
-          <a:lstStyle/>
-          <a:p>
-            <a:pPr algn="ctr"/>
-            <a:r>
-              <a:rPr lang="en-US" sz="1600" dirty="0"/>
-              <a:t>Assess versions, compute winner, split traffic</a:t>
             </a:r>
           </a:p>
         </p:txBody>
@@ -22091,6 +23212,286 @@
           </a:extLst>
         </p:spPr>
       </p:pic>
+      <p:sp>
+        <p:nvSpPr>
+          <p:cNvPr id="67" name="TextBox 66">
+            <a:extLst>
+              <a:ext uri="{FF2B5EF4-FFF2-40B4-BE49-F238E27FC236}">
+                <a16:creationId xmlns:a16="http://schemas.microsoft.com/office/drawing/2014/main" id="{89CD0F78-80FA-BD4A-9482-EBC280C1C060}"/>
+              </a:ext>
+            </a:extLst>
+          </p:cNvPr>
+          <p:cNvSpPr txBox="1"/>
+          <p:nvPr/>
+        </p:nvSpPr>
+        <p:spPr>
+          <a:xfrm>
+            <a:off x="5028596" y="3484963"/>
+            <a:ext cx="2217134" cy="1323439"/>
+          </a:xfrm>
+          <a:custGeom>
+            <a:avLst/>
+            <a:gdLst>
+              <a:gd name="connsiteX0" fmla="*/ 0 w 2217134"/>
+              <a:gd name="connsiteY0" fmla="*/ 0 h 1323439"/>
+              <a:gd name="connsiteX1" fmla="*/ 532112 w 2217134"/>
+              <a:gd name="connsiteY1" fmla="*/ 0 h 1323439"/>
+              <a:gd name="connsiteX2" fmla="*/ 1086396 w 2217134"/>
+              <a:gd name="connsiteY2" fmla="*/ 0 h 1323439"/>
+              <a:gd name="connsiteX3" fmla="*/ 1662851 w 2217134"/>
+              <a:gd name="connsiteY3" fmla="*/ 0 h 1323439"/>
+              <a:gd name="connsiteX4" fmla="*/ 2217134 w 2217134"/>
+              <a:gd name="connsiteY4" fmla="*/ 0 h 1323439"/>
+              <a:gd name="connsiteX5" fmla="*/ 2217134 w 2217134"/>
+              <a:gd name="connsiteY5" fmla="*/ 674954 h 1323439"/>
+              <a:gd name="connsiteX6" fmla="*/ 2217134 w 2217134"/>
+              <a:gd name="connsiteY6" fmla="*/ 1323439 h 1323439"/>
+              <a:gd name="connsiteX7" fmla="*/ 1618508 w 2217134"/>
+              <a:gd name="connsiteY7" fmla="*/ 1323439 h 1323439"/>
+              <a:gd name="connsiteX8" fmla="*/ 1019882 w 2217134"/>
+              <a:gd name="connsiteY8" fmla="*/ 1323439 h 1323439"/>
+              <a:gd name="connsiteX9" fmla="*/ 0 w 2217134"/>
+              <a:gd name="connsiteY9" fmla="*/ 1323439 h 1323439"/>
+              <a:gd name="connsiteX10" fmla="*/ 0 w 2217134"/>
+              <a:gd name="connsiteY10" fmla="*/ 674954 h 1323439"/>
+              <a:gd name="connsiteX11" fmla="*/ 0 w 2217134"/>
+              <a:gd name="connsiteY11" fmla="*/ 0 h 1323439"/>
+            </a:gdLst>
+            <a:ahLst/>
+            <a:cxnLst>
+              <a:cxn ang="0">
+                <a:pos x="connsiteX0" y="connsiteY0"/>
+              </a:cxn>
+              <a:cxn ang="0">
+                <a:pos x="connsiteX1" y="connsiteY1"/>
+              </a:cxn>
+              <a:cxn ang="0">
+                <a:pos x="connsiteX2" y="connsiteY2"/>
+              </a:cxn>
+              <a:cxn ang="0">
+                <a:pos x="connsiteX3" y="connsiteY3"/>
+              </a:cxn>
+              <a:cxn ang="0">
+                <a:pos x="connsiteX4" y="connsiteY4"/>
+              </a:cxn>
+              <a:cxn ang="0">
+                <a:pos x="connsiteX5" y="connsiteY5"/>
+              </a:cxn>
+              <a:cxn ang="0">
+                <a:pos x="connsiteX6" y="connsiteY6"/>
+              </a:cxn>
+              <a:cxn ang="0">
+                <a:pos x="connsiteX7" y="connsiteY7"/>
+              </a:cxn>
+              <a:cxn ang="0">
+                <a:pos x="connsiteX8" y="connsiteY8"/>
+              </a:cxn>
+              <a:cxn ang="0">
+                <a:pos x="connsiteX9" y="connsiteY9"/>
+              </a:cxn>
+              <a:cxn ang="0">
+                <a:pos x="connsiteX10" y="connsiteY10"/>
+              </a:cxn>
+              <a:cxn ang="0">
+                <a:pos x="connsiteX11" y="connsiteY11"/>
+              </a:cxn>
+            </a:cxnLst>
+            <a:rect l="l" t="t" r="r" b="b"/>
+            <a:pathLst>
+              <a:path w="2217134" h="1323439" fill="none" extrusionOk="0">
+                <a:moveTo>
+                  <a:pt x="0" y="0"/>
+                </a:moveTo>
+                <a:cubicBezTo>
+                  <a:pt x="129562" y="3153"/>
+                  <a:pt x="416944" y="-9262"/>
+                  <a:pt x="532112" y="0"/>
+                </a:cubicBezTo>
+                <a:cubicBezTo>
+                  <a:pt x="647280" y="9262"/>
+                  <a:pt x="880800" y="23404"/>
+                  <a:pt x="1086396" y="0"/>
+                </a:cubicBezTo>
+                <a:cubicBezTo>
+                  <a:pt x="1291992" y="-23404"/>
+                  <a:pt x="1531052" y="-11909"/>
+                  <a:pt x="1662851" y="0"/>
+                </a:cubicBezTo>
+                <a:cubicBezTo>
+                  <a:pt x="1794651" y="11909"/>
+                  <a:pt x="1950961" y="-5194"/>
+                  <a:pt x="2217134" y="0"/>
+                </a:cubicBezTo>
+                <a:cubicBezTo>
+                  <a:pt x="2248960" y="242066"/>
+                  <a:pt x="2190264" y="474376"/>
+                  <a:pt x="2217134" y="674954"/>
+                </a:cubicBezTo>
+                <a:cubicBezTo>
+                  <a:pt x="2244004" y="875532"/>
+                  <a:pt x="2193249" y="1156576"/>
+                  <a:pt x="2217134" y="1323439"/>
+                </a:cubicBezTo>
+                <a:cubicBezTo>
+                  <a:pt x="2018326" y="1334796"/>
+                  <a:pt x="1890693" y="1333829"/>
+                  <a:pt x="1618508" y="1323439"/>
+                </a:cubicBezTo>
+                <a:cubicBezTo>
+                  <a:pt x="1346323" y="1313049"/>
+                  <a:pt x="1308440" y="1307535"/>
+                  <a:pt x="1019882" y="1323439"/>
+                </a:cubicBezTo>
+                <a:cubicBezTo>
+                  <a:pt x="731324" y="1339343"/>
+                  <a:pt x="220177" y="1329043"/>
+                  <a:pt x="0" y="1323439"/>
+                </a:cubicBezTo>
+                <a:cubicBezTo>
+                  <a:pt x="4697" y="1103658"/>
+                  <a:pt x="-19750" y="945168"/>
+                  <a:pt x="0" y="674954"/>
+                </a:cubicBezTo>
+                <a:cubicBezTo>
+                  <a:pt x="19750" y="404740"/>
+                  <a:pt x="-28105" y="135825"/>
+                  <a:pt x="0" y="0"/>
+                </a:cubicBezTo>
+                <a:close/>
+              </a:path>
+              <a:path w="2217134" h="1323439" stroke="0" extrusionOk="0">
+                <a:moveTo>
+                  <a:pt x="0" y="0"/>
+                </a:moveTo>
+                <a:cubicBezTo>
+                  <a:pt x="151034" y="-3089"/>
+                  <a:pt x="396128" y="7980"/>
+                  <a:pt x="532112" y="0"/>
+                </a:cubicBezTo>
+                <a:cubicBezTo>
+                  <a:pt x="668096" y="-7980"/>
+                  <a:pt x="919704" y="4555"/>
+                  <a:pt x="1019882" y="0"/>
+                </a:cubicBezTo>
+                <a:cubicBezTo>
+                  <a:pt x="1120060" y="-4555"/>
+                  <a:pt x="1399253" y="2718"/>
+                  <a:pt x="1618508" y="0"/>
+                </a:cubicBezTo>
+                <a:cubicBezTo>
+                  <a:pt x="1837763" y="-2718"/>
+                  <a:pt x="1967955" y="4339"/>
+                  <a:pt x="2217134" y="0"/>
+                </a:cubicBezTo>
+                <a:cubicBezTo>
+                  <a:pt x="2196215" y="138092"/>
+                  <a:pt x="2184789" y="480636"/>
+                  <a:pt x="2217134" y="648485"/>
+                </a:cubicBezTo>
+                <a:cubicBezTo>
+                  <a:pt x="2249479" y="816335"/>
+                  <a:pt x="2187714" y="1080146"/>
+                  <a:pt x="2217134" y="1323439"/>
+                </a:cubicBezTo>
+                <a:cubicBezTo>
+                  <a:pt x="2020040" y="1301705"/>
+                  <a:pt x="1909803" y="1319848"/>
+                  <a:pt x="1662851" y="1323439"/>
+                </a:cubicBezTo>
+                <a:cubicBezTo>
+                  <a:pt x="1415899" y="1327030"/>
+                  <a:pt x="1281759" y="1294075"/>
+                  <a:pt x="1064224" y="1323439"/>
+                </a:cubicBezTo>
+                <a:cubicBezTo>
+                  <a:pt x="846689" y="1352803"/>
+                  <a:pt x="780429" y="1314787"/>
+                  <a:pt x="576455" y="1323439"/>
+                </a:cubicBezTo>
+                <a:cubicBezTo>
+                  <a:pt x="372481" y="1332091"/>
+                  <a:pt x="141204" y="1350875"/>
+                  <a:pt x="0" y="1323439"/>
+                </a:cubicBezTo>
+                <a:cubicBezTo>
+                  <a:pt x="26796" y="1099052"/>
+                  <a:pt x="-7820" y="801412"/>
+                  <a:pt x="0" y="661720"/>
+                </a:cubicBezTo>
+                <a:cubicBezTo>
+                  <a:pt x="7820" y="522028"/>
+                  <a:pt x="-17305" y="232413"/>
+                  <a:pt x="0" y="0"/>
+                </a:cubicBezTo>
+                <a:close/>
+              </a:path>
+            </a:pathLst>
+          </a:custGeom>
+          <a:pattFill prst="pct5">
+            <a:fgClr>
+              <a:schemeClr val="accent3">
+                <a:lumMod val="20000"/>
+                <a:lumOff val="80000"/>
+              </a:schemeClr>
+            </a:fgClr>
+            <a:bgClr>
+              <a:schemeClr val="bg1"/>
+            </a:bgClr>
+          </a:pattFill>
+          <a:ln>
+            <a:solidFill>
+              <a:schemeClr val="accent1"/>
+            </a:solidFill>
+            <a:prstDash val="dash"/>
+            <a:extLst>
+              <a:ext uri="{C807C97D-BFC1-408E-A445-0C87EB9F89A2}">
+                <ask:lineSketchStyleProps xmlns:ask="http://schemas.microsoft.com/office/drawing/2018/sketchyshapes" sd="1219033472">
+                  <a:prstGeom prst="rect">
+                    <a:avLst/>
+                  </a:prstGeom>
+                  <ask:type>
+                    <ask:lineSketchFreehand/>
+                  </ask:type>
+                </ask:lineSketchStyleProps>
+              </a:ext>
+            </a:extLst>
+          </a:ln>
+        </p:spPr>
+        <p:txBody>
+          <a:bodyPr wrap="square" rtlCol="0">
+            <a:spAutoFit/>
+          </a:bodyPr>
+          <a:lstStyle/>
+          <a:p>
+            <a:pPr algn="ctr"/>
+            <a:r>
+              <a:rPr lang="en-US" sz="1600" dirty="0"/>
+              <a:t>Periodically query metrics, </a:t>
+            </a:r>
+          </a:p>
+          <a:p>
+            <a:pPr algn="ctr"/>
+            <a:r>
+              <a:rPr lang="en-US" sz="1600" dirty="0"/>
+              <a:t>assess versions,</a:t>
+            </a:r>
+          </a:p>
+          <a:p>
+            <a:pPr algn="ctr"/>
+            <a:r>
+              <a:rPr lang="en-US" sz="1600" dirty="0"/>
+              <a:t>compute winner,</a:t>
+            </a:r>
+          </a:p>
+          <a:p>
+            <a:pPr algn="ctr"/>
+            <a:r>
+              <a:rPr lang="en-US" sz="1600" dirty="0"/>
+              <a:t>optimize traffic split</a:t>
+            </a:r>
+          </a:p>
+        </p:txBody>
+      </p:sp>
     </p:spTree>
     <p:extLst>
       <p:ext uri="{BB962C8B-B14F-4D97-AF65-F5344CB8AC3E}">

</xml_diff>

<commit_message>
initial conversation on kubecon demo scenario
</commit_message>
<xml_diff>
--- a/mkdocs/src/assets/images/iter8++images.pptx
+++ b/mkdocs/src/assets/images/iter8++images.pptx
@@ -5,7 +5,7 @@
     <p:sldMasterId id="2147483648" r:id="rId1"/>
   </p:sldMasterIdLst>
   <p:notesMasterIdLst>
-    <p:notesMasterId r:id="rId25"/>
+    <p:notesMasterId r:id="rId26"/>
   </p:notesMasterIdLst>
   <p:sldIdLst>
     <p:sldId id="263" r:id="rId2"/>
@@ -31,6 +31,7 @@
     <p:sldId id="312" r:id="rId22"/>
     <p:sldId id="313" r:id="rId23"/>
     <p:sldId id="314" r:id="rId24"/>
+    <p:sldId id="316" r:id="rId25"/>
   </p:sldIdLst>
   <p:sldSz cx="12192000" cy="6858000"/>
   <p:notesSz cx="6858000" cy="9144000"/>
@@ -219,7 +220,7 @@
           <a:p>
             <a:fld id="{38B78CBE-37FA-D241-BB4C-CAC5D3B25F49}" type="datetimeFigureOut">
               <a:rPr lang="en-US" smtClean="0"/>
-              <a:t>3/5/21</a:t>
+              <a:t>3/9/21</a:t>
             </a:fld>
             <a:endParaRPr lang="en-US"/>
           </a:p>
@@ -801,7 +802,7 @@
           <a:p>
             <a:fld id="{79212C04-F6AE-AE48-B29D-E5DED656B647}" type="datetimeFigureOut">
               <a:rPr lang="en-US" smtClean="0"/>
-              <a:t>3/5/21</a:t>
+              <a:t>3/9/21</a:t>
             </a:fld>
             <a:endParaRPr lang="en-US"/>
           </a:p>
@@ -999,7 +1000,7 @@
           <a:p>
             <a:fld id="{79212C04-F6AE-AE48-B29D-E5DED656B647}" type="datetimeFigureOut">
               <a:rPr lang="en-US" smtClean="0"/>
-              <a:t>3/5/21</a:t>
+              <a:t>3/9/21</a:t>
             </a:fld>
             <a:endParaRPr lang="en-US"/>
           </a:p>
@@ -1207,7 +1208,7 @@
           <a:p>
             <a:fld id="{79212C04-F6AE-AE48-B29D-E5DED656B647}" type="datetimeFigureOut">
               <a:rPr lang="en-US" smtClean="0"/>
-              <a:t>3/5/21</a:t>
+              <a:t>3/9/21</a:t>
             </a:fld>
             <a:endParaRPr lang="en-US"/>
           </a:p>
@@ -1405,7 +1406,7 @@
           <a:p>
             <a:fld id="{79212C04-F6AE-AE48-B29D-E5DED656B647}" type="datetimeFigureOut">
               <a:rPr lang="en-US" smtClean="0"/>
-              <a:t>3/5/21</a:t>
+              <a:t>3/9/21</a:t>
             </a:fld>
             <a:endParaRPr lang="en-US"/>
           </a:p>
@@ -1680,7 +1681,7 @@
           <a:p>
             <a:fld id="{79212C04-F6AE-AE48-B29D-E5DED656B647}" type="datetimeFigureOut">
               <a:rPr lang="en-US" smtClean="0"/>
-              <a:t>3/5/21</a:t>
+              <a:t>3/9/21</a:t>
             </a:fld>
             <a:endParaRPr lang="en-US"/>
           </a:p>
@@ -1945,7 +1946,7 @@
           <a:p>
             <a:fld id="{79212C04-F6AE-AE48-B29D-E5DED656B647}" type="datetimeFigureOut">
               <a:rPr lang="en-US" smtClean="0"/>
-              <a:t>3/5/21</a:t>
+              <a:t>3/9/21</a:t>
             </a:fld>
             <a:endParaRPr lang="en-US"/>
           </a:p>
@@ -2357,7 +2358,7 @@
           <a:p>
             <a:fld id="{79212C04-F6AE-AE48-B29D-E5DED656B647}" type="datetimeFigureOut">
               <a:rPr lang="en-US" smtClean="0"/>
-              <a:t>3/5/21</a:t>
+              <a:t>3/9/21</a:t>
             </a:fld>
             <a:endParaRPr lang="en-US"/>
           </a:p>
@@ -2498,7 +2499,7 @@
           <a:p>
             <a:fld id="{79212C04-F6AE-AE48-B29D-E5DED656B647}" type="datetimeFigureOut">
               <a:rPr lang="en-US" smtClean="0"/>
-              <a:t>3/5/21</a:t>
+              <a:t>3/9/21</a:t>
             </a:fld>
             <a:endParaRPr lang="en-US"/>
           </a:p>
@@ -2611,7 +2612,7 @@
           <a:p>
             <a:fld id="{79212C04-F6AE-AE48-B29D-E5DED656B647}" type="datetimeFigureOut">
               <a:rPr lang="en-US" smtClean="0"/>
-              <a:t>3/5/21</a:t>
+              <a:t>3/9/21</a:t>
             </a:fld>
             <a:endParaRPr lang="en-US"/>
           </a:p>
@@ -2922,7 +2923,7 @@
           <a:p>
             <a:fld id="{79212C04-F6AE-AE48-B29D-E5DED656B647}" type="datetimeFigureOut">
               <a:rPr lang="en-US" smtClean="0"/>
-              <a:t>3/5/21</a:t>
+              <a:t>3/9/21</a:t>
             </a:fld>
             <a:endParaRPr lang="en-US"/>
           </a:p>
@@ -3210,7 +3211,7 @@
           <a:p>
             <a:fld id="{79212C04-F6AE-AE48-B29D-E5DED656B647}" type="datetimeFigureOut">
               <a:rPr lang="en-US" smtClean="0"/>
-              <a:t>3/5/21</a:t>
+              <a:t>3/9/21</a:t>
             </a:fld>
             <a:endParaRPr lang="en-US"/>
           </a:p>
@@ -3451,7 +3452,7 @@
           <a:p>
             <a:fld id="{79212C04-F6AE-AE48-B29D-E5DED656B647}" type="datetimeFigureOut">
               <a:rPr lang="en-US" smtClean="0"/>
-              <a:t>3/5/21</a:t>
+              <a:t>3/9/21</a:t>
             </a:fld>
             <a:endParaRPr lang="en-US"/>
           </a:p>
@@ -39278,8 +39279,8 @@
         </p:nvSpPr>
         <p:spPr>
           <a:xfrm>
-            <a:off x="1553269" y="2929053"/>
-            <a:ext cx="2221187" cy="397329"/>
+            <a:off x="1553269" y="2676231"/>
+            <a:ext cx="1493203" cy="650152"/>
           </a:xfrm>
           <a:prstGeom prst="curvedUpArrow">
             <a:avLst>
@@ -39367,10 +39368,10 @@
       </p:sp>
       <p:sp>
         <p:nvSpPr>
-          <p:cNvPr id="6" name="Rounded Rectangle 5">
-            <a:extLst>
-              <a:ext uri="{FF2B5EF4-FFF2-40B4-BE49-F238E27FC236}">
-                <a16:creationId xmlns:a16="http://schemas.microsoft.com/office/drawing/2014/main" id="{A6531ED6-9FBB-9A47-9045-884CC2A5A852}"/>
+          <p:cNvPr id="8" name="Rounded Rectangle 7">
+            <a:extLst>
+              <a:ext uri="{FF2B5EF4-FFF2-40B4-BE49-F238E27FC236}">
+                <a16:creationId xmlns:a16="http://schemas.microsoft.com/office/drawing/2014/main" id="{369AC178-BF9D-4745-90F0-6149144DD9BF}"/>
               </a:ext>
             </a:extLst>
           </p:cNvPr>
@@ -39379,133 +39380,7 @@
         </p:nvSpPr>
         <p:spPr>
           <a:xfrm>
-            <a:off x="3533272" y="1811027"/>
-            <a:ext cx="1170215" cy="674914"/>
-          </a:xfrm>
-          <a:prstGeom prst="roundRect">
-            <a:avLst/>
-          </a:prstGeom>
-          <a:solidFill>
-            <a:schemeClr val="accent1">
-              <a:lumMod val="40000"/>
-              <a:lumOff val="60000"/>
-            </a:schemeClr>
-          </a:solidFill>
-          <a:ln w="19050">
-            <a:solidFill>
-              <a:schemeClr val="accent1">
-                <a:lumMod val="50000"/>
-              </a:schemeClr>
-            </a:solidFill>
-          </a:ln>
-        </p:spPr>
-        <p:style>
-          <a:lnRef idx="2">
-            <a:schemeClr val="accent1">
-              <a:shade val="50000"/>
-            </a:schemeClr>
-          </a:lnRef>
-          <a:fillRef idx="1">
-            <a:schemeClr val="accent1"/>
-          </a:fillRef>
-          <a:effectRef idx="0">
-            <a:schemeClr val="accent1"/>
-          </a:effectRef>
-          <a:fontRef idx="minor">
-            <a:schemeClr val="lt1"/>
-          </a:fontRef>
-        </p:style>
-        <p:txBody>
-          <a:bodyPr rtlCol="0" anchor="ctr"/>
-          <a:lstStyle/>
-          <a:p>
-            <a:pPr algn="ctr"/>
-            <a:endParaRPr lang="en-US" dirty="0">
-              <a:solidFill>
-                <a:schemeClr val="tx1"/>
-              </a:solidFill>
-            </a:endParaRPr>
-          </a:p>
-        </p:txBody>
-      </p:sp>
-      <p:sp>
-        <p:nvSpPr>
-          <p:cNvPr id="7" name="Rounded Rectangle 6">
-            <a:extLst>
-              <a:ext uri="{FF2B5EF4-FFF2-40B4-BE49-F238E27FC236}">
-                <a16:creationId xmlns:a16="http://schemas.microsoft.com/office/drawing/2014/main" id="{E3B559FF-1D1E-EC49-B212-E5F962D13F43}"/>
-              </a:ext>
-            </a:extLst>
-          </p:cNvPr>
-          <p:cNvSpPr/>
-          <p:nvPr/>
-        </p:nvSpPr>
-        <p:spPr>
-          <a:xfrm>
-            <a:off x="3391758" y="1925327"/>
-            <a:ext cx="1170215" cy="674914"/>
-          </a:xfrm>
-          <a:prstGeom prst="roundRect">
-            <a:avLst/>
-          </a:prstGeom>
-          <a:solidFill>
-            <a:schemeClr val="accent1">
-              <a:lumMod val="60000"/>
-              <a:lumOff val="40000"/>
-            </a:schemeClr>
-          </a:solidFill>
-          <a:ln w="19050">
-            <a:solidFill>
-              <a:schemeClr val="accent1">
-                <a:lumMod val="50000"/>
-              </a:schemeClr>
-            </a:solidFill>
-          </a:ln>
-        </p:spPr>
-        <p:style>
-          <a:lnRef idx="2">
-            <a:schemeClr val="accent1">
-              <a:shade val="50000"/>
-            </a:schemeClr>
-          </a:lnRef>
-          <a:fillRef idx="1">
-            <a:schemeClr val="accent1"/>
-          </a:fillRef>
-          <a:effectRef idx="0">
-            <a:schemeClr val="accent1"/>
-          </a:effectRef>
-          <a:fontRef idx="minor">
-            <a:schemeClr val="lt1"/>
-          </a:fontRef>
-        </p:style>
-        <p:txBody>
-          <a:bodyPr rtlCol="0" anchor="ctr"/>
-          <a:lstStyle/>
-          <a:p>
-            <a:pPr algn="ctr"/>
-            <a:endParaRPr lang="en-US" dirty="0">
-              <a:solidFill>
-                <a:schemeClr val="tx1"/>
-              </a:solidFill>
-            </a:endParaRPr>
-          </a:p>
-        </p:txBody>
-      </p:sp>
-      <p:sp>
-        <p:nvSpPr>
-          <p:cNvPr id="8" name="Rounded Rectangle 7">
-            <a:extLst>
-              <a:ext uri="{FF2B5EF4-FFF2-40B4-BE49-F238E27FC236}">
-                <a16:creationId xmlns:a16="http://schemas.microsoft.com/office/drawing/2014/main" id="{369AC178-BF9D-4745-90F0-6149144DD9BF}"/>
-              </a:ext>
-            </a:extLst>
-          </p:cNvPr>
-          <p:cNvSpPr/>
-          <p:nvPr/>
-        </p:nvSpPr>
-        <p:spPr>
-          <a:xfrm>
-            <a:off x="3255737" y="2061399"/>
+            <a:off x="2125620" y="1895181"/>
             <a:ext cx="1170215" cy="674914"/>
           </a:xfrm>
           <a:prstGeom prst="roundRect">
@@ -40121,7 +39996,7 @@
         </p:nvSpPr>
         <p:spPr>
           <a:xfrm>
-            <a:off x="3788146" y="2739733"/>
+            <a:off x="2048327" y="2577914"/>
             <a:ext cx="700833" cy="369332"/>
           </a:xfrm>
           <a:prstGeom prst="rect">
@@ -41079,7 +40954,7 @@
         </p:nvSpPr>
         <p:spPr>
           <a:xfrm>
-            <a:off x="3356577" y="1466858"/>
+            <a:off x="2900400" y="1484710"/>
             <a:ext cx="968535" cy="369332"/>
           </a:xfrm>
           <a:prstGeom prst="rect">
@@ -42077,10 +41952,3741 @@
           </a:prstGeom>
         </p:spPr>
       </p:pic>
+      <p:sp>
+        <p:nvSpPr>
+          <p:cNvPr id="69" name="Rounded Rectangle 68">
+            <a:extLst>
+              <a:ext uri="{FF2B5EF4-FFF2-40B4-BE49-F238E27FC236}">
+                <a16:creationId xmlns:a16="http://schemas.microsoft.com/office/drawing/2014/main" id="{F2BF00B8-F8AC-9547-9C40-0A1BE0E4F8BE}"/>
+              </a:ext>
+            </a:extLst>
+          </p:cNvPr>
+          <p:cNvSpPr/>
+          <p:nvPr/>
+        </p:nvSpPr>
+        <p:spPr>
+          <a:xfrm>
+            <a:off x="3425792" y="1895181"/>
+            <a:ext cx="1170215" cy="674914"/>
+          </a:xfrm>
+          <a:prstGeom prst="roundRect">
+            <a:avLst/>
+          </a:prstGeom>
+          <a:solidFill>
+            <a:schemeClr val="accent1">
+              <a:lumMod val="75000"/>
+            </a:schemeClr>
+          </a:solidFill>
+          <a:ln w="19050">
+            <a:solidFill>
+              <a:schemeClr val="accent1">
+                <a:lumMod val="50000"/>
+              </a:schemeClr>
+            </a:solidFill>
+          </a:ln>
+        </p:spPr>
+        <p:style>
+          <a:lnRef idx="2">
+            <a:schemeClr val="accent1">
+              <a:shade val="50000"/>
+            </a:schemeClr>
+          </a:lnRef>
+          <a:fillRef idx="1">
+            <a:schemeClr val="accent1"/>
+          </a:fillRef>
+          <a:effectRef idx="0">
+            <a:schemeClr val="accent1"/>
+          </a:effectRef>
+          <a:fontRef idx="minor">
+            <a:schemeClr val="lt1"/>
+          </a:fontRef>
+        </p:style>
+        <p:txBody>
+          <a:bodyPr rtlCol="0" anchor="ctr"/>
+          <a:lstStyle/>
+          <a:p>
+            <a:pPr algn="ctr"/>
+            <a:r>
+              <a:rPr lang="en-US" dirty="0">
+                <a:solidFill>
+                  <a:schemeClr val="bg1"/>
+                </a:solidFill>
+              </a:rPr>
+              <a:t>v1.0</a:t>
+            </a:r>
+          </a:p>
+        </p:txBody>
+      </p:sp>
+      <p:cxnSp>
+        <p:nvCxnSpPr>
+          <p:cNvPr id="70" name="Elbow Connector 69">
+            <a:extLst>
+              <a:ext uri="{FF2B5EF4-FFF2-40B4-BE49-F238E27FC236}">
+                <a16:creationId xmlns:a16="http://schemas.microsoft.com/office/drawing/2014/main" id="{94C4B32C-F87C-0C4E-B995-FF5966ADB04F}"/>
+              </a:ext>
+            </a:extLst>
+          </p:cNvPr>
+          <p:cNvCxnSpPr>
+            <a:cxnSpLocks/>
+            <a:stCxn id="72" idx="3"/>
+            <a:endCxn id="69" idx="2"/>
+          </p:cNvCxnSpPr>
+          <p:nvPr/>
+        </p:nvCxnSpPr>
+        <p:spPr>
+          <a:xfrm flipV="1">
+            <a:off x="3082712" y="2570095"/>
+            <a:ext cx="928188" cy="892359"/>
+          </a:xfrm>
+          <a:prstGeom prst="bentConnector2">
+            <a:avLst/>
+          </a:prstGeom>
+          <a:ln w="38100">
+            <a:solidFill>
+              <a:schemeClr val="accent4">
+                <a:lumMod val="50000"/>
+              </a:schemeClr>
+            </a:solidFill>
+            <a:tailEnd type="triangle"/>
+          </a:ln>
+        </p:spPr>
+        <p:style>
+          <a:lnRef idx="1">
+            <a:schemeClr val="accent1"/>
+          </a:lnRef>
+          <a:fillRef idx="0">
+            <a:schemeClr val="accent1"/>
+          </a:fillRef>
+          <a:effectRef idx="0">
+            <a:schemeClr val="accent1"/>
+          </a:effectRef>
+          <a:fontRef idx="minor">
+            <a:schemeClr val="tx1"/>
+          </a:fontRef>
+        </p:style>
+      </p:cxnSp>
+      <p:sp>
+        <p:nvSpPr>
+          <p:cNvPr id="74" name="TextBox 73">
+            <a:extLst>
+              <a:ext uri="{FF2B5EF4-FFF2-40B4-BE49-F238E27FC236}">
+                <a16:creationId xmlns:a16="http://schemas.microsoft.com/office/drawing/2014/main" id="{2C1DF5F9-6740-0940-BF53-779A87DD4E0C}"/>
+              </a:ext>
+            </a:extLst>
+          </p:cNvPr>
+          <p:cNvSpPr txBox="1"/>
+          <p:nvPr/>
+        </p:nvSpPr>
+        <p:spPr>
+          <a:xfrm>
+            <a:off x="3979187" y="2561130"/>
+            <a:ext cx="693311" cy="369332"/>
+          </a:xfrm>
+          <a:prstGeom prst="rect">
+            <a:avLst/>
+          </a:prstGeom>
+          <a:noFill/>
+        </p:spPr>
+        <p:txBody>
+          <a:bodyPr wrap="square" rtlCol="0">
+            <a:spAutoFit/>
+          </a:bodyPr>
+          <a:lstStyle/>
+          <a:p>
+            <a:pPr algn="ctr"/>
+            <a:r>
+              <a:rPr lang="en-US" dirty="0"/>
+              <a:t>60%</a:t>
+            </a:r>
+          </a:p>
+        </p:txBody>
+      </p:sp>
     </p:spTree>
     <p:extLst>
       <p:ext uri="{BB962C8B-B14F-4D97-AF65-F5344CB8AC3E}">
         <p14:creationId xmlns:p14="http://schemas.microsoft.com/office/powerpoint/2010/main" val="5495572"/>
+      </p:ext>
+    </p:extLst>
+  </p:cSld>
+  <p:clrMapOvr>
+    <a:masterClrMapping/>
+  </p:clrMapOvr>
+</p:sld>
+</file>
+
+<file path=ppt/slides/slide24.xml><?xml version="1.0" encoding="utf-8"?>
+<p:sld xmlns:a="http://schemas.openxmlformats.org/drawingml/2006/main" xmlns:r="http://schemas.openxmlformats.org/officeDocument/2006/relationships" xmlns:p="http://schemas.openxmlformats.org/presentationml/2006/main">
+  <p:cSld>
+    <p:spTree>
+      <p:nvGrpSpPr>
+        <p:cNvPr id="1" name=""/>
+        <p:cNvGrpSpPr/>
+        <p:nvPr/>
+      </p:nvGrpSpPr>
+      <p:grpSpPr>
+        <a:xfrm>
+          <a:off x="0" y="0"/>
+          <a:ext cx="0" cy="0"/>
+          <a:chOff x="0" y="0"/>
+          <a:chExt cx="0" cy="0"/>
+        </a:xfrm>
+      </p:grpSpPr>
+      <p:sp>
+        <p:nvSpPr>
+          <p:cNvPr id="11" name="Rectangle 10">
+            <a:extLst>
+              <a:ext uri="{FF2B5EF4-FFF2-40B4-BE49-F238E27FC236}">
+                <a16:creationId xmlns:a16="http://schemas.microsoft.com/office/drawing/2014/main" id="{65137B27-89CA-7447-8A02-1607A375D4DA}"/>
+              </a:ext>
+            </a:extLst>
+          </p:cNvPr>
+          <p:cNvSpPr/>
+          <p:nvPr/>
+        </p:nvSpPr>
+        <p:spPr>
+          <a:xfrm>
+            <a:off x="0" y="1086522"/>
+            <a:ext cx="12191999" cy="5077610"/>
+          </a:xfrm>
+          <a:prstGeom prst="rect">
+            <a:avLst/>
+          </a:prstGeom>
+          <a:solidFill>
+            <a:schemeClr val="bg1"/>
+          </a:solidFill>
+          <a:ln>
+            <a:solidFill>
+              <a:schemeClr val="bg1"/>
+            </a:solidFill>
+          </a:ln>
+        </p:spPr>
+        <p:style>
+          <a:lnRef idx="2">
+            <a:schemeClr val="accent1">
+              <a:shade val="50000"/>
+            </a:schemeClr>
+          </a:lnRef>
+          <a:fillRef idx="1">
+            <a:schemeClr val="accent1"/>
+          </a:fillRef>
+          <a:effectRef idx="0">
+            <a:schemeClr val="accent1"/>
+          </a:effectRef>
+          <a:fontRef idx="minor">
+            <a:schemeClr val="lt1"/>
+          </a:fontRef>
+        </p:style>
+        <p:txBody>
+          <a:bodyPr rtlCol="0" anchor="ctr"/>
+          <a:lstStyle/>
+          <a:p>
+            <a:pPr algn="ctr"/>
+            <a:endParaRPr lang="en-US" dirty="0"/>
+          </a:p>
+        </p:txBody>
+      </p:sp>
+      <p:sp>
+        <p:nvSpPr>
+          <p:cNvPr id="10" name="TextBox 9">
+            <a:extLst>
+              <a:ext uri="{FF2B5EF4-FFF2-40B4-BE49-F238E27FC236}">
+                <a16:creationId xmlns:a16="http://schemas.microsoft.com/office/drawing/2014/main" id="{AA0E52A5-8109-5744-8F63-4D4AE2E6294B}"/>
+              </a:ext>
+            </a:extLst>
+          </p:cNvPr>
+          <p:cNvSpPr txBox="1"/>
+          <p:nvPr/>
+        </p:nvSpPr>
+        <p:spPr>
+          <a:xfrm>
+            <a:off x="775252" y="89452"/>
+            <a:ext cx="184731" cy="369332"/>
+          </a:xfrm>
+          <a:prstGeom prst="rect">
+            <a:avLst/>
+          </a:prstGeom>
+          <a:noFill/>
+        </p:spPr>
+        <p:txBody>
+          <a:bodyPr wrap="none" rtlCol="0">
+            <a:spAutoFit/>
+          </a:bodyPr>
+          <a:lstStyle/>
+          <a:p>
+            <a:endParaRPr lang="en-US" dirty="0"/>
+          </a:p>
+        </p:txBody>
+      </p:sp>
+      <p:sp>
+        <p:nvSpPr>
+          <p:cNvPr id="100" name="Rounded Rectangle 99">
+            <a:extLst>
+              <a:ext uri="{FF2B5EF4-FFF2-40B4-BE49-F238E27FC236}">
+                <a16:creationId xmlns:a16="http://schemas.microsoft.com/office/drawing/2014/main" id="{B819D5F6-78E5-9845-9F41-90858B3A04DA}"/>
+              </a:ext>
+            </a:extLst>
+          </p:cNvPr>
+          <p:cNvSpPr/>
+          <p:nvPr/>
+        </p:nvSpPr>
+        <p:spPr>
+          <a:xfrm>
+            <a:off x="8384562" y="4026533"/>
+            <a:ext cx="1170215" cy="674914"/>
+          </a:xfrm>
+          <a:prstGeom prst="roundRect">
+            <a:avLst/>
+          </a:prstGeom>
+          <a:solidFill>
+            <a:schemeClr val="accent6">
+              <a:lumMod val="40000"/>
+              <a:lumOff val="60000"/>
+            </a:schemeClr>
+          </a:solidFill>
+          <a:ln w="19050">
+            <a:solidFill>
+              <a:schemeClr val="accent6">
+                <a:lumMod val="50000"/>
+              </a:schemeClr>
+            </a:solidFill>
+          </a:ln>
+        </p:spPr>
+        <p:style>
+          <a:lnRef idx="2">
+            <a:schemeClr val="accent1">
+              <a:shade val="50000"/>
+            </a:schemeClr>
+          </a:lnRef>
+          <a:fillRef idx="1">
+            <a:schemeClr val="accent1"/>
+          </a:fillRef>
+          <a:effectRef idx="0">
+            <a:schemeClr val="accent1"/>
+          </a:effectRef>
+          <a:fontRef idx="minor">
+            <a:schemeClr val="lt1"/>
+          </a:fontRef>
+        </p:style>
+        <p:txBody>
+          <a:bodyPr rtlCol="0" anchor="ctr"/>
+          <a:lstStyle/>
+          <a:p>
+            <a:pPr algn="ctr"/>
+            <a:endParaRPr lang="en-US" dirty="0">
+              <a:solidFill>
+                <a:schemeClr val="tx1"/>
+              </a:solidFill>
+            </a:endParaRPr>
+          </a:p>
+        </p:txBody>
+      </p:sp>
+      <p:sp>
+        <p:nvSpPr>
+          <p:cNvPr id="44" name="Rounded Rectangle 43">
+            <a:extLst>
+              <a:ext uri="{FF2B5EF4-FFF2-40B4-BE49-F238E27FC236}">
+                <a16:creationId xmlns:a16="http://schemas.microsoft.com/office/drawing/2014/main" id="{39941F14-A3FD-964D-BC7E-C6F3E4437826}"/>
+              </a:ext>
+            </a:extLst>
+          </p:cNvPr>
+          <p:cNvSpPr/>
+          <p:nvPr/>
+        </p:nvSpPr>
+        <p:spPr>
+          <a:xfrm>
+            <a:off x="5879085" y="4147864"/>
+            <a:ext cx="1170215" cy="674914"/>
+          </a:xfrm>
+          <a:prstGeom prst="roundRect">
+            <a:avLst/>
+          </a:prstGeom>
+          <a:solidFill>
+            <a:schemeClr val="accent6">
+              <a:lumMod val="60000"/>
+              <a:lumOff val="40000"/>
+            </a:schemeClr>
+          </a:solidFill>
+          <a:ln w="19050">
+            <a:solidFill>
+              <a:schemeClr val="accent6">
+                <a:lumMod val="50000"/>
+              </a:schemeClr>
+            </a:solidFill>
+          </a:ln>
+        </p:spPr>
+        <p:style>
+          <a:lnRef idx="2">
+            <a:schemeClr val="accent1">
+              <a:shade val="50000"/>
+            </a:schemeClr>
+          </a:lnRef>
+          <a:fillRef idx="1">
+            <a:schemeClr val="accent1"/>
+          </a:fillRef>
+          <a:effectRef idx="0">
+            <a:schemeClr val="accent1"/>
+          </a:effectRef>
+          <a:fontRef idx="minor">
+            <a:schemeClr val="lt1"/>
+          </a:fontRef>
+        </p:style>
+        <p:txBody>
+          <a:bodyPr rtlCol="0" anchor="ctr"/>
+          <a:lstStyle/>
+          <a:p>
+            <a:pPr algn="ctr"/>
+            <a:endParaRPr lang="en-US" dirty="0">
+              <a:solidFill>
+                <a:schemeClr val="tx1"/>
+              </a:solidFill>
+            </a:endParaRPr>
+          </a:p>
+        </p:txBody>
+      </p:sp>
+      <p:sp>
+        <p:nvSpPr>
+          <p:cNvPr id="49" name="Curved Up Arrow 48">
+            <a:extLst>
+              <a:ext uri="{FF2B5EF4-FFF2-40B4-BE49-F238E27FC236}">
+                <a16:creationId xmlns:a16="http://schemas.microsoft.com/office/drawing/2014/main" id="{9032B92A-EEF1-494C-8F0A-2105CC0E5CD2}"/>
+              </a:ext>
+            </a:extLst>
+          </p:cNvPr>
+          <p:cNvSpPr/>
+          <p:nvPr/>
+        </p:nvSpPr>
+        <p:spPr>
+          <a:xfrm>
+            <a:off x="4940250" y="2929053"/>
+            <a:ext cx="1354197" cy="397329"/>
+          </a:xfrm>
+          <a:prstGeom prst="curvedUpArrow">
+            <a:avLst>
+              <a:gd name="adj1" fmla="val 13236"/>
+              <a:gd name="adj2" fmla="val 50000"/>
+              <a:gd name="adj3" fmla="val 25000"/>
+            </a:avLst>
+          </a:prstGeom>
+          <a:solidFill>
+            <a:schemeClr val="accent1">
+              <a:lumMod val="75000"/>
+            </a:schemeClr>
+          </a:solidFill>
+          <a:ln>
+            <a:solidFill>
+              <a:schemeClr val="accent1">
+                <a:lumMod val="50000"/>
+              </a:schemeClr>
+            </a:solidFill>
+          </a:ln>
+        </p:spPr>
+        <p:style>
+          <a:lnRef idx="2">
+            <a:schemeClr val="accent1">
+              <a:shade val="50000"/>
+            </a:schemeClr>
+          </a:lnRef>
+          <a:fillRef idx="1">
+            <a:schemeClr val="accent1"/>
+          </a:fillRef>
+          <a:effectRef idx="0">
+            <a:schemeClr val="accent1"/>
+          </a:effectRef>
+          <a:fontRef idx="minor">
+            <a:schemeClr val="lt1"/>
+          </a:fontRef>
+        </p:style>
+        <p:txBody>
+          <a:bodyPr rtlCol="0" anchor="ctr"/>
+          <a:lstStyle/>
+          <a:p>
+            <a:pPr algn="ctr"/>
+            <a:endParaRPr lang="en-US">
+              <a:solidFill>
+                <a:schemeClr val="tx1"/>
+              </a:solidFill>
+            </a:endParaRPr>
+          </a:p>
+        </p:txBody>
+      </p:sp>
+      <p:sp>
+        <p:nvSpPr>
+          <p:cNvPr id="25" name="Curved Up Arrow 24">
+            <a:extLst>
+              <a:ext uri="{FF2B5EF4-FFF2-40B4-BE49-F238E27FC236}">
+                <a16:creationId xmlns:a16="http://schemas.microsoft.com/office/drawing/2014/main" id="{1FF45074-0E5F-054D-85A5-7401CA561CAD}"/>
+              </a:ext>
+            </a:extLst>
+          </p:cNvPr>
+          <p:cNvSpPr/>
+          <p:nvPr/>
+        </p:nvSpPr>
+        <p:spPr>
+          <a:xfrm>
+            <a:off x="1587532" y="2621067"/>
+            <a:ext cx="1545831" cy="705316"/>
+          </a:xfrm>
+          <a:prstGeom prst="curvedUpArrow">
+            <a:avLst>
+              <a:gd name="adj1" fmla="val 13236"/>
+              <a:gd name="adj2" fmla="val 50000"/>
+              <a:gd name="adj3" fmla="val 25000"/>
+            </a:avLst>
+          </a:prstGeom>
+          <a:solidFill>
+            <a:schemeClr val="accent1">
+              <a:lumMod val="75000"/>
+            </a:schemeClr>
+          </a:solidFill>
+          <a:ln>
+            <a:solidFill>
+              <a:schemeClr val="accent1">
+                <a:lumMod val="50000"/>
+              </a:schemeClr>
+            </a:solidFill>
+          </a:ln>
+        </p:spPr>
+        <p:style>
+          <a:lnRef idx="2">
+            <a:schemeClr val="accent1">
+              <a:shade val="50000"/>
+            </a:schemeClr>
+          </a:lnRef>
+          <a:fillRef idx="1">
+            <a:schemeClr val="accent1"/>
+          </a:fillRef>
+          <a:effectRef idx="0">
+            <a:schemeClr val="accent1"/>
+          </a:effectRef>
+          <a:fontRef idx="minor">
+            <a:schemeClr val="lt1"/>
+          </a:fontRef>
+        </p:style>
+        <p:txBody>
+          <a:bodyPr rtlCol="0" anchor="ctr"/>
+          <a:lstStyle/>
+          <a:p>
+            <a:pPr algn="ctr"/>
+            <a:endParaRPr lang="en-US">
+              <a:solidFill>
+                <a:schemeClr val="tx1"/>
+              </a:solidFill>
+            </a:endParaRPr>
+          </a:p>
+        </p:txBody>
+      </p:sp>
+      <p:sp>
+        <p:nvSpPr>
+          <p:cNvPr id="5" name="TextBox 4">
+            <a:extLst>
+              <a:ext uri="{FF2B5EF4-FFF2-40B4-BE49-F238E27FC236}">
+                <a16:creationId xmlns:a16="http://schemas.microsoft.com/office/drawing/2014/main" id="{2129025F-2A6A-8748-B81D-BDF446C06291}"/>
+              </a:ext>
+            </a:extLst>
+          </p:cNvPr>
+          <p:cNvSpPr txBox="1"/>
+          <p:nvPr/>
+        </p:nvSpPr>
+        <p:spPr>
+          <a:xfrm>
+            <a:off x="1619543" y="3879346"/>
+            <a:ext cx="1987595" cy="369332"/>
+          </a:xfrm>
+          <a:prstGeom prst="rect">
+            <a:avLst/>
+          </a:prstGeom>
+          <a:noFill/>
+        </p:spPr>
+        <p:txBody>
+          <a:bodyPr wrap="none" rtlCol="0">
+            <a:spAutoFit/>
+          </a:bodyPr>
+          <a:lstStyle/>
+          <a:p>
+            <a:r>
+              <a:rPr lang="en-US" dirty="0"/>
+              <a:t>Istio Virtual Service</a:t>
+            </a:r>
+          </a:p>
+        </p:txBody>
+      </p:sp>
+      <p:sp>
+        <p:nvSpPr>
+          <p:cNvPr id="18" name="Rounded Rectangle 17">
+            <a:extLst>
+              <a:ext uri="{FF2B5EF4-FFF2-40B4-BE49-F238E27FC236}">
+                <a16:creationId xmlns:a16="http://schemas.microsoft.com/office/drawing/2014/main" id="{44650791-EEEC-2549-BC4D-1C04E4010439}"/>
+              </a:ext>
+            </a:extLst>
+          </p:cNvPr>
+          <p:cNvSpPr/>
+          <p:nvPr/>
+        </p:nvSpPr>
+        <p:spPr>
+          <a:xfrm>
+            <a:off x="3255737" y="4272676"/>
+            <a:ext cx="1170215" cy="674914"/>
+          </a:xfrm>
+          <a:prstGeom prst="roundRect">
+            <a:avLst/>
+          </a:prstGeom>
+          <a:solidFill>
+            <a:schemeClr val="accent6">
+              <a:lumMod val="75000"/>
+            </a:schemeClr>
+          </a:solidFill>
+          <a:ln w="19050">
+            <a:solidFill>
+              <a:schemeClr val="accent6">
+                <a:lumMod val="50000"/>
+              </a:schemeClr>
+            </a:solidFill>
+          </a:ln>
+        </p:spPr>
+        <p:style>
+          <a:lnRef idx="2">
+            <a:schemeClr val="accent1">
+              <a:shade val="50000"/>
+            </a:schemeClr>
+          </a:lnRef>
+          <a:fillRef idx="1">
+            <a:schemeClr val="accent1"/>
+          </a:fillRef>
+          <a:effectRef idx="0">
+            <a:schemeClr val="accent1"/>
+          </a:effectRef>
+          <a:fontRef idx="minor">
+            <a:schemeClr val="lt1"/>
+          </a:fontRef>
+        </p:style>
+        <p:txBody>
+          <a:bodyPr rtlCol="0" anchor="ctr"/>
+          <a:lstStyle/>
+          <a:p>
+            <a:pPr algn="ctr"/>
+            <a:r>
+              <a:rPr lang="en-US" dirty="0">
+                <a:solidFill>
+                  <a:schemeClr val="bg1"/>
+                </a:solidFill>
+              </a:rPr>
+              <a:t>v2.0</a:t>
+            </a:r>
+          </a:p>
+        </p:txBody>
+      </p:sp>
+      <p:sp>
+        <p:nvSpPr>
+          <p:cNvPr id="29" name="Rounded Rectangle 28">
+            <a:extLst>
+              <a:ext uri="{FF2B5EF4-FFF2-40B4-BE49-F238E27FC236}">
+                <a16:creationId xmlns:a16="http://schemas.microsoft.com/office/drawing/2014/main" id="{268C8C7B-9178-D948-AD10-9E84F02C0139}"/>
+              </a:ext>
+            </a:extLst>
+          </p:cNvPr>
+          <p:cNvSpPr/>
+          <p:nvPr/>
+        </p:nvSpPr>
+        <p:spPr>
+          <a:xfrm>
+            <a:off x="2272511" y="3091099"/>
+            <a:ext cx="689886" cy="618939"/>
+          </a:xfrm>
+          <a:prstGeom prst="roundRect">
+            <a:avLst/>
+          </a:prstGeom>
+          <a:solidFill>
+            <a:schemeClr val="bg1"/>
+          </a:solidFill>
+          <a:ln>
+            <a:solidFill>
+              <a:schemeClr val="bg1"/>
+            </a:solidFill>
+          </a:ln>
+        </p:spPr>
+        <p:style>
+          <a:lnRef idx="2">
+            <a:schemeClr val="accent1">
+              <a:shade val="50000"/>
+            </a:schemeClr>
+          </a:lnRef>
+          <a:fillRef idx="1">
+            <a:schemeClr val="accent1"/>
+          </a:fillRef>
+          <a:effectRef idx="0">
+            <a:schemeClr val="accent1"/>
+          </a:effectRef>
+          <a:fontRef idx="minor">
+            <a:schemeClr val="lt1"/>
+          </a:fontRef>
+        </p:style>
+        <p:txBody>
+          <a:bodyPr rtlCol="0" anchor="ctr"/>
+          <a:lstStyle/>
+          <a:p>
+            <a:pPr algn="ctr"/>
+            <a:endParaRPr lang="en-US"/>
+          </a:p>
+        </p:txBody>
+      </p:sp>
+      <p:pic>
+        <p:nvPicPr>
+          <p:cNvPr id="31" name="Graphic 30" descr="School boy">
+            <a:extLst>
+              <a:ext uri="{FF2B5EF4-FFF2-40B4-BE49-F238E27FC236}">
+                <a16:creationId xmlns:a16="http://schemas.microsoft.com/office/drawing/2014/main" id="{23C14CCA-0229-0945-AD1D-3EA26AB7C249}"/>
+              </a:ext>
+            </a:extLst>
+          </p:cNvPr>
+          <p:cNvPicPr>
+            <a:picLocks noChangeAspect="1"/>
+          </p:cNvPicPr>
+          <p:nvPr/>
+        </p:nvPicPr>
+        <p:blipFill>
+          <a:blip r:embed="rId2">
+            <a:extLst>
+              <a:ext uri="{96DAC541-7B7A-43D3-8B79-37D633B846F1}">
+                <asvg:svgBlip xmlns:asvg="http://schemas.microsoft.com/office/drawing/2016/SVG/main" r:embed="rId3"/>
+              </a:ext>
+            </a:extLst>
+          </a:blip>
+          <a:stretch>
+            <a:fillRect/>
+          </a:stretch>
+        </p:blipFill>
+        <p:spPr>
+          <a:xfrm>
+            <a:off x="675960" y="2077876"/>
+            <a:ext cx="548640" cy="548640"/>
+          </a:xfrm>
+          <a:prstGeom prst="rect">
+            <a:avLst/>
+          </a:prstGeom>
+        </p:spPr>
+      </p:pic>
+      <p:pic>
+        <p:nvPicPr>
+          <p:cNvPr id="32" name="Graphic 31" descr="Female Profile">
+            <a:extLst>
+              <a:ext uri="{FF2B5EF4-FFF2-40B4-BE49-F238E27FC236}">
+                <a16:creationId xmlns:a16="http://schemas.microsoft.com/office/drawing/2014/main" id="{FB0AD0DD-5F7D-7542-96A5-78D8D8B5C0C9}"/>
+              </a:ext>
+            </a:extLst>
+          </p:cNvPr>
+          <p:cNvPicPr>
+            <a:picLocks noChangeAspect="1"/>
+          </p:cNvPicPr>
+          <p:nvPr/>
+        </p:nvPicPr>
+        <p:blipFill>
+          <a:blip r:embed="rId4">
+            <a:extLst>
+              <a:ext uri="{96DAC541-7B7A-43D3-8B79-37D633B846F1}">
+                <asvg:svgBlip xmlns:asvg="http://schemas.microsoft.com/office/drawing/2016/SVG/main" r:embed="rId5"/>
+              </a:ext>
+            </a:extLst>
+          </a:blip>
+          <a:stretch>
+            <a:fillRect/>
+          </a:stretch>
+        </p:blipFill>
+        <p:spPr>
+          <a:xfrm>
+            <a:off x="162689" y="2894177"/>
+            <a:ext cx="548640" cy="548640"/>
+          </a:xfrm>
+          <a:prstGeom prst="rect">
+            <a:avLst/>
+          </a:prstGeom>
+        </p:spPr>
+      </p:pic>
+      <p:pic>
+        <p:nvPicPr>
+          <p:cNvPr id="33" name="Graphic 32" descr="School boy">
+            <a:extLst>
+              <a:ext uri="{FF2B5EF4-FFF2-40B4-BE49-F238E27FC236}">
+                <a16:creationId xmlns:a16="http://schemas.microsoft.com/office/drawing/2014/main" id="{DB43DC05-529E-D441-A524-D0B30D5D4E06}"/>
+              </a:ext>
+            </a:extLst>
+          </p:cNvPr>
+          <p:cNvPicPr>
+            <a:picLocks noChangeAspect="1"/>
+          </p:cNvPicPr>
+          <p:nvPr/>
+        </p:nvPicPr>
+        <p:blipFill>
+          <a:blip r:embed="rId6">
+            <a:extLst>
+              <a:ext uri="{96DAC541-7B7A-43D3-8B79-37D633B846F1}">
+                <asvg:svgBlip xmlns:asvg="http://schemas.microsoft.com/office/drawing/2016/SVG/main" r:embed="rId7"/>
+              </a:ext>
+            </a:extLst>
+          </a:blip>
+          <a:stretch>
+            <a:fillRect/>
+          </a:stretch>
+        </p:blipFill>
+        <p:spPr>
+          <a:xfrm>
+            <a:off x="625309" y="2552062"/>
+            <a:ext cx="548640" cy="548640"/>
+          </a:xfrm>
+          <a:prstGeom prst="rect">
+            <a:avLst/>
+          </a:prstGeom>
+        </p:spPr>
+      </p:pic>
+      <p:pic>
+        <p:nvPicPr>
+          <p:cNvPr id="34" name="Graphic 33" descr="Female Profile">
+            <a:extLst>
+              <a:ext uri="{FF2B5EF4-FFF2-40B4-BE49-F238E27FC236}">
+                <a16:creationId xmlns:a16="http://schemas.microsoft.com/office/drawing/2014/main" id="{44118B0F-5F5C-104D-89F1-FF4F0677B581}"/>
+              </a:ext>
+            </a:extLst>
+          </p:cNvPr>
+          <p:cNvPicPr>
+            <a:picLocks noChangeAspect="1"/>
+          </p:cNvPicPr>
+          <p:nvPr/>
+        </p:nvPicPr>
+        <p:blipFill>
+          <a:blip r:embed="rId8">
+            <a:extLst>
+              <a:ext uri="{96DAC541-7B7A-43D3-8B79-37D633B846F1}">
+                <asvg:svgBlip xmlns:asvg="http://schemas.microsoft.com/office/drawing/2016/SVG/main" r:embed="rId9"/>
+              </a:ext>
+            </a:extLst>
+          </a:blip>
+          <a:stretch>
+            <a:fillRect/>
+          </a:stretch>
+        </p:blipFill>
+        <p:spPr>
+          <a:xfrm>
+            <a:off x="198983" y="1972026"/>
+            <a:ext cx="548640" cy="548640"/>
+          </a:xfrm>
+          <a:prstGeom prst="rect">
+            <a:avLst/>
+          </a:prstGeom>
+        </p:spPr>
+      </p:pic>
+      <p:pic>
+        <p:nvPicPr>
+          <p:cNvPr id="35" name="Graphic 34" descr="School girl">
+            <a:extLst>
+              <a:ext uri="{FF2B5EF4-FFF2-40B4-BE49-F238E27FC236}">
+                <a16:creationId xmlns:a16="http://schemas.microsoft.com/office/drawing/2014/main" id="{38748C23-E12A-E34D-8964-5C6C40FF9564}"/>
+              </a:ext>
+            </a:extLst>
+          </p:cNvPr>
+          <p:cNvPicPr>
+            <a:picLocks noChangeAspect="1"/>
+          </p:cNvPicPr>
+          <p:nvPr/>
+        </p:nvPicPr>
+        <p:blipFill>
+          <a:blip r:embed="rId10">
+            <a:extLst>
+              <a:ext uri="{96DAC541-7B7A-43D3-8B79-37D633B846F1}">
+                <asvg:svgBlip xmlns:asvg="http://schemas.microsoft.com/office/drawing/2016/SVG/main" r:embed="rId11"/>
+              </a:ext>
+            </a:extLst>
+          </a:blip>
+          <a:stretch>
+            <a:fillRect/>
+          </a:stretch>
+        </p:blipFill>
+        <p:spPr>
+          <a:xfrm>
+            <a:off x="284313" y="2381261"/>
+            <a:ext cx="548640" cy="548640"/>
+          </a:xfrm>
+          <a:prstGeom prst="rect">
+            <a:avLst/>
+          </a:prstGeom>
+        </p:spPr>
+      </p:pic>
+      <p:pic>
+        <p:nvPicPr>
+          <p:cNvPr id="36" name="Graphic 35" descr="School girl">
+            <a:extLst>
+              <a:ext uri="{FF2B5EF4-FFF2-40B4-BE49-F238E27FC236}">
+                <a16:creationId xmlns:a16="http://schemas.microsoft.com/office/drawing/2014/main" id="{C2C55299-2E10-C44A-BC63-4DFDA1A799E2}"/>
+              </a:ext>
+            </a:extLst>
+          </p:cNvPr>
+          <p:cNvPicPr>
+            <a:picLocks noChangeAspect="1"/>
+          </p:cNvPicPr>
+          <p:nvPr/>
+        </p:nvPicPr>
+        <p:blipFill>
+          <a:blip r:embed="rId12">
+            <a:extLst>
+              <a:ext uri="{96DAC541-7B7A-43D3-8B79-37D633B846F1}">
+                <asvg:svgBlip xmlns:asvg="http://schemas.microsoft.com/office/drawing/2016/SVG/main" r:embed="rId13"/>
+              </a:ext>
+            </a:extLst>
+          </a:blip>
+          <a:stretch>
+            <a:fillRect/>
+          </a:stretch>
+        </p:blipFill>
+        <p:spPr>
+          <a:xfrm>
+            <a:off x="1637666" y="2395742"/>
+            <a:ext cx="548640" cy="548640"/>
+          </a:xfrm>
+          <a:prstGeom prst="rect">
+            <a:avLst/>
+          </a:prstGeom>
+        </p:spPr>
+      </p:pic>
+      <p:pic>
+        <p:nvPicPr>
+          <p:cNvPr id="37" name="Graphic 36" descr="User">
+            <a:extLst>
+              <a:ext uri="{FF2B5EF4-FFF2-40B4-BE49-F238E27FC236}">
+                <a16:creationId xmlns:a16="http://schemas.microsoft.com/office/drawing/2014/main" id="{6FA18981-96F5-2C4E-9FD2-0E3D37F43798}"/>
+              </a:ext>
+            </a:extLst>
+          </p:cNvPr>
+          <p:cNvPicPr>
+            <a:picLocks noChangeAspect="1"/>
+          </p:cNvPicPr>
+          <p:nvPr/>
+        </p:nvPicPr>
+        <p:blipFill>
+          <a:blip r:embed="rId14">
+            <a:extLst>
+              <a:ext uri="{96DAC541-7B7A-43D3-8B79-37D633B846F1}">
+                <asvg:svgBlip xmlns:asvg="http://schemas.microsoft.com/office/drawing/2016/SVG/main" r:embed="rId15"/>
+              </a:ext>
+            </a:extLst>
+          </a:blip>
+          <a:stretch>
+            <a:fillRect/>
+          </a:stretch>
+        </p:blipFill>
+        <p:spPr>
+          <a:xfrm>
+            <a:off x="404891" y="3784365"/>
+            <a:ext cx="548640" cy="548640"/>
+          </a:xfrm>
+          <a:prstGeom prst="rect">
+            <a:avLst/>
+          </a:prstGeom>
+        </p:spPr>
+      </p:pic>
+      <p:pic>
+        <p:nvPicPr>
+          <p:cNvPr id="39" name="Graphic 38" descr="Male profile">
+            <a:extLst>
+              <a:ext uri="{FF2B5EF4-FFF2-40B4-BE49-F238E27FC236}">
+                <a16:creationId xmlns:a16="http://schemas.microsoft.com/office/drawing/2014/main" id="{C31BA2FA-0346-AF4E-9947-474BCEEA1E1A}"/>
+              </a:ext>
+            </a:extLst>
+          </p:cNvPr>
+          <p:cNvPicPr>
+            <a:picLocks noChangeAspect="1"/>
+          </p:cNvPicPr>
+          <p:nvPr/>
+        </p:nvPicPr>
+        <p:blipFill>
+          <a:blip r:embed="rId16">
+            <a:extLst>
+              <a:ext uri="{96DAC541-7B7A-43D3-8B79-37D633B846F1}">
+                <asvg:svgBlip xmlns:asvg="http://schemas.microsoft.com/office/drawing/2016/SVG/main" r:embed="rId17"/>
+              </a:ext>
+            </a:extLst>
+          </a:blip>
+          <a:stretch>
+            <a:fillRect/>
+          </a:stretch>
+        </p:blipFill>
+        <p:spPr>
+          <a:xfrm>
+            <a:off x="1124805" y="1920144"/>
+            <a:ext cx="548640" cy="548640"/>
+          </a:xfrm>
+          <a:prstGeom prst="rect">
+            <a:avLst/>
+          </a:prstGeom>
+        </p:spPr>
+      </p:pic>
+      <p:pic>
+        <p:nvPicPr>
+          <p:cNvPr id="40" name="Graphic 39" descr="Male profile">
+            <a:extLst>
+              <a:ext uri="{FF2B5EF4-FFF2-40B4-BE49-F238E27FC236}">
+                <a16:creationId xmlns:a16="http://schemas.microsoft.com/office/drawing/2014/main" id="{31F7B851-1FE9-0041-8F10-EFAE91321223}"/>
+              </a:ext>
+            </a:extLst>
+          </p:cNvPr>
+          <p:cNvPicPr>
+            <a:picLocks noChangeAspect="1"/>
+          </p:cNvPicPr>
+          <p:nvPr/>
+        </p:nvPicPr>
+        <p:blipFill>
+          <a:blip r:embed="rId18">
+            <a:extLst>
+              <a:ext uri="{96DAC541-7B7A-43D3-8B79-37D633B846F1}">
+                <asvg:svgBlip xmlns:asvg="http://schemas.microsoft.com/office/drawing/2016/SVG/main" r:embed="rId19"/>
+              </a:ext>
+            </a:extLst>
+          </a:blip>
+          <a:stretch>
+            <a:fillRect/>
+          </a:stretch>
+        </p:blipFill>
+        <p:spPr>
+          <a:xfrm>
+            <a:off x="768991" y="4209262"/>
+            <a:ext cx="548640" cy="548640"/>
+          </a:xfrm>
+          <a:prstGeom prst="rect">
+            <a:avLst/>
+          </a:prstGeom>
+        </p:spPr>
+      </p:pic>
+      <p:pic>
+        <p:nvPicPr>
+          <p:cNvPr id="41" name="Graphic 40" descr="User">
+            <a:extLst>
+              <a:ext uri="{FF2B5EF4-FFF2-40B4-BE49-F238E27FC236}">
+                <a16:creationId xmlns:a16="http://schemas.microsoft.com/office/drawing/2014/main" id="{E040F2A3-AFAF-D148-A107-32FE22473B6E}"/>
+              </a:ext>
+            </a:extLst>
+          </p:cNvPr>
+          <p:cNvPicPr>
+            <a:picLocks noChangeAspect="1"/>
+          </p:cNvPicPr>
+          <p:nvPr/>
+        </p:nvPicPr>
+        <p:blipFill>
+          <a:blip r:embed="rId20">
+            <a:extLst>
+              <a:ext uri="{96DAC541-7B7A-43D3-8B79-37D633B846F1}">
+                <asvg:svgBlip xmlns:asvg="http://schemas.microsoft.com/office/drawing/2016/SVG/main" r:embed="rId21"/>
+              </a:ext>
+            </a:extLst>
+          </a:blip>
+          <a:stretch>
+            <a:fillRect/>
+          </a:stretch>
+        </p:blipFill>
+        <p:spPr>
+          <a:xfrm>
+            <a:off x="1559013" y="1937650"/>
+            <a:ext cx="548640" cy="548640"/>
+          </a:xfrm>
+          <a:prstGeom prst="rect">
+            <a:avLst/>
+          </a:prstGeom>
+        </p:spPr>
+      </p:pic>
+      <p:pic>
+        <p:nvPicPr>
+          <p:cNvPr id="42" name="Graphic 41" descr="School girl">
+            <a:extLst>
+              <a:ext uri="{FF2B5EF4-FFF2-40B4-BE49-F238E27FC236}">
+                <a16:creationId xmlns:a16="http://schemas.microsoft.com/office/drawing/2014/main" id="{3F63AF07-EE5F-CF47-A082-F91C131F360C}"/>
+              </a:ext>
+            </a:extLst>
+          </p:cNvPr>
+          <p:cNvPicPr>
+            <a:picLocks noChangeAspect="1"/>
+          </p:cNvPicPr>
+          <p:nvPr/>
+        </p:nvPicPr>
+        <p:blipFill>
+          <a:blip r:embed="rId10">
+            <a:extLst>
+              <a:ext uri="{96DAC541-7B7A-43D3-8B79-37D633B846F1}">
+                <asvg:svgBlip xmlns:asvg="http://schemas.microsoft.com/office/drawing/2016/SVG/main" r:embed="rId11"/>
+              </a:ext>
+            </a:extLst>
+          </a:blip>
+          <a:stretch>
+            <a:fillRect/>
+          </a:stretch>
+        </p:blipFill>
+        <p:spPr>
+          <a:xfrm>
+            <a:off x="1184825" y="3978817"/>
+            <a:ext cx="548640" cy="548640"/>
+          </a:xfrm>
+          <a:prstGeom prst="rect">
+            <a:avLst/>
+          </a:prstGeom>
+        </p:spPr>
+      </p:pic>
+      <p:pic>
+        <p:nvPicPr>
+          <p:cNvPr id="43" name="Graphic 42" descr="Female Profile">
+            <a:extLst>
+              <a:ext uri="{FF2B5EF4-FFF2-40B4-BE49-F238E27FC236}">
+                <a16:creationId xmlns:a16="http://schemas.microsoft.com/office/drawing/2014/main" id="{2627CD7E-A53B-F24A-B1B8-3F6E79640393}"/>
+              </a:ext>
+            </a:extLst>
+          </p:cNvPr>
+          <p:cNvPicPr>
+            <a:picLocks noChangeAspect="1"/>
+          </p:cNvPicPr>
+          <p:nvPr/>
+        </p:nvPicPr>
+        <p:blipFill>
+          <a:blip r:embed="rId4">
+            <a:extLst>
+              <a:ext uri="{96DAC541-7B7A-43D3-8B79-37D633B846F1}">
+                <asvg:svgBlip xmlns:asvg="http://schemas.microsoft.com/office/drawing/2016/SVG/main" r:embed="rId5"/>
+              </a:ext>
+            </a:extLst>
+          </a:blip>
+          <a:stretch>
+            <a:fillRect/>
+          </a:stretch>
+        </p:blipFill>
+        <p:spPr>
+          <a:xfrm>
+            <a:off x="1143179" y="2430463"/>
+            <a:ext cx="548640" cy="548640"/>
+          </a:xfrm>
+          <a:prstGeom prst="rect">
+            <a:avLst/>
+          </a:prstGeom>
+        </p:spPr>
+      </p:pic>
+      <p:sp>
+        <p:nvSpPr>
+          <p:cNvPr id="52" name="Rounded Rectangle 51">
+            <a:extLst>
+              <a:ext uri="{FF2B5EF4-FFF2-40B4-BE49-F238E27FC236}">
+                <a16:creationId xmlns:a16="http://schemas.microsoft.com/office/drawing/2014/main" id="{679284B6-69AC-1545-BE16-018888117D47}"/>
+              </a:ext>
+            </a:extLst>
+          </p:cNvPr>
+          <p:cNvSpPr/>
+          <p:nvPr/>
+        </p:nvSpPr>
+        <p:spPr>
+          <a:xfrm>
+            <a:off x="5905285" y="1925327"/>
+            <a:ext cx="1170215" cy="674914"/>
+          </a:xfrm>
+          <a:prstGeom prst="roundRect">
+            <a:avLst/>
+          </a:prstGeom>
+          <a:solidFill>
+            <a:schemeClr val="accent1">
+              <a:lumMod val="60000"/>
+              <a:lumOff val="40000"/>
+            </a:schemeClr>
+          </a:solidFill>
+          <a:ln w="19050">
+            <a:solidFill>
+              <a:schemeClr val="accent1">
+                <a:lumMod val="50000"/>
+              </a:schemeClr>
+            </a:solidFill>
+          </a:ln>
+        </p:spPr>
+        <p:style>
+          <a:lnRef idx="2">
+            <a:schemeClr val="accent1">
+              <a:shade val="50000"/>
+            </a:schemeClr>
+          </a:lnRef>
+          <a:fillRef idx="1">
+            <a:schemeClr val="accent1"/>
+          </a:fillRef>
+          <a:effectRef idx="0">
+            <a:schemeClr val="accent1"/>
+          </a:effectRef>
+          <a:fontRef idx="minor">
+            <a:schemeClr val="lt1"/>
+          </a:fontRef>
+        </p:style>
+        <p:txBody>
+          <a:bodyPr rtlCol="0" anchor="ctr"/>
+          <a:lstStyle/>
+          <a:p>
+            <a:pPr algn="ctr"/>
+            <a:endParaRPr lang="en-US" dirty="0">
+              <a:solidFill>
+                <a:schemeClr val="tx1"/>
+              </a:solidFill>
+            </a:endParaRPr>
+          </a:p>
+        </p:txBody>
+      </p:sp>
+      <p:sp>
+        <p:nvSpPr>
+          <p:cNvPr id="53" name="Rounded Rectangle 52">
+            <a:extLst>
+              <a:ext uri="{FF2B5EF4-FFF2-40B4-BE49-F238E27FC236}">
+                <a16:creationId xmlns:a16="http://schemas.microsoft.com/office/drawing/2014/main" id="{7BD1F8B5-1F8A-D543-8BDC-C30167A00E6A}"/>
+              </a:ext>
+            </a:extLst>
+          </p:cNvPr>
+          <p:cNvSpPr/>
+          <p:nvPr/>
+        </p:nvSpPr>
+        <p:spPr>
+          <a:xfrm>
+            <a:off x="5774655" y="2061399"/>
+            <a:ext cx="1170215" cy="674914"/>
+          </a:xfrm>
+          <a:prstGeom prst="roundRect">
+            <a:avLst/>
+          </a:prstGeom>
+          <a:solidFill>
+            <a:schemeClr val="accent1">
+              <a:lumMod val="75000"/>
+            </a:schemeClr>
+          </a:solidFill>
+          <a:ln w="19050">
+            <a:solidFill>
+              <a:schemeClr val="accent1">
+                <a:lumMod val="50000"/>
+              </a:schemeClr>
+            </a:solidFill>
+          </a:ln>
+        </p:spPr>
+        <p:style>
+          <a:lnRef idx="2">
+            <a:schemeClr val="accent1">
+              <a:shade val="50000"/>
+            </a:schemeClr>
+          </a:lnRef>
+          <a:fillRef idx="1">
+            <a:schemeClr val="accent1"/>
+          </a:fillRef>
+          <a:effectRef idx="0">
+            <a:schemeClr val="accent1"/>
+          </a:effectRef>
+          <a:fontRef idx="minor">
+            <a:schemeClr val="lt1"/>
+          </a:fontRef>
+        </p:style>
+        <p:txBody>
+          <a:bodyPr rtlCol="0" anchor="ctr"/>
+          <a:lstStyle/>
+          <a:p>
+            <a:pPr algn="ctr"/>
+            <a:r>
+              <a:rPr lang="en-US" dirty="0">
+                <a:solidFill>
+                  <a:schemeClr val="bg1"/>
+                </a:solidFill>
+              </a:rPr>
+              <a:t>v1.0</a:t>
+            </a:r>
+          </a:p>
+        </p:txBody>
+      </p:sp>
+      <p:sp>
+        <p:nvSpPr>
+          <p:cNvPr id="54" name="Rounded Rectangle 53">
+            <a:extLst>
+              <a:ext uri="{FF2B5EF4-FFF2-40B4-BE49-F238E27FC236}">
+                <a16:creationId xmlns:a16="http://schemas.microsoft.com/office/drawing/2014/main" id="{C6EFCFA5-008A-E54A-9504-84FEF0E7F2F0}"/>
+              </a:ext>
+            </a:extLst>
+          </p:cNvPr>
+          <p:cNvSpPr/>
+          <p:nvPr/>
+        </p:nvSpPr>
+        <p:spPr>
+          <a:xfrm>
+            <a:off x="5774655" y="4272676"/>
+            <a:ext cx="1170215" cy="674914"/>
+          </a:xfrm>
+          <a:prstGeom prst="roundRect">
+            <a:avLst/>
+          </a:prstGeom>
+          <a:solidFill>
+            <a:schemeClr val="accent6">
+              <a:lumMod val="75000"/>
+            </a:schemeClr>
+          </a:solidFill>
+          <a:ln w="19050">
+            <a:solidFill>
+              <a:schemeClr val="accent6">
+                <a:lumMod val="50000"/>
+              </a:schemeClr>
+            </a:solidFill>
+          </a:ln>
+        </p:spPr>
+        <p:style>
+          <a:lnRef idx="2">
+            <a:schemeClr val="accent1">
+              <a:shade val="50000"/>
+            </a:schemeClr>
+          </a:lnRef>
+          <a:fillRef idx="1">
+            <a:schemeClr val="accent1"/>
+          </a:fillRef>
+          <a:effectRef idx="0">
+            <a:schemeClr val="accent1"/>
+          </a:effectRef>
+          <a:fontRef idx="minor">
+            <a:schemeClr val="lt1"/>
+          </a:fontRef>
+        </p:style>
+        <p:txBody>
+          <a:bodyPr rtlCol="0" anchor="ctr"/>
+          <a:lstStyle/>
+          <a:p>
+            <a:pPr algn="ctr"/>
+            <a:r>
+              <a:rPr lang="en-US" dirty="0">
+                <a:solidFill>
+                  <a:schemeClr val="bg1"/>
+                </a:solidFill>
+              </a:rPr>
+              <a:t>v2.0</a:t>
+            </a:r>
+          </a:p>
+        </p:txBody>
+      </p:sp>
+      <p:sp>
+        <p:nvSpPr>
+          <p:cNvPr id="56" name="Rounded Rectangle 55">
+            <a:extLst>
+              <a:ext uri="{FF2B5EF4-FFF2-40B4-BE49-F238E27FC236}">
+                <a16:creationId xmlns:a16="http://schemas.microsoft.com/office/drawing/2014/main" id="{055D8326-B9BB-8D40-AB91-9DBD2DB840A9}"/>
+              </a:ext>
+            </a:extLst>
+          </p:cNvPr>
+          <p:cNvSpPr/>
+          <p:nvPr/>
+        </p:nvSpPr>
+        <p:spPr>
+          <a:xfrm>
+            <a:off x="4781170" y="3116049"/>
+            <a:ext cx="689886" cy="618939"/>
+          </a:xfrm>
+          <a:prstGeom prst="roundRect">
+            <a:avLst/>
+          </a:prstGeom>
+          <a:solidFill>
+            <a:schemeClr val="bg1"/>
+          </a:solidFill>
+          <a:ln>
+            <a:solidFill>
+              <a:schemeClr val="bg1"/>
+            </a:solidFill>
+          </a:ln>
+        </p:spPr>
+        <p:style>
+          <a:lnRef idx="2">
+            <a:schemeClr val="accent1">
+              <a:shade val="50000"/>
+            </a:schemeClr>
+          </a:lnRef>
+          <a:fillRef idx="1">
+            <a:schemeClr val="accent1"/>
+          </a:fillRef>
+          <a:effectRef idx="0">
+            <a:schemeClr val="accent1"/>
+          </a:effectRef>
+          <a:fontRef idx="minor">
+            <a:schemeClr val="lt1"/>
+          </a:fontRef>
+        </p:style>
+        <p:txBody>
+          <a:bodyPr rtlCol="0" anchor="ctr"/>
+          <a:lstStyle/>
+          <a:p>
+            <a:pPr algn="ctr"/>
+            <a:endParaRPr lang="en-US"/>
+          </a:p>
+        </p:txBody>
+      </p:sp>
+      <p:sp>
+        <p:nvSpPr>
+          <p:cNvPr id="58" name="TextBox 57">
+            <a:extLst>
+              <a:ext uri="{FF2B5EF4-FFF2-40B4-BE49-F238E27FC236}">
+                <a16:creationId xmlns:a16="http://schemas.microsoft.com/office/drawing/2014/main" id="{0E823160-F618-A645-BF05-BFAACBA9E781}"/>
+              </a:ext>
+            </a:extLst>
+          </p:cNvPr>
+          <p:cNvSpPr txBox="1"/>
+          <p:nvPr/>
+        </p:nvSpPr>
+        <p:spPr>
+          <a:xfrm>
+            <a:off x="5368195" y="2699138"/>
+            <a:ext cx="700833" cy="369332"/>
+          </a:xfrm>
+          <a:prstGeom prst="rect">
+            <a:avLst/>
+          </a:prstGeom>
+          <a:noFill/>
+        </p:spPr>
+        <p:txBody>
+          <a:bodyPr wrap="none" rtlCol="0">
+            <a:spAutoFit/>
+          </a:bodyPr>
+          <a:lstStyle/>
+          <a:p>
+            <a:r>
+              <a:rPr lang="en-US" dirty="0"/>
+              <a:t>100%</a:t>
+            </a:r>
+          </a:p>
+        </p:txBody>
+      </p:sp>
+      <p:sp>
+        <p:nvSpPr>
+          <p:cNvPr id="73" name="Rounded Rectangle 72">
+            <a:extLst>
+              <a:ext uri="{FF2B5EF4-FFF2-40B4-BE49-F238E27FC236}">
+                <a16:creationId xmlns:a16="http://schemas.microsoft.com/office/drawing/2014/main" id="{E71FD733-5596-9147-92A5-95EF2ED71511}"/>
+              </a:ext>
+            </a:extLst>
+          </p:cNvPr>
+          <p:cNvSpPr/>
+          <p:nvPr/>
+        </p:nvSpPr>
+        <p:spPr>
+          <a:xfrm>
+            <a:off x="4676841" y="2858881"/>
+            <a:ext cx="816445" cy="1041636"/>
+          </a:xfrm>
+          <a:prstGeom prst="roundRect">
+            <a:avLst/>
+          </a:prstGeom>
+          <a:solidFill>
+            <a:schemeClr val="bg1"/>
+          </a:solidFill>
+          <a:ln>
+            <a:solidFill>
+              <a:schemeClr val="bg1"/>
+            </a:solidFill>
+          </a:ln>
+        </p:spPr>
+        <p:style>
+          <a:lnRef idx="2">
+            <a:schemeClr val="accent1">
+              <a:shade val="50000"/>
+            </a:schemeClr>
+          </a:lnRef>
+          <a:fillRef idx="1">
+            <a:schemeClr val="accent1"/>
+          </a:fillRef>
+          <a:effectRef idx="0">
+            <a:schemeClr val="accent1"/>
+          </a:effectRef>
+          <a:fontRef idx="minor">
+            <a:schemeClr val="lt1"/>
+          </a:fontRef>
+        </p:style>
+        <p:txBody>
+          <a:bodyPr rtlCol="0" anchor="ctr"/>
+          <a:lstStyle/>
+          <a:p>
+            <a:pPr algn="ctr"/>
+            <a:endParaRPr lang="en-US"/>
+          </a:p>
+        </p:txBody>
+      </p:sp>
+      <p:pic>
+        <p:nvPicPr>
+          <p:cNvPr id="72" name="Graphic 71" descr="Server">
+            <a:extLst>
+              <a:ext uri="{FF2B5EF4-FFF2-40B4-BE49-F238E27FC236}">
+                <a16:creationId xmlns:a16="http://schemas.microsoft.com/office/drawing/2014/main" id="{55EEA0B0-993C-C64E-9A52-07B2BC96EB02}"/>
+              </a:ext>
+            </a:extLst>
+          </p:cNvPr>
+          <p:cNvPicPr>
+            <a:picLocks noChangeAspect="1"/>
+          </p:cNvPicPr>
+          <p:nvPr/>
+        </p:nvPicPr>
+        <p:blipFill>
+          <a:blip r:embed="rId22">
+            <a:extLst>
+              <a:ext uri="{96DAC541-7B7A-43D3-8B79-37D633B846F1}">
+                <asvg:svgBlip xmlns:asvg="http://schemas.microsoft.com/office/drawing/2016/SVG/main" r:embed="rId23"/>
+              </a:ext>
+            </a:extLst>
+          </a:blip>
+          <a:stretch>
+            <a:fillRect/>
+          </a:stretch>
+        </p:blipFill>
+        <p:spPr>
+          <a:xfrm>
+            <a:off x="2168312" y="3005254"/>
+            <a:ext cx="914400" cy="914400"/>
+          </a:xfrm>
+          <a:prstGeom prst="rect">
+            <a:avLst/>
+          </a:prstGeom>
+        </p:spPr>
+      </p:pic>
+      <p:pic>
+        <p:nvPicPr>
+          <p:cNvPr id="57" name="Graphic 56" descr="Server">
+            <a:extLst>
+              <a:ext uri="{FF2B5EF4-FFF2-40B4-BE49-F238E27FC236}">
+                <a16:creationId xmlns:a16="http://schemas.microsoft.com/office/drawing/2014/main" id="{1377B7FF-9024-EE45-8EA2-E4370E391F91}"/>
+              </a:ext>
+            </a:extLst>
+          </p:cNvPr>
+          <p:cNvPicPr>
+            <a:picLocks noChangeAspect="1"/>
+          </p:cNvPicPr>
+          <p:nvPr/>
+        </p:nvPicPr>
+        <p:blipFill>
+          <a:blip r:embed="rId22">
+            <a:extLst>
+              <a:ext uri="{96DAC541-7B7A-43D3-8B79-37D633B846F1}">
+                <asvg:svgBlip xmlns:asvg="http://schemas.microsoft.com/office/drawing/2016/SVG/main" r:embed="rId23"/>
+              </a:ext>
+            </a:extLst>
+          </a:blip>
+          <a:stretch>
+            <a:fillRect/>
+          </a:stretch>
+        </p:blipFill>
+        <p:spPr>
+          <a:xfrm>
+            <a:off x="4681839" y="3005254"/>
+            <a:ext cx="914400" cy="914400"/>
+          </a:xfrm>
+          <a:prstGeom prst="rect">
+            <a:avLst/>
+          </a:prstGeom>
+        </p:spPr>
+      </p:pic>
+      <p:sp>
+        <p:nvSpPr>
+          <p:cNvPr id="70" name="Rounded Rectangle 69">
+            <a:extLst>
+              <a:ext uri="{FF2B5EF4-FFF2-40B4-BE49-F238E27FC236}">
+                <a16:creationId xmlns:a16="http://schemas.microsoft.com/office/drawing/2014/main" id="{A81DBC97-4326-7A42-BAFD-7AA34B39351F}"/>
+              </a:ext>
+            </a:extLst>
+          </p:cNvPr>
+          <p:cNvSpPr/>
+          <p:nvPr/>
+        </p:nvSpPr>
+        <p:spPr>
+          <a:xfrm>
+            <a:off x="8263722" y="4147864"/>
+            <a:ext cx="1170215" cy="674914"/>
+          </a:xfrm>
+          <a:prstGeom prst="roundRect">
+            <a:avLst/>
+          </a:prstGeom>
+          <a:solidFill>
+            <a:schemeClr val="accent6">
+              <a:lumMod val="60000"/>
+              <a:lumOff val="40000"/>
+            </a:schemeClr>
+          </a:solidFill>
+          <a:ln w="19050">
+            <a:solidFill>
+              <a:schemeClr val="accent6">
+                <a:lumMod val="50000"/>
+              </a:schemeClr>
+            </a:solidFill>
+          </a:ln>
+        </p:spPr>
+        <p:style>
+          <a:lnRef idx="2">
+            <a:schemeClr val="accent1">
+              <a:shade val="50000"/>
+            </a:schemeClr>
+          </a:lnRef>
+          <a:fillRef idx="1">
+            <a:schemeClr val="accent1"/>
+          </a:fillRef>
+          <a:effectRef idx="0">
+            <a:schemeClr val="accent1"/>
+          </a:effectRef>
+          <a:fontRef idx="minor">
+            <a:schemeClr val="lt1"/>
+          </a:fontRef>
+        </p:style>
+        <p:txBody>
+          <a:bodyPr rtlCol="0" anchor="ctr"/>
+          <a:lstStyle/>
+          <a:p>
+            <a:pPr algn="ctr"/>
+            <a:endParaRPr lang="en-US" dirty="0">
+              <a:solidFill>
+                <a:schemeClr val="tx1"/>
+              </a:solidFill>
+            </a:endParaRPr>
+          </a:p>
+        </p:txBody>
+      </p:sp>
+      <p:sp>
+        <p:nvSpPr>
+          <p:cNvPr id="71" name="Curved Up Arrow 70">
+            <a:extLst>
+              <a:ext uri="{FF2B5EF4-FFF2-40B4-BE49-F238E27FC236}">
+                <a16:creationId xmlns:a16="http://schemas.microsoft.com/office/drawing/2014/main" id="{6A8FC5E4-D3C7-3046-B1AB-FAD880964032}"/>
+              </a:ext>
+            </a:extLst>
+          </p:cNvPr>
+          <p:cNvSpPr/>
+          <p:nvPr/>
+        </p:nvSpPr>
+        <p:spPr>
+          <a:xfrm>
+            <a:off x="7324887" y="2905395"/>
+            <a:ext cx="1394293" cy="420987"/>
+          </a:xfrm>
+          <a:prstGeom prst="curvedUpArrow">
+            <a:avLst>
+              <a:gd name="adj1" fmla="val 13236"/>
+              <a:gd name="adj2" fmla="val 50000"/>
+              <a:gd name="adj3" fmla="val 25000"/>
+            </a:avLst>
+          </a:prstGeom>
+          <a:solidFill>
+            <a:schemeClr val="accent1">
+              <a:lumMod val="75000"/>
+            </a:schemeClr>
+          </a:solidFill>
+          <a:ln>
+            <a:solidFill>
+              <a:schemeClr val="accent1">
+                <a:lumMod val="50000"/>
+              </a:schemeClr>
+            </a:solidFill>
+          </a:ln>
+        </p:spPr>
+        <p:style>
+          <a:lnRef idx="2">
+            <a:schemeClr val="accent1">
+              <a:shade val="50000"/>
+            </a:schemeClr>
+          </a:lnRef>
+          <a:fillRef idx="1">
+            <a:schemeClr val="accent1"/>
+          </a:fillRef>
+          <a:effectRef idx="0">
+            <a:schemeClr val="accent1"/>
+          </a:effectRef>
+          <a:fontRef idx="minor">
+            <a:schemeClr val="lt1"/>
+          </a:fontRef>
+        </p:style>
+        <p:txBody>
+          <a:bodyPr rtlCol="0" anchor="ctr"/>
+          <a:lstStyle/>
+          <a:p>
+            <a:pPr algn="ctr"/>
+            <a:endParaRPr lang="en-US">
+              <a:solidFill>
+                <a:schemeClr val="tx1"/>
+              </a:solidFill>
+            </a:endParaRPr>
+          </a:p>
+        </p:txBody>
+      </p:sp>
+      <p:sp>
+        <p:nvSpPr>
+          <p:cNvPr id="76" name="Rounded Rectangle 75">
+            <a:extLst>
+              <a:ext uri="{FF2B5EF4-FFF2-40B4-BE49-F238E27FC236}">
+                <a16:creationId xmlns:a16="http://schemas.microsoft.com/office/drawing/2014/main" id="{17597C80-A437-9C40-BC16-CBECB19E11C1}"/>
+              </a:ext>
+            </a:extLst>
+          </p:cNvPr>
+          <p:cNvSpPr/>
+          <p:nvPr/>
+        </p:nvSpPr>
+        <p:spPr>
+          <a:xfrm>
+            <a:off x="8159292" y="2061399"/>
+            <a:ext cx="1170215" cy="674914"/>
+          </a:xfrm>
+          <a:prstGeom prst="roundRect">
+            <a:avLst/>
+          </a:prstGeom>
+          <a:solidFill>
+            <a:schemeClr val="accent1">
+              <a:lumMod val="75000"/>
+            </a:schemeClr>
+          </a:solidFill>
+          <a:ln w="19050">
+            <a:solidFill>
+              <a:schemeClr val="accent1">
+                <a:lumMod val="50000"/>
+              </a:schemeClr>
+            </a:solidFill>
+          </a:ln>
+        </p:spPr>
+        <p:style>
+          <a:lnRef idx="2">
+            <a:schemeClr val="accent1">
+              <a:shade val="50000"/>
+            </a:schemeClr>
+          </a:lnRef>
+          <a:fillRef idx="1">
+            <a:schemeClr val="accent1"/>
+          </a:fillRef>
+          <a:effectRef idx="0">
+            <a:schemeClr val="accent1"/>
+          </a:effectRef>
+          <a:fontRef idx="minor">
+            <a:schemeClr val="lt1"/>
+          </a:fontRef>
+        </p:style>
+        <p:txBody>
+          <a:bodyPr rtlCol="0" anchor="ctr"/>
+          <a:lstStyle/>
+          <a:p>
+            <a:pPr algn="ctr"/>
+            <a:r>
+              <a:rPr lang="en-US" dirty="0">
+                <a:solidFill>
+                  <a:schemeClr val="bg1"/>
+                </a:solidFill>
+              </a:rPr>
+              <a:t>v1.0</a:t>
+            </a:r>
+          </a:p>
+        </p:txBody>
+      </p:sp>
+      <p:sp>
+        <p:nvSpPr>
+          <p:cNvPr id="77" name="Rounded Rectangle 76">
+            <a:extLst>
+              <a:ext uri="{FF2B5EF4-FFF2-40B4-BE49-F238E27FC236}">
+                <a16:creationId xmlns:a16="http://schemas.microsoft.com/office/drawing/2014/main" id="{CE070102-5BA5-1B44-9287-39DC0017C162}"/>
+              </a:ext>
+            </a:extLst>
+          </p:cNvPr>
+          <p:cNvSpPr/>
+          <p:nvPr/>
+        </p:nvSpPr>
+        <p:spPr>
+          <a:xfrm>
+            <a:off x="8159292" y="4272676"/>
+            <a:ext cx="1170215" cy="674914"/>
+          </a:xfrm>
+          <a:prstGeom prst="roundRect">
+            <a:avLst/>
+          </a:prstGeom>
+          <a:solidFill>
+            <a:schemeClr val="accent6">
+              <a:lumMod val="75000"/>
+            </a:schemeClr>
+          </a:solidFill>
+          <a:ln w="19050">
+            <a:solidFill>
+              <a:schemeClr val="accent6">
+                <a:lumMod val="50000"/>
+              </a:schemeClr>
+            </a:solidFill>
+          </a:ln>
+        </p:spPr>
+        <p:style>
+          <a:lnRef idx="2">
+            <a:schemeClr val="accent1">
+              <a:shade val="50000"/>
+            </a:schemeClr>
+          </a:lnRef>
+          <a:fillRef idx="1">
+            <a:schemeClr val="accent1"/>
+          </a:fillRef>
+          <a:effectRef idx="0">
+            <a:schemeClr val="accent1"/>
+          </a:effectRef>
+          <a:fontRef idx="minor">
+            <a:schemeClr val="lt1"/>
+          </a:fontRef>
+        </p:style>
+        <p:txBody>
+          <a:bodyPr rtlCol="0" anchor="ctr"/>
+          <a:lstStyle/>
+          <a:p>
+            <a:pPr algn="ctr"/>
+            <a:r>
+              <a:rPr lang="en-US" dirty="0">
+                <a:solidFill>
+                  <a:schemeClr val="bg1"/>
+                </a:solidFill>
+              </a:rPr>
+              <a:t>v2.0</a:t>
+            </a:r>
+          </a:p>
+        </p:txBody>
+      </p:sp>
+      <p:sp>
+        <p:nvSpPr>
+          <p:cNvPr id="79" name="TextBox 78">
+            <a:extLst>
+              <a:ext uri="{FF2B5EF4-FFF2-40B4-BE49-F238E27FC236}">
+                <a16:creationId xmlns:a16="http://schemas.microsoft.com/office/drawing/2014/main" id="{366040A5-57BA-4B4F-B936-D45AAEB02C90}"/>
+              </a:ext>
+            </a:extLst>
+          </p:cNvPr>
+          <p:cNvSpPr txBox="1"/>
+          <p:nvPr/>
+        </p:nvSpPr>
+        <p:spPr>
+          <a:xfrm>
+            <a:off x="7889569" y="2699138"/>
+            <a:ext cx="700833" cy="369332"/>
+          </a:xfrm>
+          <a:prstGeom prst="rect">
+            <a:avLst/>
+          </a:prstGeom>
+          <a:noFill/>
+        </p:spPr>
+        <p:txBody>
+          <a:bodyPr wrap="none" rtlCol="0">
+            <a:spAutoFit/>
+          </a:bodyPr>
+          <a:lstStyle/>
+          <a:p>
+            <a:r>
+              <a:rPr lang="en-US" dirty="0"/>
+              <a:t>100%</a:t>
+            </a:r>
+          </a:p>
+        </p:txBody>
+      </p:sp>
+      <p:sp>
+        <p:nvSpPr>
+          <p:cNvPr id="83" name="Rounded Rectangle 82">
+            <a:extLst>
+              <a:ext uri="{FF2B5EF4-FFF2-40B4-BE49-F238E27FC236}">
+                <a16:creationId xmlns:a16="http://schemas.microsoft.com/office/drawing/2014/main" id="{6656F4DF-FFBE-EE4C-993B-99617CD58386}"/>
+              </a:ext>
+            </a:extLst>
+          </p:cNvPr>
+          <p:cNvSpPr/>
+          <p:nvPr/>
+        </p:nvSpPr>
+        <p:spPr>
+          <a:xfrm>
+            <a:off x="7150689" y="2848628"/>
+            <a:ext cx="816445" cy="1041636"/>
+          </a:xfrm>
+          <a:prstGeom prst="roundRect">
+            <a:avLst/>
+          </a:prstGeom>
+          <a:solidFill>
+            <a:schemeClr val="bg1"/>
+          </a:solidFill>
+          <a:ln>
+            <a:solidFill>
+              <a:schemeClr val="bg1"/>
+            </a:solidFill>
+          </a:ln>
+        </p:spPr>
+        <p:style>
+          <a:lnRef idx="2">
+            <a:schemeClr val="accent1">
+              <a:shade val="50000"/>
+            </a:schemeClr>
+          </a:lnRef>
+          <a:fillRef idx="1">
+            <a:schemeClr val="accent1"/>
+          </a:fillRef>
+          <a:effectRef idx="0">
+            <a:schemeClr val="accent1"/>
+          </a:effectRef>
+          <a:fontRef idx="minor">
+            <a:schemeClr val="lt1"/>
+          </a:fontRef>
+        </p:style>
+        <p:txBody>
+          <a:bodyPr rtlCol="0" anchor="ctr"/>
+          <a:lstStyle/>
+          <a:p>
+            <a:pPr algn="ctr"/>
+            <a:endParaRPr lang="en-US"/>
+          </a:p>
+        </p:txBody>
+      </p:sp>
+      <p:pic>
+        <p:nvPicPr>
+          <p:cNvPr id="84" name="Graphic 83" descr="Server">
+            <a:extLst>
+              <a:ext uri="{FF2B5EF4-FFF2-40B4-BE49-F238E27FC236}">
+                <a16:creationId xmlns:a16="http://schemas.microsoft.com/office/drawing/2014/main" id="{95494DAB-1ECB-1844-857E-C71519E2842C}"/>
+              </a:ext>
+            </a:extLst>
+          </p:cNvPr>
+          <p:cNvPicPr>
+            <a:picLocks noChangeAspect="1"/>
+          </p:cNvPicPr>
+          <p:nvPr/>
+        </p:nvPicPr>
+        <p:blipFill>
+          <a:blip r:embed="rId22">
+            <a:extLst>
+              <a:ext uri="{96DAC541-7B7A-43D3-8B79-37D633B846F1}">
+                <asvg:svgBlip xmlns:asvg="http://schemas.microsoft.com/office/drawing/2016/SVG/main" r:embed="rId23"/>
+              </a:ext>
+            </a:extLst>
+          </a:blip>
+          <a:stretch>
+            <a:fillRect/>
+          </a:stretch>
+        </p:blipFill>
+        <p:spPr>
+          <a:xfrm>
+            <a:off x="7194808" y="2975864"/>
+            <a:ext cx="914400" cy="914400"/>
+          </a:xfrm>
+          <a:prstGeom prst="rect">
+            <a:avLst/>
+          </a:prstGeom>
+        </p:spPr>
+      </p:pic>
+      <p:sp>
+        <p:nvSpPr>
+          <p:cNvPr id="86" name="Rounded Rectangle 85">
+            <a:extLst>
+              <a:ext uri="{FF2B5EF4-FFF2-40B4-BE49-F238E27FC236}">
+                <a16:creationId xmlns:a16="http://schemas.microsoft.com/office/drawing/2014/main" id="{108FF632-71A4-BE48-B037-49620092C270}"/>
+              </a:ext>
+            </a:extLst>
+          </p:cNvPr>
+          <p:cNvSpPr/>
+          <p:nvPr/>
+        </p:nvSpPr>
+        <p:spPr>
+          <a:xfrm>
+            <a:off x="10738909" y="4026533"/>
+            <a:ext cx="1170215" cy="674914"/>
+          </a:xfrm>
+          <a:prstGeom prst="roundRect">
+            <a:avLst/>
+          </a:prstGeom>
+          <a:solidFill>
+            <a:schemeClr val="accent6">
+              <a:lumMod val="40000"/>
+              <a:lumOff val="60000"/>
+            </a:schemeClr>
+          </a:solidFill>
+          <a:ln w="19050">
+            <a:solidFill>
+              <a:schemeClr val="accent6">
+                <a:lumMod val="50000"/>
+              </a:schemeClr>
+            </a:solidFill>
+          </a:ln>
+        </p:spPr>
+        <p:style>
+          <a:lnRef idx="2">
+            <a:schemeClr val="accent1">
+              <a:shade val="50000"/>
+            </a:schemeClr>
+          </a:lnRef>
+          <a:fillRef idx="1">
+            <a:schemeClr val="accent1"/>
+          </a:fillRef>
+          <a:effectRef idx="0">
+            <a:schemeClr val="accent1"/>
+          </a:effectRef>
+          <a:fontRef idx="minor">
+            <a:schemeClr val="lt1"/>
+          </a:fontRef>
+        </p:style>
+        <p:txBody>
+          <a:bodyPr rtlCol="0" anchor="ctr"/>
+          <a:lstStyle/>
+          <a:p>
+            <a:pPr algn="ctr"/>
+            <a:endParaRPr lang="en-US" dirty="0">
+              <a:solidFill>
+                <a:schemeClr val="tx1"/>
+              </a:solidFill>
+            </a:endParaRPr>
+          </a:p>
+        </p:txBody>
+      </p:sp>
+      <p:sp>
+        <p:nvSpPr>
+          <p:cNvPr id="87" name="Rounded Rectangle 86">
+            <a:extLst>
+              <a:ext uri="{FF2B5EF4-FFF2-40B4-BE49-F238E27FC236}">
+                <a16:creationId xmlns:a16="http://schemas.microsoft.com/office/drawing/2014/main" id="{970EA12E-AC9F-AF41-9168-2444020C900B}"/>
+              </a:ext>
+            </a:extLst>
+          </p:cNvPr>
+          <p:cNvSpPr/>
+          <p:nvPr/>
+        </p:nvSpPr>
+        <p:spPr>
+          <a:xfrm>
+            <a:off x="10597395" y="4136604"/>
+            <a:ext cx="1170215" cy="674914"/>
+          </a:xfrm>
+          <a:prstGeom prst="roundRect">
+            <a:avLst/>
+          </a:prstGeom>
+          <a:solidFill>
+            <a:schemeClr val="accent6">
+              <a:lumMod val="60000"/>
+              <a:lumOff val="40000"/>
+            </a:schemeClr>
+          </a:solidFill>
+          <a:ln w="19050">
+            <a:solidFill>
+              <a:schemeClr val="accent6">
+                <a:lumMod val="50000"/>
+              </a:schemeClr>
+            </a:solidFill>
+          </a:ln>
+        </p:spPr>
+        <p:style>
+          <a:lnRef idx="2">
+            <a:schemeClr val="accent1">
+              <a:shade val="50000"/>
+            </a:schemeClr>
+          </a:lnRef>
+          <a:fillRef idx="1">
+            <a:schemeClr val="accent1"/>
+          </a:fillRef>
+          <a:effectRef idx="0">
+            <a:schemeClr val="accent1"/>
+          </a:effectRef>
+          <a:fontRef idx="minor">
+            <a:schemeClr val="lt1"/>
+          </a:fontRef>
+        </p:style>
+        <p:txBody>
+          <a:bodyPr rtlCol="0" anchor="ctr"/>
+          <a:lstStyle/>
+          <a:p>
+            <a:pPr algn="ctr"/>
+            <a:endParaRPr lang="en-US" dirty="0">
+              <a:solidFill>
+                <a:schemeClr val="tx1"/>
+              </a:solidFill>
+            </a:endParaRPr>
+          </a:p>
+        </p:txBody>
+      </p:sp>
+      <p:sp>
+        <p:nvSpPr>
+          <p:cNvPr id="88" name="Rounded Rectangle 87">
+            <a:extLst>
+              <a:ext uri="{FF2B5EF4-FFF2-40B4-BE49-F238E27FC236}">
+                <a16:creationId xmlns:a16="http://schemas.microsoft.com/office/drawing/2014/main" id="{FE39CC48-3E68-FA4A-AA40-B3D6C290C042}"/>
+              </a:ext>
+            </a:extLst>
+          </p:cNvPr>
+          <p:cNvSpPr/>
+          <p:nvPr/>
+        </p:nvSpPr>
+        <p:spPr>
+          <a:xfrm>
+            <a:off x="10466766" y="4272676"/>
+            <a:ext cx="1170215" cy="674914"/>
+          </a:xfrm>
+          <a:prstGeom prst="roundRect">
+            <a:avLst/>
+          </a:prstGeom>
+          <a:solidFill>
+            <a:schemeClr val="accent6">
+              <a:lumMod val="75000"/>
+            </a:schemeClr>
+          </a:solidFill>
+          <a:ln w="19050">
+            <a:solidFill>
+              <a:schemeClr val="accent6">
+                <a:lumMod val="50000"/>
+              </a:schemeClr>
+            </a:solidFill>
+          </a:ln>
+        </p:spPr>
+        <p:style>
+          <a:lnRef idx="2">
+            <a:schemeClr val="accent1">
+              <a:shade val="50000"/>
+            </a:schemeClr>
+          </a:lnRef>
+          <a:fillRef idx="1">
+            <a:schemeClr val="accent1"/>
+          </a:fillRef>
+          <a:effectRef idx="0">
+            <a:schemeClr val="accent1"/>
+          </a:effectRef>
+          <a:fontRef idx="minor">
+            <a:schemeClr val="lt1"/>
+          </a:fontRef>
+        </p:style>
+        <p:txBody>
+          <a:bodyPr rtlCol="0" anchor="ctr"/>
+          <a:lstStyle/>
+          <a:p>
+            <a:pPr algn="ctr"/>
+            <a:r>
+              <a:rPr lang="en-US" dirty="0">
+                <a:solidFill>
+                  <a:schemeClr val="bg1"/>
+                </a:solidFill>
+              </a:rPr>
+              <a:t>v2.0</a:t>
+            </a:r>
+          </a:p>
+        </p:txBody>
+      </p:sp>
+      <p:sp>
+        <p:nvSpPr>
+          <p:cNvPr id="91" name="Rounded Rectangle 90">
+            <a:extLst>
+              <a:ext uri="{FF2B5EF4-FFF2-40B4-BE49-F238E27FC236}">
+                <a16:creationId xmlns:a16="http://schemas.microsoft.com/office/drawing/2014/main" id="{8ED85D70-8E1C-F14D-B23D-4077C7959F05}"/>
+              </a:ext>
+            </a:extLst>
+          </p:cNvPr>
+          <p:cNvSpPr/>
+          <p:nvPr/>
+        </p:nvSpPr>
+        <p:spPr>
+          <a:xfrm>
+            <a:off x="9571831" y="2861854"/>
+            <a:ext cx="816445" cy="1041636"/>
+          </a:xfrm>
+          <a:prstGeom prst="roundRect">
+            <a:avLst/>
+          </a:prstGeom>
+          <a:solidFill>
+            <a:schemeClr val="bg1"/>
+          </a:solidFill>
+          <a:ln>
+            <a:solidFill>
+              <a:schemeClr val="bg1"/>
+            </a:solidFill>
+          </a:ln>
+        </p:spPr>
+        <p:style>
+          <a:lnRef idx="2">
+            <a:schemeClr val="accent1">
+              <a:shade val="50000"/>
+            </a:schemeClr>
+          </a:lnRef>
+          <a:fillRef idx="1">
+            <a:schemeClr val="accent1"/>
+          </a:fillRef>
+          <a:effectRef idx="0">
+            <a:schemeClr val="accent1"/>
+          </a:effectRef>
+          <a:fontRef idx="minor">
+            <a:schemeClr val="lt1"/>
+          </a:fontRef>
+        </p:style>
+        <p:txBody>
+          <a:bodyPr rtlCol="0" anchor="ctr"/>
+          <a:lstStyle/>
+          <a:p>
+            <a:pPr algn="ctr"/>
+            <a:endParaRPr lang="en-US"/>
+          </a:p>
+        </p:txBody>
+      </p:sp>
+      <p:sp>
+        <p:nvSpPr>
+          <p:cNvPr id="2" name="TextBox 1">
+            <a:extLst>
+              <a:ext uri="{FF2B5EF4-FFF2-40B4-BE49-F238E27FC236}">
+                <a16:creationId xmlns:a16="http://schemas.microsoft.com/office/drawing/2014/main" id="{256ACC65-D800-EE43-92BD-5F6C167DE49B}"/>
+              </a:ext>
+            </a:extLst>
+          </p:cNvPr>
+          <p:cNvSpPr txBox="1"/>
+          <p:nvPr/>
+        </p:nvSpPr>
+        <p:spPr>
+          <a:xfrm>
+            <a:off x="3273125" y="4895800"/>
+            <a:ext cx="1135439" cy="369332"/>
+          </a:xfrm>
+          <a:prstGeom prst="rect">
+            <a:avLst/>
+          </a:prstGeom>
+          <a:noFill/>
+        </p:spPr>
+        <p:txBody>
+          <a:bodyPr wrap="none" rtlCol="0">
+            <a:spAutoFit/>
+          </a:bodyPr>
+          <a:lstStyle/>
+          <a:p>
+            <a:r>
+              <a:rPr lang="en-US" dirty="0"/>
+              <a:t>Candidate</a:t>
+            </a:r>
+          </a:p>
+        </p:txBody>
+      </p:sp>
+      <p:sp>
+        <p:nvSpPr>
+          <p:cNvPr id="94" name="TextBox 93">
+            <a:extLst>
+              <a:ext uri="{FF2B5EF4-FFF2-40B4-BE49-F238E27FC236}">
+                <a16:creationId xmlns:a16="http://schemas.microsoft.com/office/drawing/2014/main" id="{E77C64BC-DEDC-3540-B9A1-0DC71AAF69FB}"/>
+              </a:ext>
+            </a:extLst>
+          </p:cNvPr>
+          <p:cNvSpPr txBox="1"/>
+          <p:nvPr/>
+        </p:nvSpPr>
+        <p:spPr>
+          <a:xfrm>
+            <a:off x="5792043" y="4892977"/>
+            <a:ext cx="1135439" cy="369332"/>
+          </a:xfrm>
+          <a:prstGeom prst="rect">
+            <a:avLst/>
+          </a:prstGeom>
+          <a:noFill/>
+        </p:spPr>
+        <p:txBody>
+          <a:bodyPr wrap="none" rtlCol="0">
+            <a:spAutoFit/>
+          </a:bodyPr>
+          <a:lstStyle/>
+          <a:p>
+            <a:r>
+              <a:rPr lang="en-US" dirty="0"/>
+              <a:t>Candidate</a:t>
+            </a:r>
+          </a:p>
+        </p:txBody>
+      </p:sp>
+      <p:sp>
+        <p:nvSpPr>
+          <p:cNvPr id="95" name="TextBox 94">
+            <a:extLst>
+              <a:ext uri="{FF2B5EF4-FFF2-40B4-BE49-F238E27FC236}">
+                <a16:creationId xmlns:a16="http://schemas.microsoft.com/office/drawing/2014/main" id="{1802A98C-D307-3346-9DFC-72C395DE5958}"/>
+              </a:ext>
+            </a:extLst>
+          </p:cNvPr>
+          <p:cNvSpPr txBox="1"/>
+          <p:nvPr/>
+        </p:nvSpPr>
+        <p:spPr>
+          <a:xfrm>
+            <a:off x="8176680" y="4892977"/>
+            <a:ext cx="1135439" cy="369332"/>
+          </a:xfrm>
+          <a:prstGeom prst="rect">
+            <a:avLst/>
+          </a:prstGeom>
+          <a:noFill/>
+        </p:spPr>
+        <p:txBody>
+          <a:bodyPr wrap="none" rtlCol="0">
+            <a:spAutoFit/>
+          </a:bodyPr>
+          <a:lstStyle/>
+          <a:p>
+            <a:r>
+              <a:rPr lang="en-US" dirty="0"/>
+              <a:t>Candidate</a:t>
+            </a:r>
+          </a:p>
+        </p:txBody>
+      </p:sp>
+      <p:sp>
+        <p:nvSpPr>
+          <p:cNvPr id="96" name="TextBox 95">
+            <a:extLst>
+              <a:ext uri="{FF2B5EF4-FFF2-40B4-BE49-F238E27FC236}">
+                <a16:creationId xmlns:a16="http://schemas.microsoft.com/office/drawing/2014/main" id="{8788DEFE-568A-6A4E-8676-9124A5A98669}"/>
+              </a:ext>
+            </a:extLst>
+          </p:cNvPr>
+          <p:cNvSpPr txBox="1"/>
+          <p:nvPr/>
+        </p:nvSpPr>
+        <p:spPr>
+          <a:xfrm>
+            <a:off x="10630924" y="4911314"/>
+            <a:ext cx="841897" cy="369332"/>
+          </a:xfrm>
+          <a:prstGeom prst="rect">
+            <a:avLst/>
+          </a:prstGeom>
+          <a:noFill/>
+        </p:spPr>
+        <p:txBody>
+          <a:bodyPr wrap="none" rtlCol="0">
+            <a:spAutoFit/>
+          </a:bodyPr>
+          <a:lstStyle/>
+          <a:p>
+            <a:r>
+              <a:rPr lang="en-US" dirty="0"/>
+              <a:t>winner</a:t>
+            </a:r>
+          </a:p>
+        </p:txBody>
+      </p:sp>
+      <p:sp>
+        <p:nvSpPr>
+          <p:cNvPr id="98" name="TextBox 97">
+            <a:extLst>
+              <a:ext uri="{FF2B5EF4-FFF2-40B4-BE49-F238E27FC236}">
+                <a16:creationId xmlns:a16="http://schemas.microsoft.com/office/drawing/2014/main" id="{56DDCB9D-5C63-884B-8FA2-2A25950BE9B4}"/>
+              </a:ext>
+            </a:extLst>
+          </p:cNvPr>
+          <p:cNvSpPr txBox="1"/>
+          <p:nvPr/>
+        </p:nvSpPr>
+        <p:spPr>
+          <a:xfrm>
+            <a:off x="5875495" y="1466858"/>
+            <a:ext cx="968535" cy="369332"/>
+          </a:xfrm>
+          <a:prstGeom prst="rect">
+            <a:avLst/>
+          </a:prstGeom>
+          <a:noFill/>
+        </p:spPr>
+        <p:txBody>
+          <a:bodyPr wrap="none" rtlCol="0">
+            <a:spAutoFit/>
+          </a:bodyPr>
+          <a:lstStyle/>
+          <a:p>
+            <a:r>
+              <a:rPr lang="en-US" dirty="0"/>
+              <a:t>Baseline</a:t>
+            </a:r>
+          </a:p>
+        </p:txBody>
+      </p:sp>
+      <p:sp>
+        <p:nvSpPr>
+          <p:cNvPr id="99" name="TextBox 98">
+            <a:extLst>
+              <a:ext uri="{FF2B5EF4-FFF2-40B4-BE49-F238E27FC236}">
+                <a16:creationId xmlns:a16="http://schemas.microsoft.com/office/drawing/2014/main" id="{8C1C7D81-D375-684E-B677-BF842660FA7E}"/>
+              </a:ext>
+            </a:extLst>
+          </p:cNvPr>
+          <p:cNvSpPr txBox="1"/>
+          <p:nvPr/>
+        </p:nvSpPr>
+        <p:spPr>
+          <a:xfrm>
+            <a:off x="8260132" y="1466858"/>
+            <a:ext cx="968535" cy="369332"/>
+          </a:xfrm>
+          <a:prstGeom prst="rect">
+            <a:avLst/>
+          </a:prstGeom>
+          <a:noFill/>
+        </p:spPr>
+        <p:txBody>
+          <a:bodyPr wrap="none" rtlCol="0">
+            <a:spAutoFit/>
+          </a:bodyPr>
+          <a:lstStyle/>
+          <a:p>
+            <a:r>
+              <a:rPr lang="en-US" dirty="0"/>
+              <a:t>Baseline</a:t>
+            </a:r>
+          </a:p>
+        </p:txBody>
+      </p:sp>
+      <p:cxnSp>
+        <p:nvCxnSpPr>
+          <p:cNvPr id="4" name="Straight Arrow Connector 3">
+            <a:extLst>
+              <a:ext uri="{FF2B5EF4-FFF2-40B4-BE49-F238E27FC236}">
+                <a16:creationId xmlns:a16="http://schemas.microsoft.com/office/drawing/2014/main" id="{DE918658-3B3F-B842-847E-006E8D51EB99}"/>
+              </a:ext>
+            </a:extLst>
+          </p:cNvPr>
+          <p:cNvCxnSpPr>
+            <a:cxnSpLocks/>
+          </p:cNvCxnSpPr>
+          <p:nvPr/>
+        </p:nvCxnSpPr>
+        <p:spPr>
+          <a:xfrm>
+            <a:off x="284313" y="5468471"/>
+            <a:ext cx="11683045" cy="1"/>
+          </a:xfrm>
+          <a:prstGeom prst="straightConnector1">
+            <a:avLst/>
+          </a:prstGeom>
+          <a:ln w="28575">
+            <a:solidFill>
+              <a:schemeClr val="accent2">
+                <a:lumMod val="75000"/>
+              </a:schemeClr>
+            </a:solidFill>
+            <a:tailEnd type="stealth" w="lg" len="lg"/>
+          </a:ln>
+        </p:spPr>
+        <p:style>
+          <a:lnRef idx="1">
+            <a:schemeClr val="accent1"/>
+          </a:lnRef>
+          <a:fillRef idx="0">
+            <a:schemeClr val="accent1"/>
+          </a:fillRef>
+          <a:effectRef idx="0">
+            <a:schemeClr val="accent1"/>
+          </a:effectRef>
+          <a:fontRef idx="minor">
+            <a:schemeClr val="tx1"/>
+          </a:fontRef>
+        </p:style>
+      </p:cxnSp>
+      <p:sp>
+        <p:nvSpPr>
+          <p:cNvPr id="9" name="TextBox 8">
+            <a:extLst>
+              <a:ext uri="{FF2B5EF4-FFF2-40B4-BE49-F238E27FC236}">
+                <a16:creationId xmlns:a16="http://schemas.microsoft.com/office/drawing/2014/main" id="{47FDE54F-34FE-C140-A79C-0AE201BD6C97}"/>
+              </a:ext>
+            </a:extLst>
+          </p:cNvPr>
+          <p:cNvSpPr txBox="1"/>
+          <p:nvPr/>
+        </p:nvSpPr>
+        <p:spPr>
+          <a:xfrm>
+            <a:off x="5830865" y="5538941"/>
+            <a:ext cx="649537" cy="369332"/>
+          </a:xfrm>
+          <a:prstGeom prst="rect">
+            <a:avLst/>
+          </a:prstGeom>
+          <a:noFill/>
+        </p:spPr>
+        <p:txBody>
+          <a:bodyPr wrap="none" rtlCol="0">
+            <a:spAutoFit/>
+          </a:bodyPr>
+          <a:lstStyle/>
+          <a:p>
+            <a:r>
+              <a:rPr lang="en-US" dirty="0"/>
+              <a:t>Time</a:t>
+            </a:r>
+          </a:p>
+        </p:txBody>
+      </p:sp>
+      <p:pic>
+        <p:nvPicPr>
+          <p:cNvPr id="75" name="Graphic 74" descr="Ribbon">
+            <a:extLst>
+              <a:ext uri="{FF2B5EF4-FFF2-40B4-BE49-F238E27FC236}">
+                <a16:creationId xmlns:a16="http://schemas.microsoft.com/office/drawing/2014/main" id="{5E24A435-A2F4-AB46-AE14-A7D22A538D1D}"/>
+              </a:ext>
+            </a:extLst>
+          </p:cNvPr>
+          <p:cNvPicPr>
+            <a:picLocks noChangeAspect="1"/>
+          </p:cNvPicPr>
+          <p:nvPr/>
+        </p:nvPicPr>
+        <p:blipFill>
+          <a:blip r:embed="rId24">
+            <a:extLst>
+              <a:ext uri="{96DAC541-7B7A-43D3-8B79-37D633B846F1}">
+                <asvg:svgBlip xmlns:asvg="http://schemas.microsoft.com/office/drawing/2016/SVG/main" r:embed="rId25"/>
+              </a:ext>
+            </a:extLst>
+          </a:blip>
+          <a:stretch>
+            <a:fillRect/>
+          </a:stretch>
+        </p:blipFill>
+        <p:spPr>
+          <a:xfrm>
+            <a:off x="9887531" y="4324650"/>
+            <a:ext cx="570967" cy="570967"/>
+          </a:xfrm>
+          <a:prstGeom prst="rect">
+            <a:avLst/>
+          </a:prstGeom>
+        </p:spPr>
+      </p:pic>
+      <p:cxnSp>
+        <p:nvCxnSpPr>
+          <p:cNvPr id="85" name="Straight Connector 84">
+            <a:extLst>
+              <a:ext uri="{FF2B5EF4-FFF2-40B4-BE49-F238E27FC236}">
+                <a16:creationId xmlns:a16="http://schemas.microsoft.com/office/drawing/2014/main" id="{9392F636-B4FA-5F45-A60C-12DB975C7A9A}"/>
+              </a:ext>
+            </a:extLst>
+          </p:cNvPr>
+          <p:cNvCxnSpPr/>
+          <p:nvPr/>
+        </p:nvCxnSpPr>
+        <p:spPr>
+          <a:xfrm>
+            <a:off x="4762297" y="1790760"/>
+            <a:ext cx="0" cy="3157373"/>
+          </a:xfrm>
+          <a:prstGeom prst="line">
+            <a:avLst/>
+          </a:prstGeom>
+        </p:spPr>
+        <p:style>
+          <a:lnRef idx="1">
+            <a:schemeClr val="accent1"/>
+          </a:lnRef>
+          <a:fillRef idx="0">
+            <a:schemeClr val="accent1"/>
+          </a:fillRef>
+          <a:effectRef idx="0">
+            <a:schemeClr val="accent1"/>
+          </a:effectRef>
+          <a:fontRef idx="minor">
+            <a:schemeClr val="tx1"/>
+          </a:fontRef>
+        </p:style>
+      </p:cxnSp>
+      <p:cxnSp>
+        <p:nvCxnSpPr>
+          <p:cNvPr id="89" name="Straight Connector 88">
+            <a:extLst>
+              <a:ext uri="{FF2B5EF4-FFF2-40B4-BE49-F238E27FC236}">
+                <a16:creationId xmlns:a16="http://schemas.microsoft.com/office/drawing/2014/main" id="{25E707CB-1235-E84B-A699-49B38DBC70AA}"/>
+              </a:ext>
+            </a:extLst>
+          </p:cNvPr>
+          <p:cNvCxnSpPr/>
+          <p:nvPr/>
+        </p:nvCxnSpPr>
+        <p:spPr>
+          <a:xfrm>
+            <a:off x="7275880" y="1836190"/>
+            <a:ext cx="0" cy="3157373"/>
+          </a:xfrm>
+          <a:prstGeom prst="line">
+            <a:avLst/>
+          </a:prstGeom>
+        </p:spPr>
+        <p:style>
+          <a:lnRef idx="1">
+            <a:schemeClr val="accent1"/>
+          </a:lnRef>
+          <a:fillRef idx="0">
+            <a:schemeClr val="accent1"/>
+          </a:fillRef>
+          <a:effectRef idx="0">
+            <a:schemeClr val="accent1"/>
+          </a:effectRef>
+          <a:fontRef idx="minor">
+            <a:schemeClr val="tx1"/>
+          </a:fontRef>
+        </p:style>
+      </p:cxnSp>
+      <p:cxnSp>
+        <p:nvCxnSpPr>
+          <p:cNvPr id="101" name="Straight Connector 100">
+            <a:extLst>
+              <a:ext uri="{FF2B5EF4-FFF2-40B4-BE49-F238E27FC236}">
+                <a16:creationId xmlns:a16="http://schemas.microsoft.com/office/drawing/2014/main" id="{CBD1A39E-041B-6641-A0C4-02AE4B974A27}"/>
+              </a:ext>
+            </a:extLst>
+          </p:cNvPr>
+          <p:cNvCxnSpPr/>
+          <p:nvPr/>
+        </p:nvCxnSpPr>
+        <p:spPr>
+          <a:xfrm>
+            <a:off x="9675052" y="1836190"/>
+            <a:ext cx="0" cy="3157373"/>
+          </a:xfrm>
+          <a:prstGeom prst="line">
+            <a:avLst/>
+          </a:prstGeom>
+        </p:spPr>
+        <p:style>
+          <a:lnRef idx="1">
+            <a:schemeClr val="accent1"/>
+          </a:lnRef>
+          <a:fillRef idx="0">
+            <a:schemeClr val="accent1"/>
+          </a:fillRef>
+          <a:effectRef idx="0">
+            <a:schemeClr val="accent1"/>
+          </a:effectRef>
+          <a:fontRef idx="minor">
+            <a:schemeClr val="tx1"/>
+          </a:fontRef>
+        </p:style>
+      </p:cxnSp>
+      <p:sp>
+        <p:nvSpPr>
+          <p:cNvPr id="81" name="TextBox 80">
+            <a:extLst>
+              <a:ext uri="{FF2B5EF4-FFF2-40B4-BE49-F238E27FC236}">
+                <a16:creationId xmlns:a16="http://schemas.microsoft.com/office/drawing/2014/main" id="{DD9514D0-38C0-6C43-916B-73DBC596C859}"/>
+              </a:ext>
+            </a:extLst>
+          </p:cNvPr>
+          <p:cNvSpPr txBox="1"/>
+          <p:nvPr/>
+        </p:nvSpPr>
+        <p:spPr>
+          <a:xfrm>
+            <a:off x="74072" y="4899577"/>
+            <a:ext cx="2429424" cy="369332"/>
+          </a:xfrm>
+          <a:prstGeom prst="rect">
+            <a:avLst/>
+          </a:prstGeom>
+          <a:noFill/>
+        </p:spPr>
+        <p:txBody>
+          <a:bodyPr wrap="square" rtlCol="0">
+            <a:spAutoFit/>
+          </a:bodyPr>
+          <a:lstStyle/>
+          <a:p>
+            <a:pPr algn="ctr"/>
+            <a:r>
+              <a:rPr lang="en-US" dirty="0"/>
+              <a:t>Users from </a:t>
+            </a:r>
+            <a:r>
+              <a:rPr lang="en-US" dirty="0">
+                <a:solidFill>
+                  <a:srgbClr val="C00000"/>
+                </a:solidFill>
+              </a:rPr>
+              <a:t>Wakanda</a:t>
+            </a:r>
+          </a:p>
+        </p:txBody>
+      </p:sp>
+      <p:sp>
+        <p:nvSpPr>
+          <p:cNvPr id="102" name="TextBox 101">
+            <a:extLst>
+              <a:ext uri="{FF2B5EF4-FFF2-40B4-BE49-F238E27FC236}">
+                <a16:creationId xmlns:a16="http://schemas.microsoft.com/office/drawing/2014/main" id="{3F303E21-E0CA-D64D-ADCE-E43C8138C962}"/>
+              </a:ext>
+            </a:extLst>
+          </p:cNvPr>
+          <p:cNvSpPr txBox="1"/>
+          <p:nvPr/>
+        </p:nvSpPr>
+        <p:spPr>
+          <a:xfrm>
+            <a:off x="92353" y="1461702"/>
+            <a:ext cx="2392863" cy="369332"/>
+          </a:xfrm>
+          <a:prstGeom prst="rect">
+            <a:avLst/>
+          </a:prstGeom>
+          <a:noFill/>
+        </p:spPr>
+        <p:txBody>
+          <a:bodyPr wrap="square" rtlCol="0">
+            <a:spAutoFit/>
+          </a:bodyPr>
+          <a:lstStyle/>
+          <a:p>
+            <a:pPr algn="ctr"/>
+            <a:r>
+              <a:rPr lang="en-US" dirty="0"/>
+              <a:t>All other users</a:t>
+            </a:r>
+            <a:endParaRPr lang="en-US" dirty="0">
+              <a:solidFill>
+                <a:srgbClr val="C00000"/>
+              </a:solidFill>
+            </a:endParaRPr>
+          </a:p>
+        </p:txBody>
+      </p:sp>
+      <p:cxnSp>
+        <p:nvCxnSpPr>
+          <p:cNvPr id="61" name="Elbow Connector 60">
+            <a:extLst>
+              <a:ext uri="{FF2B5EF4-FFF2-40B4-BE49-F238E27FC236}">
+                <a16:creationId xmlns:a16="http://schemas.microsoft.com/office/drawing/2014/main" id="{0E1200E9-BE71-1041-A45D-2E96E8C68E44}"/>
+              </a:ext>
+            </a:extLst>
+          </p:cNvPr>
+          <p:cNvCxnSpPr>
+            <a:cxnSpLocks/>
+            <a:stCxn id="40" idx="0"/>
+            <a:endCxn id="72" idx="1"/>
+          </p:cNvCxnSpPr>
+          <p:nvPr/>
+        </p:nvCxnSpPr>
+        <p:spPr>
+          <a:xfrm rot="5400000" flipH="1" flipV="1">
+            <a:off x="1232407" y="3273358"/>
+            <a:ext cx="746808" cy="1125001"/>
+          </a:xfrm>
+          <a:prstGeom prst="bentConnector2">
+            <a:avLst/>
+          </a:prstGeom>
+          <a:ln w="38100">
+            <a:solidFill>
+              <a:schemeClr val="accent4">
+                <a:lumMod val="50000"/>
+              </a:schemeClr>
+            </a:solidFill>
+            <a:tailEnd type="triangle"/>
+          </a:ln>
+        </p:spPr>
+        <p:style>
+          <a:lnRef idx="1">
+            <a:schemeClr val="accent1"/>
+          </a:lnRef>
+          <a:fillRef idx="0">
+            <a:schemeClr val="accent1"/>
+          </a:fillRef>
+          <a:effectRef idx="0">
+            <a:schemeClr val="accent1"/>
+          </a:effectRef>
+          <a:fontRef idx="minor">
+            <a:schemeClr val="tx1"/>
+          </a:fontRef>
+        </p:style>
+      </p:cxnSp>
+      <p:cxnSp>
+        <p:nvCxnSpPr>
+          <p:cNvPr id="65" name="Elbow Connector 64">
+            <a:extLst>
+              <a:ext uri="{FF2B5EF4-FFF2-40B4-BE49-F238E27FC236}">
+                <a16:creationId xmlns:a16="http://schemas.microsoft.com/office/drawing/2014/main" id="{996AA021-1621-3C42-8640-240FBF944DAD}"/>
+              </a:ext>
+            </a:extLst>
+          </p:cNvPr>
+          <p:cNvCxnSpPr>
+            <a:cxnSpLocks/>
+            <a:endCxn id="90" idx="2"/>
+          </p:cNvCxnSpPr>
+          <p:nvPr/>
+        </p:nvCxnSpPr>
+        <p:spPr>
+          <a:xfrm flipV="1">
+            <a:off x="3082712" y="2570095"/>
+            <a:ext cx="928188" cy="892362"/>
+          </a:xfrm>
+          <a:prstGeom prst="bentConnector2">
+            <a:avLst/>
+          </a:prstGeom>
+          <a:ln w="38100">
+            <a:solidFill>
+              <a:schemeClr val="accent4">
+                <a:lumMod val="50000"/>
+              </a:schemeClr>
+            </a:solidFill>
+            <a:tailEnd type="triangle"/>
+          </a:ln>
+        </p:spPr>
+        <p:style>
+          <a:lnRef idx="1">
+            <a:schemeClr val="accent1"/>
+          </a:lnRef>
+          <a:fillRef idx="0">
+            <a:schemeClr val="accent1"/>
+          </a:fillRef>
+          <a:effectRef idx="0">
+            <a:schemeClr val="accent1"/>
+          </a:effectRef>
+          <a:fontRef idx="minor">
+            <a:schemeClr val="tx1"/>
+          </a:fontRef>
+        </p:style>
+      </p:cxnSp>
+      <p:cxnSp>
+        <p:nvCxnSpPr>
+          <p:cNvPr id="105" name="Elbow Connector 104">
+            <a:extLst>
+              <a:ext uri="{FF2B5EF4-FFF2-40B4-BE49-F238E27FC236}">
+                <a16:creationId xmlns:a16="http://schemas.microsoft.com/office/drawing/2014/main" id="{B29A398A-87A4-4E4E-8ED6-527B4A14B954}"/>
+              </a:ext>
+            </a:extLst>
+          </p:cNvPr>
+          <p:cNvCxnSpPr>
+            <a:cxnSpLocks/>
+            <a:endCxn id="18" idx="0"/>
+          </p:cNvCxnSpPr>
+          <p:nvPr/>
+        </p:nvCxnSpPr>
+        <p:spPr>
+          <a:xfrm rot="16200000" flipH="1">
+            <a:off x="3065285" y="3497116"/>
+            <a:ext cx="811858" cy="739262"/>
+          </a:xfrm>
+          <a:prstGeom prst="bentConnector3">
+            <a:avLst>
+              <a:gd name="adj1" fmla="val 346"/>
+            </a:avLst>
+          </a:prstGeom>
+          <a:ln w="38100">
+            <a:solidFill>
+              <a:schemeClr val="accent4">
+                <a:lumMod val="50000"/>
+              </a:schemeClr>
+            </a:solidFill>
+            <a:tailEnd type="triangle"/>
+          </a:ln>
+        </p:spPr>
+        <p:style>
+          <a:lnRef idx="1">
+            <a:schemeClr val="accent1"/>
+          </a:lnRef>
+          <a:fillRef idx="0">
+            <a:schemeClr val="accent1"/>
+          </a:fillRef>
+          <a:effectRef idx="0">
+            <a:schemeClr val="accent1"/>
+          </a:effectRef>
+          <a:fontRef idx="minor">
+            <a:schemeClr val="tx1"/>
+          </a:fontRef>
+        </p:style>
+      </p:cxnSp>
+      <p:sp>
+        <p:nvSpPr>
+          <p:cNvPr id="110" name="TextBox 109">
+            <a:extLst>
+              <a:ext uri="{FF2B5EF4-FFF2-40B4-BE49-F238E27FC236}">
+                <a16:creationId xmlns:a16="http://schemas.microsoft.com/office/drawing/2014/main" id="{A11D35F3-3B62-2E45-BE22-A1F2F561A52B}"/>
+              </a:ext>
+            </a:extLst>
+          </p:cNvPr>
+          <p:cNvSpPr txBox="1"/>
+          <p:nvPr/>
+        </p:nvSpPr>
+        <p:spPr>
+          <a:xfrm>
+            <a:off x="4070803" y="3903344"/>
+            <a:ext cx="466794" cy="369332"/>
+          </a:xfrm>
+          <a:prstGeom prst="rect">
+            <a:avLst/>
+          </a:prstGeom>
+          <a:noFill/>
+        </p:spPr>
+        <p:txBody>
+          <a:bodyPr wrap="none" rtlCol="0">
+            <a:spAutoFit/>
+          </a:bodyPr>
+          <a:lstStyle/>
+          <a:p>
+            <a:r>
+              <a:rPr lang="en-US" dirty="0"/>
+              <a:t>5%</a:t>
+            </a:r>
+          </a:p>
+        </p:txBody>
+      </p:sp>
+      <p:cxnSp>
+        <p:nvCxnSpPr>
+          <p:cNvPr id="124" name="Elbow Connector 123">
+            <a:extLst>
+              <a:ext uri="{FF2B5EF4-FFF2-40B4-BE49-F238E27FC236}">
+                <a16:creationId xmlns:a16="http://schemas.microsoft.com/office/drawing/2014/main" id="{317FCE75-0E34-6B49-8E74-202032EB16C3}"/>
+              </a:ext>
+            </a:extLst>
+          </p:cNvPr>
+          <p:cNvCxnSpPr>
+            <a:cxnSpLocks/>
+            <a:stCxn id="57" idx="3"/>
+            <a:endCxn id="44" idx="0"/>
+          </p:cNvCxnSpPr>
+          <p:nvPr/>
+        </p:nvCxnSpPr>
+        <p:spPr>
+          <a:xfrm>
+            <a:off x="5596239" y="3462454"/>
+            <a:ext cx="867954" cy="685410"/>
+          </a:xfrm>
+          <a:prstGeom prst="bentConnector2">
+            <a:avLst/>
+          </a:prstGeom>
+          <a:ln w="38100">
+            <a:solidFill>
+              <a:schemeClr val="accent4">
+                <a:lumMod val="50000"/>
+              </a:schemeClr>
+            </a:solidFill>
+            <a:tailEnd type="triangle"/>
+          </a:ln>
+        </p:spPr>
+        <p:style>
+          <a:lnRef idx="1">
+            <a:schemeClr val="accent1"/>
+          </a:lnRef>
+          <a:fillRef idx="0">
+            <a:schemeClr val="accent1"/>
+          </a:fillRef>
+          <a:effectRef idx="0">
+            <a:schemeClr val="accent1"/>
+          </a:effectRef>
+          <a:fontRef idx="minor">
+            <a:schemeClr val="tx1"/>
+          </a:fontRef>
+        </p:style>
+      </p:cxnSp>
+      <p:cxnSp>
+        <p:nvCxnSpPr>
+          <p:cNvPr id="127" name="Elbow Connector 126">
+            <a:extLst>
+              <a:ext uri="{FF2B5EF4-FFF2-40B4-BE49-F238E27FC236}">
+                <a16:creationId xmlns:a16="http://schemas.microsoft.com/office/drawing/2014/main" id="{283303A0-6CD2-AC4B-AC23-9BC24537ADDC}"/>
+              </a:ext>
+            </a:extLst>
+          </p:cNvPr>
+          <p:cNvCxnSpPr>
+            <a:cxnSpLocks/>
+            <a:stCxn id="57" idx="3"/>
+            <a:endCxn id="53" idx="2"/>
+          </p:cNvCxnSpPr>
+          <p:nvPr/>
+        </p:nvCxnSpPr>
+        <p:spPr>
+          <a:xfrm flipV="1">
+            <a:off x="5596239" y="2736313"/>
+            <a:ext cx="763524" cy="726141"/>
+          </a:xfrm>
+          <a:prstGeom prst="bentConnector2">
+            <a:avLst/>
+          </a:prstGeom>
+          <a:ln w="38100">
+            <a:solidFill>
+              <a:schemeClr val="accent4">
+                <a:lumMod val="50000"/>
+              </a:schemeClr>
+            </a:solidFill>
+            <a:tailEnd type="triangle"/>
+          </a:ln>
+        </p:spPr>
+        <p:style>
+          <a:lnRef idx="1">
+            <a:schemeClr val="accent1"/>
+          </a:lnRef>
+          <a:fillRef idx="0">
+            <a:schemeClr val="accent1"/>
+          </a:fillRef>
+          <a:effectRef idx="0">
+            <a:schemeClr val="accent1"/>
+          </a:effectRef>
+          <a:fontRef idx="minor">
+            <a:schemeClr val="tx1"/>
+          </a:fontRef>
+        </p:style>
+      </p:cxnSp>
+      <p:sp>
+        <p:nvSpPr>
+          <p:cNvPr id="133" name="TextBox 132">
+            <a:extLst>
+              <a:ext uri="{FF2B5EF4-FFF2-40B4-BE49-F238E27FC236}">
+                <a16:creationId xmlns:a16="http://schemas.microsoft.com/office/drawing/2014/main" id="{FCE48F07-DD00-B34F-80B1-CD9D62684A39}"/>
+              </a:ext>
+            </a:extLst>
+          </p:cNvPr>
+          <p:cNvSpPr txBox="1"/>
+          <p:nvPr/>
+        </p:nvSpPr>
+        <p:spPr>
+          <a:xfrm>
+            <a:off x="6454044" y="3817912"/>
+            <a:ext cx="583814" cy="369332"/>
+          </a:xfrm>
+          <a:prstGeom prst="rect">
+            <a:avLst/>
+          </a:prstGeom>
+          <a:noFill/>
+        </p:spPr>
+        <p:txBody>
+          <a:bodyPr wrap="none" rtlCol="0">
+            <a:spAutoFit/>
+          </a:bodyPr>
+          <a:lstStyle/>
+          <a:p>
+            <a:r>
+              <a:rPr lang="en-US" dirty="0"/>
+              <a:t>25%</a:t>
+            </a:r>
+          </a:p>
+        </p:txBody>
+      </p:sp>
+      <p:sp>
+        <p:nvSpPr>
+          <p:cNvPr id="134" name="TextBox 133">
+            <a:extLst>
+              <a:ext uri="{FF2B5EF4-FFF2-40B4-BE49-F238E27FC236}">
+                <a16:creationId xmlns:a16="http://schemas.microsoft.com/office/drawing/2014/main" id="{E8ED4BD0-A7BD-EF4F-BB96-978CD93FE647}"/>
+              </a:ext>
+            </a:extLst>
+          </p:cNvPr>
+          <p:cNvSpPr txBox="1"/>
+          <p:nvPr/>
+        </p:nvSpPr>
+        <p:spPr>
+          <a:xfrm>
+            <a:off x="6454044" y="2702681"/>
+            <a:ext cx="583814" cy="369332"/>
+          </a:xfrm>
+          <a:prstGeom prst="rect">
+            <a:avLst/>
+          </a:prstGeom>
+          <a:noFill/>
+        </p:spPr>
+        <p:txBody>
+          <a:bodyPr wrap="none" rtlCol="0">
+            <a:spAutoFit/>
+          </a:bodyPr>
+          <a:lstStyle/>
+          <a:p>
+            <a:r>
+              <a:rPr lang="en-US" dirty="0"/>
+              <a:t>75%</a:t>
+            </a:r>
+          </a:p>
+        </p:txBody>
+      </p:sp>
+      <p:cxnSp>
+        <p:nvCxnSpPr>
+          <p:cNvPr id="135" name="Elbow Connector 134">
+            <a:extLst>
+              <a:ext uri="{FF2B5EF4-FFF2-40B4-BE49-F238E27FC236}">
+                <a16:creationId xmlns:a16="http://schemas.microsoft.com/office/drawing/2014/main" id="{B5F9A1A1-6202-5D41-BB7C-2CC0EAD5BB4E}"/>
+              </a:ext>
+            </a:extLst>
+          </p:cNvPr>
+          <p:cNvCxnSpPr>
+            <a:cxnSpLocks/>
+            <a:stCxn id="84" idx="3"/>
+            <a:endCxn id="100" idx="0"/>
+          </p:cNvCxnSpPr>
+          <p:nvPr/>
+        </p:nvCxnSpPr>
+        <p:spPr>
+          <a:xfrm>
+            <a:off x="8109208" y="3433064"/>
+            <a:ext cx="860462" cy="593469"/>
+          </a:xfrm>
+          <a:prstGeom prst="bentConnector2">
+            <a:avLst/>
+          </a:prstGeom>
+          <a:ln w="38100">
+            <a:solidFill>
+              <a:schemeClr val="accent4">
+                <a:lumMod val="50000"/>
+              </a:schemeClr>
+            </a:solidFill>
+            <a:tailEnd type="triangle"/>
+          </a:ln>
+        </p:spPr>
+        <p:style>
+          <a:lnRef idx="1">
+            <a:schemeClr val="accent1"/>
+          </a:lnRef>
+          <a:fillRef idx="0">
+            <a:schemeClr val="accent1"/>
+          </a:fillRef>
+          <a:effectRef idx="0">
+            <a:schemeClr val="accent1"/>
+          </a:effectRef>
+          <a:fontRef idx="minor">
+            <a:schemeClr val="tx1"/>
+          </a:fontRef>
+        </p:style>
+      </p:cxnSp>
+      <p:cxnSp>
+        <p:nvCxnSpPr>
+          <p:cNvPr id="138" name="Elbow Connector 137">
+            <a:extLst>
+              <a:ext uri="{FF2B5EF4-FFF2-40B4-BE49-F238E27FC236}">
+                <a16:creationId xmlns:a16="http://schemas.microsoft.com/office/drawing/2014/main" id="{097E8326-1E78-F14D-AFE9-A4A76E8EAA62}"/>
+              </a:ext>
+            </a:extLst>
+          </p:cNvPr>
+          <p:cNvCxnSpPr>
+            <a:cxnSpLocks/>
+            <a:stCxn id="84" idx="3"/>
+            <a:endCxn id="76" idx="2"/>
+          </p:cNvCxnSpPr>
+          <p:nvPr/>
+        </p:nvCxnSpPr>
+        <p:spPr>
+          <a:xfrm flipV="1">
+            <a:off x="8109208" y="2736313"/>
+            <a:ext cx="635192" cy="696751"/>
+          </a:xfrm>
+          <a:prstGeom prst="bentConnector2">
+            <a:avLst/>
+          </a:prstGeom>
+          <a:ln w="38100">
+            <a:solidFill>
+              <a:schemeClr val="accent4">
+                <a:lumMod val="50000"/>
+              </a:schemeClr>
+            </a:solidFill>
+            <a:tailEnd type="triangle"/>
+          </a:ln>
+        </p:spPr>
+        <p:style>
+          <a:lnRef idx="1">
+            <a:schemeClr val="accent1"/>
+          </a:lnRef>
+          <a:fillRef idx="0">
+            <a:schemeClr val="accent1"/>
+          </a:fillRef>
+          <a:effectRef idx="0">
+            <a:schemeClr val="accent1"/>
+          </a:effectRef>
+          <a:fontRef idx="minor">
+            <a:schemeClr val="tx1"/>
+          </a:fontRef>
+        </p:style>
+      </p:cxnSp>
+      <p:sp>
+        <p:nvSpPr>
+          <p:cNvPr id="141" name="TextBox 140">
+            <a:extLst>
+              <a:ext uri="{FF2B5EF4-FFF2-40B4-BE49-F238E27FC236}">
+                <a16:creationId xmlns:a16="http://schemas.microsoft.com/office/drawing/2014/main" id="{1B3C2696-C651-E840-9DAF-E8770A12740C}"/>
+              </a:ext>
+            </a:extLst>
+          </p:cNvPr>
+          <p:cNvSpPr txBox="1"/>
+          <p:nvPr/>
+        </p:nvSpPr>
+        <p:spPr>
+          <a:xfrm>
+            <a:off x="8986698" y="3690374"/>
+            <a:ext cx="583814" cy="369332"/>
+          </a:xfrm>
+          <a:prstGeom prst="rect">
+            <a:avLst/>
+          </a:prstGeom>
+          <a:noFill/>
+        </p:spPr>
+        <p:txBody>
+          <a:bodyPr wrap="none" rtlCol="0">
+            <a:spAutoFit/>
+          </a:bodyPr>
+          <a:lstStyle/>
+          <a:p>
+            <a:r>
+              <a:rPr lang="en-US" dirty="0"/>
+              <a:t>45%</a:t>
+            </a:r>
+          </a:p>
+        </p:txBody>
+      </p:sp>
+      <p:sp>
+        <p:nvSpPr>
+          <p:cNvPr id="142" name="TextBox 141">
+            <a:extLst>
+              <a:ext uri="{FF2B5EF4-FFF2-40B4-BE49-F238E27FC236}">
+                <a16:creationId xmlns:a16="http://schemas.microsoft.com/office/drawing/2014/main" id="{1E42D4ED-1655-B844-9BA7-6C546550BE21}"/>
+              </a:ext>
+            </a:extLst>
+          </p:cNvPr>
+          <p:cNvSpPr txBox="1"/>
+          <p:nvPr/>
+        </p:nvSpPr>
+        <p:spPr>
+          <a:xfrm>
+            <a:off x="8986698" y="2714811"/>
+            <a:ext cx="583814" cy="369332"/>
+          </a:xfrm>
+          <a:prstGeom prst="rect">
+            <a:avLst/>
+          </a:prstGeom>
+          <a:noFill/>
+        </p:spPr>
+        <p:txBody>
+          <a:bodyPr wrap="none" rtlCol="0">
+            <a:spAutoFit/>
+          </a:bodyPr>
+          <a:lstStyle/>
+          <a:p>
+            <a:r>
+              <a:rPr lang="en-US" dirty="0"/>
+              <a:t>55%</a:t>
+            </a:r>
+          </a:p>
+        </p:txBody>
+      </p:sp>
+      <p:sp>
+        <p:nvSpPr>
+          <p:cNvPr id="143" name="TextBox 142">
+            <a:extLst>
+              <a:ext uri="{FF2B5EF4-FFF2-40B4-BE49-F238E27FC236}">
+                <a16:creationId xmlns:a16="http://schemas.microsoft.com/office/drawing/2014/main" id="{C0211767-B47D-7442-A6B9-F13152F0CDB7}"/>
+              </a:ext>
+            </a:extLst>
+          </p:cNvPr>
+          <p:cNvSpPr txBox="1"/>
+          <p:nvPr/>
+        </p:nvSpPr>
+        <p:spPr>
+          <a:xfrm>
+            <a:off x="10706737" y="2778193"/>
+            <a:ext cx="1163460" cy="369332"/>
+          </a:xfrm>
+          <a:prstGeom prst="rect">
+            <a:avLst/>
+          </a:prstGeom>
+          <a:noFill/>
+        </p:spPr>
+        <p:txBody>
+          <a:bodyPr wrap="none" rtlCol="0">
+            <a:spAutoFit/>
+          </a:bodyPr>
+          <a:lstStyle/>
+          <a:p>
+            <a:r>
+              <a:rPr lang="en-US" dirty="0"/>
+              <a:t>Objectives</a:t>
+            </a:r>
+          </a:p>
+        </p:txBody>
+      </p:sp>
+      <p:pic>
+        <p:nvPicPr>
+          <p:cNvPr id="144" name="Graphic 143" descr="Checkbox Checked">
+            <a:extLst>
+              <a:ext uri="{FF2B5EF4-FFF2-40B4-BE49-F238E27FC236}">
+                <a16:creationId xmlns:a16="http://schemas.microsoft.com/office/drawing/2014/main" id="{6E1569E5-9E6B-F14B-84E8-838E5B193DB5}"/>
+              </a:ext>
+            </a:extLst>
+          </p:cNvPr>
+          <p:cNvPicPr>
+            <a:picLocks noChangeAspect="1"/>
+          </p:cNvPicPr>
+          <p:nvPr/>
+        </p:nvPicPr>
+        <p:blipFill>
+          <a:blip r:embed="rId26">
+            <a:extLst>
+              <a:ext uri="{96DAC541-7B7A-43D3-8B79-37D633B846F1}">
+                <asvg:svgBlip xmlns:asvg="http://schemas.microsoft.com/office/drawing/2016/SVG/main" r:embed="rId27"/>
+              </a:ext>
+            </a:extLst>
+          </a:blip>
+          <a:stretch>
+            <a:fillRect/>
+          </a:stretch>
+        </p:blipFill>
+        <p:spPr>
+          <a:xfrm>
+            <a:off x="10205153" y="2695955"/>
+            <a:ext cx="533808" cy="533808"/>
+          </a:xfrm>
+          <a:prstGeom prst="rect">
+            <a:avLst/>
+          </a:prstGeom>
+        </p:spPr>
+      </p:pic>
+      <p:sp>
+        <p:nvSpPr>
+          <p:cNvPr id="78" name="Rounded Rectangle 77">
+            <a:extLst>
+              <a:ext uri="{FF2B5EF4-FFF2-40B4-BE49-F238E27FC236}">
+                <a16:creationId xmlns:a16="http://schemas.microsoft.com/office/drawing/2014/main" id="{EB20F37A-F32E-3A4C-B51C-C794C5C82BF7}"/>
+              </a:ext>
+            </a:extLst>
+          </p:cNvPr>
+          <p:cNvSpPr/>
+          <p:nvPr/>
+        </p:nvSpPr>
+        <p:spPr>
+          <a:xfrm>
+            <a:off x="2125620" y="1895181"/>
+            <a:ext cx="1170215" cy="674914"/>
+          </a:xfrm>
+          <a:prstGeom prst="roundRect">
+            <a:avLst/>
+          </a:prstGeom>
+          <a:solidFill>
+            <a:schemeClr val="accent1">
+              <a:lumMod val="75000"/>
+            </a:schemeClr>
+          </a:solidFill>
+          <a:ln w="19050">
+            <a:solidFill>
+              <a:schemeClr val="accent1">
+                <a:lumMod val="50000"/>
+              </a:schemeClr>
+            </a:solidFill>
+          </a:ln>
+        </p:spPr>
+        <p:style>
+          <a:lnRef idx="2">
+            <a:schemeClr val="accent1">
+              <a:shade val="50000"/>
+            </a:schemeClr>
+          </a:lnRef>
+          <a:fillRef idx="1">
+            <a:schemeClr val="accent1"/>
+          </a:fillRef>
+          <a:effectRef idx="0">
+            <a:schemeClr val="accent1"/>
+          </a:effectRef>
+          <a:fontRef idx="minor">
+            <a:schemeClr val="lt1"/>
+          </a:fontRef>
+        </p:style>
+        <p:txBody>
+          <a:bodyPr rtlCol="0" anchor="ctr"/>
+          <a:lstStyle/>
+          <a:p>
+            <a:pPr algn="ctr"/>
+            <a:r>
+              <a:rPr lang="en-US" dirty="0">
+                <a:solidFill>
+                  <a:schemeClr val="bg1"/>
+                </a:solidFill>
+              </a:rPr>
+              <a:t>v1.0</a:t>
+            </a:r>
+          </a:p>
+        </p:txBody>
+      </p:sp>
+      <p:sp>
+        <p:nvSpPr>
+          <p:cNvPr id="80" name="TextBox 79">
+            <a:extLst>
+              <a:ext uri="{FF2B5EF4-FFF2-40B4-BE49-F238E27FC236}">
+                <a16:creationId xmlns:a16="http://schemas.microsoft.com/office/drawing/2014/main" id="{D6D5CFEB-ADD0-FB4E-87D4-B596936CA19C}"/>
+              </a:ext>
+            </a:extLst>
+          </p:cNvPr>
+          <p:cNvSpPr txBox="1"/>
+          <p:nvPr/>
+        </p:nvSpPr>
+        <p:spPr>
+          <a:xfrm>
+            <a:off x="2048327" y="2577914"/>
+            <a:ext cx="700833" cy="369332"/>
+          </a:xfrm>
+          <a:prstGeom prst="rect">
+            <a:avLst/>
+          </a:prstGeom>
+          <a:noFill/>
+        </p:spPr>
+        <p:txBody>
+          <a:bodyPr wrap="none" rtlCol="0">
+            <a:spAutoFit/>
+          </a:bodyPr>
+          <a:lstStyle/>
+          <a:p>
+            <a:r>
+              <a:rPr lang="en-US" dirty="0"/>
+              <a:t>100%</a:t>
+            </a:r>
+          </a:p>
+        </p:txBody>
+      </p:sp>
+      <p:sp>
+        <p:nvSpPr>
+          <p:cNvPr id="82" name="TextBox 81">
+            <a:extLst>
+              <a:ext uri="{FF2B5EF4-FFF2-40B4-BE49-F238E27FC236}">
+                <a16:creationId xmlns:a16="http://schemas.microsoft.com/office/drawing/2014/main" id="{C1BE52D7-2428-3B41-B21E-F73AD19B7208}"/>
+              </a:ext>
+            </a:extLst>
+          </p:cNvPr>
+          <p:cNvSpPr txBox="1"/>
+          <p:nvPr/>
+        </p:nvSpPr>
+        <p:spPr>
+          <a:xfrm>
+            <a:off x="2900400" y="1484710"/>
+            <a:ext cx="968535" cy="369332"/>
+          </a:xfrm>
+          <a:prstGeom prst="rect">
+            <a:avLst/>
+          </a:prstGeom>
+          <a:noFill/>
+        </p:spPr>
+        <p:txBody>
+          <a:bodyPr wrap="none" rtlCol="0">
+            <a:spAutoFit/>
+          </a:bodyPr>
+          <a:lstStyle/>
+          <a:p>
+            <a:r>
+              <a:rPr lang="en-US" dirty="0"/>
+              <a:t>Baseline</a:t>
+            </a:r>
+          </a:p>
+        </p:txBody>
+      </p:sp>
+      <p:sp>
+        <p:nvSpPr>
+          <p:cNvPr id="90" name="Rounded Rectangle 89">
+            <a:extLst>
+              <a:ext uri="{FF2B5EF4-FFF2-40B4-BE49-F238E27FC236}">
+                <a16:creationId xmlns:a16="http://schemas.microsoft.com/office/drawing/2014/main" id="{7AC27E10-D892-EA43-A5E1-321943983C21}"/>
+              </a:ext>
+            </a:extLst>
+          </p:cNvPr>
+          <p:cNvSpPr/>
+          <p:nvPr/>
+        </p:nvSpPr>
+        <p:spPr>
+          <a:xfrm>
+            <a:off x="3425792" y="1895181"/>
+            <a:ext cx="1170215" cy="674914"/>
+          </a:xfrm>
+          <a:prstGeom prst="roundRect">
+            <a:avLst/>
+          </a:prstGeom>
+          <a:solidFill>
+            <a:schemeClr val="accent1">
+              <a:lumMod val="75000"/>
+            </a:schemeClr>
+          </a:solidFill>
+          <a:ln w="19050">
+            <a:solidFill>
+              <a:schemeClr val="accent1">
+                <a:lumMod val="50000"/>
+              </a:schemeClr>
+            </a:solidFill>
+          </a:ln>
+        </p:spPr>
+        <p:style>
+          <a:lnRef idx="2">
+            <a:schemeClr val="accent1">
+              <a:shade val="50000"/>
+            </a:schemeClr>
+          </a:lnRef>
+          <a:fillRef idx="1">
+            <a:schemeClr val="accent1"/>
+          </a:fillRef>
+          <a:effectRef idx="0">
+            <a:schemeClr val="accent1"/>
+          </a:effectRef>
+          <a:fontRef idx="minor">
+            <a:schemeClr val="lt1"/>
+          </a:fontRef>
+        </p:style>
+        <p:txBody>
+          <a:bodyPr rtlCol="0" anchor="ctr"/>
+          <a:lstStyle/>
+          <a:p>
+            <a:pPr algn="ctr"/>
+            <a:r>
+              <a:rPr lang="en-US" dirty="0">
+                <a:solidFill>
+                  <a:schemeClr val="bg1"/>
+                </a:solidFill>
+              </a:rPr>
+              <a:t>v1.0</a:t>
+            </a:r>
+          </a:p>
+        </p:txBody>
+      </p:sp>
+      <p:sp>
+        <p:nvSpPr>
+          <p:cNvPr id="92" name="TextBox 91">
+            <a:extLst>
+              <a:ext uri="{FF2B5EF4-FFF2-40B4-BE49-F238E27FC236}">
+                <a16:creationId xmlns:a16="http://schemas.microsoft.com/office/drawing/2014/main" id="{AC2EC3CA-8B3C-0B4F-AD0F-23B1DD0D68E8}"/>
+              </a:ext>
+            </a:extLst>
+          </p:cNvPr>
+          <p:cNvSpPr txBox="1"/>
+          <p:nvPr/>
+        </p:nvSpPr>
+        <p:spPr>
+          <a:xfrm>
+            <a:off x="3957545" y="2561130"/>
+            <a:ext cx="693311" cy="369332"/>
+          </a:xfrm>
+          <a:prstGeom prst="rect">
+            <a:avLst/>
+          </a:prstGeom>
+          <a:noFill/>
+        </p:spPr>
+        <p:txBody>
+          <a:bodyPr wrap="square" rtlCol="0">
+            <a:spAutoFit/>
+          </a:bodyPr>
+          <a:lstStyle/>
+          <a:p>
+            <a:pPr algn="ctr"/>
+            <a:r>
+              <a:rPr lang="en-US" dirty="0"/>
+              <a:t>95%</a:t>
+            </a:r>
+          </a:p>
+        </p:txBody>
+      </p:sp>
+      <p:sp>
+        <p:nvSpPr>
+          <p:cNvPr id="93" name="TextBox 92">
+            <a:extLst>
+              <a:ext uri="{FF2B5EF4-FFF2-40B4-BE49-F238E27FC236}">
+                <a16:creationId xmlns:a16="http://schemas.microsoft.com/office/drawing/2014/main" id="{18B32EB2-8371-7F44-AB8E-0AD3DAC91E6E}"/>
+              </a:ext>
+            </a:extLst>
+          </p:cNvPr>
+          <p:cNvSpPr txBox="1"/>
+          <p:nvPr/>
+        </p:nvSpPr>
+        <p:spPr>
+          <a:xfrm>
+            <a:off x="10706737" y="2329806"/>
+            <a:ext cx="891911" cy="369332"/>
+          </a:xfrm>
+          <a:prstGeom prst="rect">
+            <a:avLst/>
+          </a:prstGeom>
+          <a:noFill/>
+        </p:spPr>
+        <p:txBody>
+          <a:bodyPr wrap="none" rtlCol="0">
+            <a:spAutoFit/>
+          </a:bodyPr>
+          <a:lstStyle/>
+          <a:p>
+            <a:r>
+              <a:rPr lang="en-US" dirty="0"/>
+              <a:t>Reward</a:t>
+            </a:r>
+          </a:p>
+        </p:txBody>
+      </p:sp>
+      <p:pic>
+        <p:nvPicPr>
+          <p:cNvPr id="103" name="Graphic 102" descr="Checkbox Checked">
+            <a:extLst>
+              <a:ext uri="{FF2B5EF4-FFF2-40B4-BE49-F238E27FC236}">
+                <a16:creationId xmlns:a16="http://schemas.microsoft.com/office/drawing/2014/main" id="{B874C88E-9E28-7047-9CDD-6F287761EB3B}"/>
+              </a:ext>
+            </a:extLst>
+          </p:cNvPr>
+          <p:cNvPicPr>
+            <a:picLocks noChangeAspect="1"/>
+          </p:cNvPicPr>
+          <p:nvPr/>
+        </p:nvPicPr>
+        <p:blipFill>
+          <a:blip r:embed="rId26">
+            <a:extLst>
+              <a:ext uri="{96DAC541-7B7A-43D3-8B79-37D633B846F1}">
+                <asvg:svgBlip xmlns:asvg="http://schemas.microsoft.com/office/drawing/2016/SVG/main" r:embed="rId27"/>
+              </a:ext>
+            </a:extLst>
+          </a:blip>
+          <a:stretch>
+            <a:fillRect/>
+          </a:stretch>
+        </p:blipFill>
+        <p:spPr>
+          <a:xfrm>
+            <a:off x="10205153" y="2247568"/>
+            <a:ext cx="533808" cy="533808"/>
+          </a:xfrm>
+          <a:prstGeom prst="rect">
+            <a:avLst/>
+          </a:prstGeom>
+        </p:spPr>
+      </p:pic>
+      <p:sp>
+        <p:nvSpPr>
+          <p:cNvPr id="104" name="TextBox 103">
+            <a:extLst>
+              <a:ext uri="{FF2B5EF4-FFF2-40B4-BE49-F238E27FC236}">
+                <a16:creationId xmlns:a16="http://schemas.microsoft.com/office/drawing/2014/main" id="{20D5CFD9-86BF-E94C-9D1D-4E1F7A619AE9}"/>
+              </a:ext>
+            </a:extLst>
+          </p:cNvPr>
+          <p:cNvSpPr txBox="1"/>
+          <p:nvPr/>
+        </p:nvSpPr>
+        <p:spPr>
+          <a:xfrm>
+            <a:off x="10706737" y="3245636"/>
+            <a:ext cx="934871" cy="369332"/>
+          </a:xfrm>
+          <a:prstGeom prst="rect">
+            <a:avLst/>
+          </a:prstGeom>
+          <a:noFill/>
+        </p:spPr>
+        <p:txBody>
+          <a:bodyPr wrap="none" rtlCol="0">
+            <a:spAutoFit/>
+          </a:bodyPr>
+          <a:lstStyle/>
+          <a:p>
+            <a:r>
+              <a:rPr lang="en-US" dirty="0"/>
+              <a:t>Support</a:t>
+            </a:r>
+          </a:p>
+        </p:txBody>
+      </p:sp>
+      <p:pic>
+        <p:nvPicPr>
+          <p:cNvPr id="106" name="Graphic 105" descr="Checkbox Checked">
+            <a:extLst>
+              <a:ext uri="{FF2B5EF4-FFF2-40B4-BE49-F238E27FC236}">
+                <a16:creationId xmlns:a16="http://schemas.microsoft.com/office/drawing/2014/main" id="{83577553-2109-2748-85A1-FA1E97592823}"/>
+              </a:ext>
+            </a:extLst>
+          </p:cNvPr>
+          <p:cNvPicPr>
+            <a:picLocks noChangeAspect="1"/>
+          </p:cNvPicPr>
+          <p:nvPr/>
+        </p:nvPicPr>
+        <p:blipFill>
+          <a:blip r:embed="rId26">
+            <a:extLst>
+              <a:ext uri="{96DAC541-7B7A-43D3-8B79-37D633B846F1}">
+                <asvg:svgBlip xmlns:asvg="http://schemas.microsoft.com/office/drawing/2016/SVG/main" r:embed="rId27"/>
+              </a:ext>
+            </a:extLst>
+          </a:blip>
+          <a:stretch>
+            <a:fillRect/>
+          </a:stretch>
+        </p:blipFill>
+        <p:spPr>
+          <a:xfrm>
+            <a:off x="10205153" y="3163398"/>
+            <a:ext cx="533808" cy="533808"/>
+          </a:xfrm>
+          <a:prstGeom prst="rect">
+            <a:avLst/>
+          </a:prstGeom>
+        </p:spPr>
+      </p:pic>
+      <p:sp>
+        <p:nvSpPr>
+          <p:cNvPr id="12" name="TextBox 11">
+            <a:extLst>
+              <a:ext uri="{FF2B5EF4-FFF2-40B4-BE49-F238E27FC236}">
+                <a16:creationId xmlns:a16="http://schemas.microsoft.com/office/drawing/2014/main" id="{BCC0A621-158E-E845-BE95-931B08ACB5DE}"/>
+              </a:ext>
+            </a:extLst>
+          </p:cNvPr>
+          <p:cNvSpPr txBox="1"/>
+          <p:nvPr/>
+        </p:nvSpPr>
+        <p:spPr>
+          <a:xfrm>
+            <a:off x="294874" y="447478"/>
+            <a:ext cx="2978251" cy="369332"/>
+          </a:xfrm>
+          <a:prstGeom prst="rect">
+            <a:avLst/>
+          </a:prstGeom>
+          <a:noFill/>
+        </p:spPr>
+        <p:txBody>
+          <a:bodyPr wrap="none" rtlCol="0">
+            <a:spAutoFit/>
+          </a:bodyPr>
+          <a:lstStyle/>
+          <a:p>
+            <a:r>
+              <a:rPr lang="en-US" dirty="0"/>
+              <a:t>Min-scale / other annotations</a:t>
+            </a:r>
+          </a:p>
+        </p:txBody>
+      </p:sp>
+      <p:sp>
+        <p:nvSpPr>
+          <p:cNvPr id="107" name="TextBox 106">
+            <a:extLst>
+              <a:ext uri="{FF2B5EF4-FFF2-40B4-BE49-F238E27FC236}">
+                <a16:creationId xmlns:a16="http://schemas.microsoft.com/office/drawing/2014/main" id="{ACCA49A9-088C-054B-B0C3-EA965A8DD573}"/>
+              </a:ext>
+            </a:extLst>
+          </p:cNvPr>
+          <p:cNvSpPr txBox="1"/>
+          <p:nvPr/>
+        </p:nvSpPr>
+        <p:spPr>
+          <a:xfrm>
+            <a:off x="3741362" y="456231"/>
+            <a:ext cx="6619313" cy="369332"/>
+          </a:xfrm>
+          <a:prstGeom prst="rect">
+            <a:avLst/>
+          </a:prstGeom>
+          <a:noFill/>
+        </p:spPr>
+        <p:txBody>
+          <a:bodyPr wrap="none" rtlCol="0">
+            <a:spAutoFit/>
+          </a:bodyPr>
+          <a:lstStyle/>
+          <a:p>
+            <a:r>
+              <a:rPr lang="en-US" dirty="0"/>
+              <a:t>Utilization metrics – add in CPU/Memory utilization based objectives</a:t>
+            </a:r>
+          </a:p>
+        </p:txBody>
+      </p:sp>
+      <p:sp>
+        <p:nvSpPr>
+          <p:cNvPr id="108" name="TextBox 107">
+            <a:extLst>
+              <a:ext uri="{FF2B5EF4-FFF2-40B4-BE49-F238E27FC236}">
+                <a16:creationId xmlns:a16="http://schemas.microsoft.com/office/drawing/2014/main" id="{97CAF892-55AC-A147-A74C-1162FA0D3127}"/>
+              </a:ext>
+            </a:extLst>
+          </p:cNvPr>
+          <p:cNvSpPr txBox="1"/>
+          <p:nvPr/>
+        </p:nvSpPr>
+        <p:spPr>
+          <a:xfrm>
+            <a:off x="8261681" y="877073"/>
+            <a:ext cx="3702424" cy="369332"/>
+          </a:xfrm>
+          <a:prstGeom prst="rect">
+            <a:avLst/>
+          </a:prstGeom>
+          <a:noFill/>
+        </p:spPr>
+        <p:txBody>
+          <a:bodyPr wrap="none" rtlCol="0">
+            <a:spAutoFit/>
+          </a:bodyPr>
+          <a:lstStyle/>
+          <a:p>
+            <a:r>
+              <a:rPr lang="en-US" dirty="0"/>
+              <a:t>Prometheus + New Relic data sources</a:t>
+            </a:r>
+          </a:p>
+        </p:txBody>
+      </p:sp>
+    </p:spTree>
+    <p:extLst>
+      <p:ext uri="{BB962C8B-B14F-4D97-AF65-F5344CB8AC3E}">
+        <p14:creationId xmlns:p14="http://schemas.microsoft.com/office/powerpoint/2010/main" val="2941583146"/>
       </p:ext>
     </p:extLst>
   </p:cSld>

</xml_diff>

<commit_message>
new landing page (#533)
</commit_message>
<xml_diff>
--- a/mkdocs/src/assets/images/iter8++images.pptx
+++ b/mkdocs/src/assets/images/iter8++images.pptx
@@ -15681,7 +15681,7 @@
         </p:blipFill>
         <p:spPr>
           <a:xfrm>
-            <a:off x="3268440" y="3021711"/>
+            <a:off x="3709860" y="3021711"/>
             <a:ext cx="837897" cy="837897"/>
           </a:xfrm>
           <a:prstGeom prst="rect">
@@ -15713,7 +15713,7 @@
         </p:nvSpPr>
         <p:spPr>
           <a:xfrm>
-            <a:off x="4667857" y="3010051"/>
+            <a:off x="4920097" y="3010051"/>
             <a:ext cx="2200689" cy="837896"/>
           </a:xfrm>
           <a:prstGeom prst="roundRect">
@@ -15812,8 +15812,8 @@
         </p:nvCxnSpPr>
         <p:spPr>
           <a:xfrm flipV="1">
-            <a:off x="4106337" y="3428999"/>
-            <a:ext cx="561520" cy="11661"/>
+            <a:off x="4547757" y="3428999"/>
+            <a:ext cx="372340" cy="11661"/>
           </a:xfrm>
           <a:prstGeom prst="straightConnector1">
             <a:avLst/>
@@ -15863,7 +15863,7 @@
         </p:nvSpPr>
         <p:spPr>
           <a:xfrm>
-            <a:off x="5475754" y="1415655"/>
+            <a:off x="5738504" y="1415655"/>
             <a:ext cx="570967" cy="426142"/>
           </a:xfrm>
           <a:prstGeom prst="round2SameRect">
@@ -15964,7 +15964,7 @@
         </p:nvSpPr>
         <p:spPr>
           <a:xfrm>
-            <a:off x="3906240" y="1415655"/>
+            <a:off x="4369087" y="1409914"/>
             <a:ext cx="570967" cy="426142"/>
           </a:xfrm>
           <a:prstGeom prst="round2SameRect">
@@ -16065,7 +16065,7 @@
         </p:nvSpPr>
         <p:spPr>
           <a:xfrm>
-            <a:off x="7037075" y="1415655"/>
+            <a:off x="7088912" y="1415655"/>
             <a:ext cx="570967" cy="426142"/>
           </a:xfrm>
           <a:prstGeom prst="round2SameRect">
@@ -16170,8 +16170,8 @@
         </p:nvCxnSpPr>
         <p:spPr>
           <a:xfrm flipH="1" flipV="1">
-            <a:off x="4191724" y="1841797"/>
-            <a:ext cx="1576478" cy="1168254"/>
+            <a:off x="4654571" y="1836056"/>
+            <a:ext cx="1365871" cy="1173995"/>
           </a:xfrm>
           <a:prstGeom prst="straightConnector1">
             <a:avLst/>
@@ -16225,9 +16225,9 @@
           <p:nvPr/>
         </p:nvCxnSpPr>
         <p:spPr>
-          <a:xfrm flipH="1" flipV="1">
-            <a:off x="5761238" y="1841797"/>
-            <a:ext cx="6964" cy="1168254"/>
+          <a:xfrm flipV="1">
+            <a:off x="6020442" y="1841797"/>
+            <a:ext cx="3546" cy="1168254"/>
           </a:xfrm>
           <a:prstGeom prst="straightConnector1">
             <a:avLst/>
@@ -16282,8 +16282,8 @@
         </p:nvCxnSpPr>
         <p:spPr>
           <a:xfrm flipV="1">
-            <a:off x="5768202" y="1841797"/>
-            <a:ext cx="1554357" cy="1168254"/>
+            <a:off x="6020442" y="1841797"/>
+            <a:ext cx="1353954" cy="1168254"/>
           </a:xfrm>
           <a:prstGeom prst="straightConnector1">
             <a:avLst/>
@@ -16347,7 +16347,7 @@
         </p:blipFill>
         <p:spPr>
           <a:xfrm>
-            <a:off x="7394760" y="2707590"/>
+            <a:off x="7394760" y="2150557"/>
             <a:ext cx="899398" cy="760309"/>
           </a:xfrm>
           <a:prstGeom prst="rect">
@@ -16390,7 +16390,7 @@
         </p:blipFill>
         <p:spPr>
           <a:xfrm>
-            <a:off x="8126640" y="2707590"/>
+            <a:off x="8126640" y="2150557"/>
             <a:ext cx="899398" cy="760309"/>
           </a:xfrm>
           <a:prstGeom prst="rect">
@@ -16433,7 +16433,7 @@
         </p:blipFill>
         <p:spPr>
           <a:xfrm>
-            <a:off x="8843708" y="2707590"/>
+            <a:off x="8843708" y="2150557"/>
             <a:ext cx="899398" cy="760309"/>
           </a:xfrm>
           <a:prstGeom prst="rect">
@@ -16466,8 +16466,8 @@
         </p:nvCxnSpPr>
         <p:spPr>
           <a:xfrm rot="10800000">
-            <a:off x="5768202" y="3847948"/>
-            <a:ext cx="926562" cy="512341"/>
+            <a:off x="6020443" y="3847948"/>
+            <a:ext cx="1178813" cy="239075"/>
           </a:xfrm>
           <a:prstGeom prst="bentConnector2">
             <a:avLst/>
@@ -16514,15 +16514,15 @@
           </p:cNvPr>
           <p:cNvCxnSpPr>
             <a:cxnSpLocks/>
-            <a:stCxn id="26" idx="2"/>
+            <a:stCxn id="29" idx="2"/>
             <a:endCxn id="49" idx="6"/>
           </p:cNvCxnSpPr>
           <p:nvPr/>
         </p:nvCxnSpPr>
         <p:spPr>
           <a:xfrm rot="5400000">
-            <a:off x="7646558" y="3430506"/>
-            <a:ext cx="892389" cy="967175"/>
+            <a:off x="8094272" y="3605467"/>
+            <a:ext cx="500939" cy="462171"/>
           </a:xfrm>
           <a:prstGeom prst="bentConnector2">
             <a:avLst/>
@@ -16587,7 +16587,7 @@
         </p:blipFill>
         <p:spPr bwMode="auto">
           <a:xfrm flipH="1">
-            <a:off x="4760759" y="3159255"/>
+            <a:off x="5012999" y="3159255"/>
             <a:ext cx="544348" cy="536646"/>
           </a:xfrm>
           <a:prstGeom prst="rect">
@@ -16634,7 +16634,7 @@
         </p:blipFill>
         <p:spPr bwMode="auto">
           <a:xfrm>
-            <a:off x="6227605" y="3164610"/>
+            <a:off x="6479845" y="3164610"/>
             <a:ext cx="532063" cy="532063"/>
           </a:xfrm>
           <a:prstGeom prst="rect">
@@ -16666,7 +16666,7 @@
         </p:nvSpPr>
         <p:spPr>
           <a:xfrm>
-            <a:off x="6694764" y="3940155"/>
+            <a:off x="7199255" y="3666889"/>
             <a:ext cx="914400" cy="840266"/>
           </a:xfrm>
           <a:prstGeom prst="ellipse">
@@ -16773,7 +16773,7 @@
         </p:blipFill>
         <p:spPr>
           <a:xfrm>
-            <a:off x="6819216" y="4027540"/>
+            <a:off x="7323707" y="3754274"/>
             <a:ext cx="665496" cy="665496"/>
           </a:xfrm>
           <a:prstGeom prst="rect">
@@ -16800,17 +16800,18 @@
           <p:cNvCxnSpPr>
             <a:cxnSpLocks/>
             <a:stCxn id="13" idx="3"/>
+            <a:endCxn id="26" idx="0"/>
           </p:cNvCxnSpPr>
           <p:nvPr/>
         </p:nvCxnSpPr>
         <p:spPr>
           <a:xfrm rot="16200000" flipH="1">
-            <a:off x="5854199" y="-246821"/>
-            <a:ext cx="1056753" cy="4381705"/>
+            <a:off x="6245133" y="-180649"/>
+            <a:ext cx="740643" cy="3921768"/>
           </a:xfrm>
           <a:prstGeom prst="bentConnector3">
             <a:avLst>
-              <a:gd name="adj1" fmla="val -21632"/>
+              <a:gd name="adj1" fmla="val -30865"/>
             </a:avLst>
           </a:prstGeom>
           <a:ln w="25400">
@@ -16844,119 +16845,6 @@
           </a:fontRef>
         </p:style>
       </p:cxnSp>
-      <p:cxnSp>
-        <p:nvCxnSpPr>
-          <p:cNvPr id="67" name="Elbow Connector 66">
-            <a:extLst>
-              <a:ext uri="{FF2B5EF4-FFF2-40B4-BE49-F238E27FC236}">
-                <a16:creationId xmlns:a16="http://schemas.microsoft.com/office/drawing/2014/main" id="{DDDB8E4C-582C-FE4E-8B10-DD7BE0BC9090}"/>
-              </a:ext>
-            </a:extLst>
-          </p:cNvPr>
-          <p:cNvCxnSpPr>
-            <a:cxnSpLocks/>
-            <a:stCxn id="12" idx="3"/>
-          </p:cNvCxnSpPr>
-          <p:nvPr/>
-        </p:nvCxnSpPr>
-        <p:spPr>
-          <a:xfrm rot="16200000" flipH="1">
-            <a:off x="6638956" y="537936"/>
-            <a:ext cx="1056753" cy="2812191"/>
-          </a:xfrm>
-          <a:prstGeom prst="bentConnector3">
-            <a:avLst>
-              <a:gd name="adj1" fmla="val -21632"/>
-            </a:avLst>
-          </a:prstGeom>
-          <a:ln w="25400">
-            <a:solidFill>
-              <a:schemeClr val="bg2">
-                <a:lumMod val="75000"/>
-              </a:schemeClr>
-            </a:solidFill>
-            <a:tailEnd type="triangle"/>
-          </a:ln>
-          <a:effectLst>
-            <a:outerShdw blurRad="50800" dist="38100" dir="2700000" algn="tl" rotWithShape="0">
-              <a:prstClr val="black">
-                <a:alpha val="40000"/>
-              </a:prstClr>
-            </a:outerShdw>
-          </a:effectLst>
-        </p:spPr>
-        <p:style>
-          <a:lnRef idx="1">
-            <a:schemeClr val="accent1"/>
-          </a:lnRef>
-          <a:fillRef idx="0">
-            <a:schemeClr val="accent1"/>
-          </a:fillRef>
-          <a:effectRef idx="0">
-            <a:schemeClr val="accent1"/>
-          </a:effectRef>
-          <a:fontRef idx="minor">
-            <a:schemeClr val="tx1"/>
-          </a:fontRef>
-        </p:style>
-      </p:cxnSp>
-      <p:cxnSp>
-        <p:nvCxnSpPr>
-          <p:cNvPr id="73" name="Elbow Connector 72">
-            <a:extLst>
-              <a:ext uri="{FF2B5EF4-FFF2-40B4-BE49-F238E27FC236}">
-                <a16:creationId xmlns:a16="http://schemas.microsoft.com/office/drawing/2014/main" id="{E619FFBA-9AE5-3843-ADCC-700059704CA2}"/>
-              </a:ext>
-            </a:extLst>
-          </p:cNvPr>
-          <p:cNvCxnSpPr>
-            <a:cxnSpLocks/>
-            <a:stCxn id="14" idx="3"/>
-            <a:endCxn id="32" idx="0"/>
-          </p:cNvCxnSpPr>
-          <p:nvPr/>
-        </p:nvCxnSpPr>
-        <p:spPr>
-          <a:xfrm rot="16200000" flipH="1">
-            <a:off x="7524624" y="1213590"/>
-            <a:ext cx="854146" cy="1258277"/>
-          </a:xfrm>
-          <a:prstGeom prst="bentConnector3">
-            <a:avLst>
-              <a:gd name="adj1" fmla="val -26764"/>
-            </a:avLst>
-          </a:prstGeom>
-          <a:ln w="25400">
-            <a:solidFill>
-              <a:schemeClr val="bg2">
-                <a:lumMod val="75000"/>
-              </a:schemeClr>
-            </a:solidFill>
-            <a:tailEnd type="triangle"/>
-          </a:ln>
-          <a:effectLst>
-            <a:outerShdw blurRad="50800" dist="38100" dir="2700000" algn="tl" rotWithShape="0">
-              <a:prstClr val="black">
-                <a:alpha val="40000"/>
-              </a:prstClr>
-            </a:outerShdw>
-          </a:effectLst>
-        </p:spPr>
-        <p:style>
-          <a:lnRef idx="1">
-            <a:schemeClr val="accent1"/>
-          </a:lnRef>
-          <a:fillRef idx="0">
-            <a:schemeClr val="accent1"/>
-          </a:fillRef>
-          <a:effectRef idx="0">
-            <a:schemeClr val="accent1"/>
-          </a:effectRef>
-          <a:fontRef idx="minor">
-            <a:schemeClr val="tx1"/>
-          </a:fontRef>
-        </p:style>
-      </p:cxnSp>
       <p:pic>
         <p:nvPicPr>
           <p:cNvPr id="28" name="Graphic 27" descr="Ribbon">
@@ -16985,7 +16873,7 @@
         </p:blipFill>
         <p:spPr>
           <a:xfrm>
-            <a:off x="6648457" y="1427748"/>
+            <a:off x="6700294" y="1427748"/>
             <a:ext cx="570967" cy="570967"/>
           </a:xfrm>
           <a:prstGeom prst="rect">
@@ -17022,7 +16910,7 @@
         </p:blipFill>
         <p:spPr bwMode="auto">
           <a:xfrm>
-            <a:off x="5471012" y="3151636"/>
+            <a:off x="5723252" y="3151636"/>
             <a:ext cx="658305" cy="532063"/>
           </a:xfrm>
           <a:prstGeom prst="rect">
@@ -17116,8 +17004,8 @@
         </p:nvSpPr>
         <p:spPr>
           <a:xfrm>
-            <a:off x="4122870" y="2156544"/>
-            <a:ext cx="3286702" cy="638672"/>
+            <a:off x="4975003" y="2104774"/>
+            <a:ext cx="2075158" cy="638672"/>
           </a:xfrm>
           <a:prstGeom prst="roundRect">
             <a:avLst/>
@@ -17155,17 +17043,17 @@
                   </a:schemeClr>
                 </a:solidFill>
               </a:rPr>
-              <a:t>AI-powered validation, progressive delivery and rollout</a:t>
+              <a:t>Release strategies powered by AIOps</a:t>
             </a:r>
           </a:p>
         </p:txBody>
       </p:sp>
       <p:sp>
         <p:nvSpPr>
-          <p:cNvPr id="32" name="Rounded Rectangle 31">
-            <a:extLst>
-              <a:ext uri="{FF2B5EF4-FFF2-40B4-BE49-F238E27FC236}">
-                <a16:creationId xmlns:a16="http://schemas.microsoft.com/office/drawing/2014/main" id="{9D9C5014-B702-3A41-B600-404AE9895C7C}"/>
+          <p:cNvPr id="45" name="Rounded Rectangle 44">
+            <a:extLst>
+              <a:ext uri="{FF2B5EF4-FFF2-40B4-BE49-F238E27FC236}">
+                <a16:creationId xmlns:a16="http://schemas.microsoft.com/office/drawing/2014/main" id="{E78E87AF-38C8-8C40-A1D4-4E72C94048B6}"/>
               </a:ext>
             </a:extLst>
           </p:cNvPr>
@@ -17174,8 +17062,64 @@
         </p:nvSpPr>
         <p:spPr>
           <a:xfrm>
-            <a:off x="7887662" y="2269801"/>
+            <a:off x="6978649" y="4580091"/>
             <a:ext cx="1386348" cy="412158"/>
+          </a:xfrm>
+          <a:prstGeom prst="roundRect">
+            <a:avLst/>
+          </a:prstGeom>
+          <a:solidFill>
+            <a:schemeClr val="bg1"/>
+          </a:solidFill>
+        </p:spPr>
+        <p:style>
+          <a:lnRef idx="2">
+            <a:schemeClr val="accent1">
+              <a:shade val="50000"/>
+            </a:schemeClr>
+          </a:lnRef>
+          <a:fillRef idx="1">
+            <a:schemeClr val="accent1"/>
+          </a:fillRef>
+          <a:effectRef idx="0">
+            <a:schemeClr val="accent1"/>
+          </a:effectRef>
+          <a:fontRef idx="minor">
+            <a:schemeClr val="lt1"/>
+          </a:fontRef>
+        </p:style>
+        <p:txBody>
+          <a:bodyPr rtlCol="0" anchor="ctr"/>
+          <a:lstStyle/>
+          <a:p>
+            <a:pPr algn="ctr"/>
+            <a:r>
+              <a:rPr lang="en-US" b="1" dirty="0">
+                <a:solidFill>
+                  <a:srgbClr val="C00000"/>
+                </a:solidFill>
+              </a:rPr>
+              <a:t>Iter8</a:t>
+            </a:r>
+          </a:p>
+        </p:txBody>
+      </p:sp>
+      <p:sp>
+        <p:nvSpPr>
+          <p:cNvPr id="29" name="Rounded Rectangle 28">
+            <a:extLst>
+              <a:ext uri="{FF2B5EF4-FFF2-40B4-BE49-F238E27FC236}">
+                <a16:creationId xmlns:a16="http://schemas.microsoft.com/office/drawing/2014/main" id="{4CEBC92F-09C0-E548-81F1-4D5CE7CA1A48}"/>
+              </a:ext>
+            </a:extLst>
+          </p:cNvPr>
+          <p:cNvSpPr/>
+          <p:nvPr/>
+        </p:nvSpPr>
+        <p:spPr>
+          <a:xfrm>
+            <a:off x="7860506" y="2920587"/>
+            <a:ext cx="1430639" cy="665496"/>
           </a:xfrm>
           <a:prstGeom prst="roundRect">
             <a:avLst/>
@@ -17213,67 +17157,119 @@
                   </a:schemeClr>
                 </a:solidFill>
               </a:rPr>
-              <a:t>Metrics</a:t>
+              <a:t>Any metrics database</a:t>
             </a:r>
           </a:p>
         </p:txBody>
       </p:sp>
-      <p:sp>
-        <p:nvSpPr>
-          <p:cNvPr id="45" name="Rounded Rectangle 44">
-            <a:extLst>
-              <a:ext uri="{FF2B5EF4-FFF2-40B4-BE49-F238E27FC236}">
-                <a16:creationId xmlns:a16="http://schemas.microsoft.com/office/drawing/2014/main" id="{E78E87AF-38C8-8C40-A1D4-4E72C94048B6}"/>
-              </a:ext>
-            </a:extLst>
-          </p:cNvPr>
-          <p:cNvSpPr/>
-          <p:nvPr/>
-        </p:nvSpPr>
-        <p:spPr>
-          <a:xfrm>
-            <a:off x="6474158" y="4853357"/>
-            <a:ext cx="1386348" cy="412158"/>
-          </a:xfrm>
-          <a:prstGeom prst="roundRect">
-            <a:avLst/>
-          </a:prstGeom>
-          <a:solidFill>
-            <a:schemeClr val="bg1"/>
-          </a:solidFill>
+      <p:cxnSp>
+        <p:nvCxnSpPr>
+          <p:cNvPr id="42" name="Straight Arrow Connector 41">
+            <a:extLst>
+              <a:ext uri="{FF2B5EF4-FFF2-40B4-BE49-F238E27FC236}">
+                <a16:creationId xmlns:a16="http://schemas.microsoft.com/office/drawing/2014/main" id="{C41C87ED-ECFF-0C42-9A41-DDF9D2233A1C}"/>
+              </a:ext>
+            </a:extLst>
+          </p:cNvPr>
+          <p:cNvCxnSpPr>
+            <a:cxnSpLocks/>
+            <a:stCxn id="12" idx="3"/>
+          </p:cNvCxnSpPr>
+          <p:nvPr/>
+        </p:nvCxnSpPr>
+        <p:spPr>
+          <a:xfrm flipV="1">
+            <a:off x="6023988" y="1198179"/>
+            <a:ext cx="0" cy="217476"/>
+          </a:xfrm>
+          <a:prstGeom prst="straightConnector1">
+            <a:avLst/>
+          </a:prstGeom>
+          <a:ln w="25400">
+            <a:solidFill>
+              <a:schemeClr val="bg2">
+                <a:lumMod val="75000"/>
+              </a:schemeClr>
+            </a:solidFill>
+            <a:tailEnd type="none" w="lg" len="lg"/>
+          </a:ln>
+          <a:effectLst>
+            <a:outerShdw blurRad="50800" dist="38100" dir="2700000" algn="tl" rotWithShape="0">
+              <a:prstClr val="black">
+                <a:alpha val="40000"/>
+              </a:prstClr>
+            </a:outerShdw>
+          </a:effectLst>
         </p:spPr>
         <p:style>
-          <a:lnRef idx="2">
-            <a:schemeClr val="accent1">
-              <a:shade val="50000"/>
-            </a:schemeClr>
+          <a:lnRef idx="1">
+            <a:schemeClr val="accent1"/>
           </a:lnRef>
-          <a:fillRef idx="1">
+          <a:fillRef idx="0">
             <a:schemeClr val="accent1"/>
           </a:fillRef>
           <a:effectRef idx="0">
             <a:schemeClr val="accent1"/>
           </a:effectRef>
           <a:fontRef idx="minor">
-            <a:schemeClr val="lt1"/>
+            <a:schemeClr val="tx1"/>
           </a:fontRef>
         </p:style>
-        <p:txBody>
-          <a:bodyPr rtlCol="0" anchor="ctr"/>
-          <a:lstStyle/>
-          <a:p>
-            <a:pPr algn="ctr"/>
-            <a:r>
-              <a:rPr lang="en-US" b="1" dirty="0">
-                <a:solidFill>
-                  <a:srgbClr val="C00000"/>
-                </a:solidFill>
-              </a:rPr>
-              <a:t>Iter8</a:t>
-            </a:r>
-          </a:p>
-        </p:txBody>
-      </p:sp>
+      </p:cxnSp>
+      <p:cxnSp>
+        <p:nvCxnSpPr>
+          <p:cNvPr id="46" name="Straight Arrow Connector 45">
+            <a:extLst>
+              <a:ext uri="{FF2B5EF4-FFF2-40B4-BE49-F238E27FC236}">
+                <a16:creationId xmlns:a16="http://schemas.microsoft.com/office/drawing/2014/main" id="{2A0FCA99-01CB-8C40-98AF-0411635A8ADC}"/>
+              </a:ext>
+            </a:extLst>
+          </p:cNvPr>
+          <p:cNvCxnSpPr>
+            <a:cxnSpLocks/>
+            <a:stCxn id="14" idx="3"/>
+          </p:cNvCxnSpPr>
+          <p:nvPr/>
+        </p:nvCxnSpPr>
+        <p:spPr>
+          <a:xfrm flipV="1">
+            <a:off x="7374396" y="1198179"/>
+            <a:ext cx="0" cy="217476"/>
+          </a:xfrm>
+          <a:prstGeom prst="straightConnector1">
+            <a:avLst/>
+          </a:prstGeom>
+          <a:ln w="25400">
+            <a:solidFill>
+              <a:schemeClr val="bg2">
+                <a:lumMod val="75000"/>
+              </a:schemeClr>
+            </a:solidFill>
+            <a:tailEnd type="none" w="lg" len="lg"/>
+          </a:ln>
+          <a:effectLst>
+            <a:outerShdw blurRad="50800" dist="38100" dir="2700000" algn="tl" rotWithShape="0">
+              <a:prstClr val="black">
+                <a:alpha val="40000"/>
+              </a:prstClr>
+            </a:outerShdw>
+          </a:effectLst>
+        </p:spPr>
+        <p:style>
+          <a:lnRef idx="1">
+            <a:schemeClr val="accent1"/>
+          </a:lnRef>
+          <a:fillRef idx="0">
+            <a:schemeClr val="accent1"/>
+          </a:fillRef>
+          <a:effectRef idx="0">
+            <a:schemeClr val="accent1"/>
+          </a:effectRef>
+          <a:fontRef idx="minor">
+            <a:schemeClr val="tx1"/>
+          </a:fontRef>
+        </p:style>
+      </p:cxnSp>
     </p:spTree>
     <p:extLst>
       <p:ext uri="{BB962C8B-B14F-4D97-AF65-F5344CB8AC3E}">

</xml_diff>

<commit_message>
landing page + slack
</commit_message>
<xml_diff>
--- a/mkdocs/src/assets/images/iter8++images.pptx
+++ b/mkdocs/src/assets/images/iter8++images.pptx
@@ -219,7 +219,7 @@
           <a:p>
             <a:fld id="{38B78CBE-37FA-D241-BB4C-CAC5D3B25F49}" type="datetimeFigureOut">
               <a:rPr lang="en-US" smtClean="0"/>
-              <a:t>3/14/21</a:t>
+              <a:t>3/15/21</a:t>
             </a:fld>
             <a:endParaRPr lang="en-US"/>
           </a:p>
@@ -801,7 +801,7 @@
           <a:p>
             <a:fld id="{79212C04-F6AE-AE48-B29D-E5DED656B647}" type="datetimeFigureOut">
               <a:rPr lang="en-US" smtClean="0"/>
-              <a:t>3/14/21</a:t>
+              <a:t>3/15/21</a:t>
             </a:fld>
             <a:endParaRPr lang="en-US"/>
           </a:p>
@@ -999,7 +999,7 @@
           <a:p>
             <a:fld id="{79212C04-F6AE-AE48-B29D-E5DED656B647}" type="datetimeFigureOut">
               <a:rPr lang="en-US" smtClean="0"/>
-              <a:t>3/14/21</a:t>
+              <a:t>3/15/21</a:t>
             </a:fld>
             <a:endParaRPr lang="en-US"/>
           </a:p>
@@ -1207,7 +1207,7 @@
           <a:p>
             <a:fld id="{79212C04-F6AE-AE48-B29D-E5DED656B647}" type="datetimeFigureOut">
               <a:rPr lang="en-US" smtClean="0"/>
-              <a:t>3/14/21</a:t>
+              <a:t>3/15/21</a:t>
             </a:fld>
             <a:endParaRPr lang="en-US"/>
           </a:p>
@@ -1405,7 +1405,7 @@
           <a:p>
             <a:fld id="{79212C04-F6AE-AE48-B29D-E5DED656B647}" type="datetimeFigureOut">
               <a:rPr lang="en-US" smtClean="0"/>
-              <a:t>3/14/21</a:t>
+              <a:t>3/15/21</a:t>
             </a:fld>
             <a:endParaRPr lang="en-US"/>
           </a:p>
@@ -1680,7 +1680,7 @@
           <a:p>
             <a:fld id="{79212C04-F6AE-AE48-B29D-E5DED656B647}" type="datetimeFigureOut">
               <a:rPr lang="en-US" smtClean="0"/>
-              <a:t>3/14/21</a:t>
+              <a:t>3/15/21</a:t>
             </a:fld>
             <a:endParaRPr lang="en-US"/>
           </a:p>
@@ -1945,7 +1945,7 @@
           <a:p>
             <a:fld id="{79212C04-F6AE-AE48-B29D-E5DED656B647}" type="datetimeFigureOut">
               <a:rPr lang="en-US" smtClean="0"/>
-              <a:t>3/14/21</a:t>
+              <a:t>3/15/21</a:t>
             </a:fld>
             <a:endParaRPr lang="en-US"/>
           </a:p>
@@ -2357,7 +2357,7 @@
           <a:p>
             <a:fld id="{79212C04-F6AE-AE48-B29D-E5DED656B647}" type="datetimeFigureOut">
               <a:rPr lang="en-US" smtClean="0"/>
-              <a:t>3/14/21</a:t>
+              <a:t>3/15/21</a:t>
             </a:fld>
             <a:endParaRPr lang="en-US"/>
           </a:p>
@@ -2498,7 +2498,7 @@
           <a:p>
             <a:fld id="{79212C04-F6AE-AE48-B29D-E5DED656B647}" type="datetimeFigureOut">
               <a:rPr lang="en-US" smtClean="0"/>
-              <a:t>3/14/21</a:t>
+              <a:t>3/15/21</a:t>
             </a:fld>
             <a:endParaRPr lang="en-US"/>
           </a:p>
@@ -2611,7 +2611,7 @@
           <a:p>
             <a:fld id="{79212C04-F6AE-AE48-B29D-E5DED656B647}" type="datetimeFigureOut">
               <a:rPr lang="en-US" smtClean="0"/>
-              <a:t>3/14/21</a:t>
+              <a:t>3/15/21</a:t>
             </a:fld>
             <a:endParaRPr lang="en-US"/>
           </a:p>
@@ -2922,7 +2922,7 @@
           <a:p>
             <a:fld id="{79212C04-F6AE-AE48-B29D-E5DED656B647}" type="datetimeFigureOut">
               <a:rPr lang="en-US" smtClean="0"/>
-              <a:t>3/14/21</a:t>
+              <a:t>3/15/21</a:t>
             </a:fld>
             <a:endParaRPr lang="en-US"/>
           </a:p>
@@ -3210,7 +3210,7 @@
           <a:p>
             <a:fld id="{79212C04-F6AE-AE48-B29D-E5DED656B647}" type="datetimeFigureOut">
               <a:rPr lang="en-US" smtClean="0"/>
-              <a:t>3/14/21</a:t>
+              <a:t>3/15/21</a:t>
             </a:fld>
             <a:endParaRPr lang="en-US"/>
           </a:p>
@@ -3451,7 +3451,7 @@
           <a:p>
             <a:fld id="{79212C04-F6AE-AE48-B29D-E5DED656B647}" type="datetimeFigureOut">
               <a:rPr lang="en-US" smtClean="0"/>
-              <a:t>3/14/21</a:t>
+              <a:t>3/15/21</a:t>
             </a:fld>
             <a:endParaRPr lang="en-US"/>
           </a:p>
@@ -17064,7 +17064,7 @@
                   </a:schemeClr>
                 </a:solidFill>
               </a:rPr>
-              <a:t>Releases and experiments powered by AIOps</a:t>
+              <a:t>Releases and experiments powered by AI</a:t>
             </a:r>
           </a:p>
         </p:txBody>

</xml_diff>

<commit_message>
landing page + slack (#538)
</commit_message>
<xml_diff>
--- a/mkdocs/src/assets/images/iter8++images.pptx
+++ b/mkdocs/src/assets/images/iter8++images.pptx
@@ -219,7 +219,7 @@
           <a:p>
             <a:fld id="{38B78CBE-37FA-D241-BB4C-CAC5D3B25F49}" type="datetimeFigureOut">
               <a:rPr lang="en-US" smtClean="0"/>
-              <a:t>3/14/21</a:t>
+              <a:t>3/15/21</a:t>
             </a:fld>
             <a:endParaRPr lang="en-US"/>
           </a:p>
@@ -801,7 +801,7 @@
           <a:p>
             <a:fld id="{79212C04-F6AE-AE48-B29D-E5DED656B647}" type="datetimeFigureOut">
               <a:rPr lang="en-US" smtClean="0"/>
-              <a:t>3/14/21</a:t>
+              <a:t>3/15/21</a:t>
             </a:fld>
             <a:endParaRPr lang="en-US"/>
           </a:p>
@@ -999,7 +999,7 @@
           <a:p>
             <a:fld id="{79212C04-F6AE-AE48-B29D-E5DED656B647}" type="datetimeFigureOut">
               <a:rPr lang="en-US" smtClean="0"/>
-              <a:t>3/14/21</a:t>
+              <a:t>3/15/21</a:t>
             </a:fld>
             <a:endParaRPr lang="en-US"/>
           </a:p>
@@ -1207,7 +1207,7 @@
           <a:p>
             <a:fld id="{79212C04-F6AE-AE48-B29D-E5DED656B647}" type="datetimeFigureOut">
               <a:rPr lang="en-US" smtClean="0"/>
-              <a:t>3/14/21</a:t>
+              <a:t>3/15/21</a:t>
             </a:fld>
             <a:endParaRPr lang="en-US"/>
           </a:p>
@@ -1405,7 +1405,7 @@
           <a:p>
             <a:fld id="{79212C04-F6AE-AE48-B29D-E5DED656B647}" type="datetimeFigureOut">
               <a:rPr lang="en-US" smtClean="0"/>
-              <a:t>3/14/21</a:t>
+              <a:t>3/15/21</a:t>
             </a:fld>
             <a:endParaRPr lang="en-US"/>
           </a:p>
@@ -1680,7 +1680,7 @@
           <a:p>
             <a:fld id="{79212C04-F6AE-AE48-B29D-E5DED656B647}" type="datetimeFigureOut">
               <a:rPr lang="en-US" smtClean="0"/>
-              <a:t>3/14/21</a:t>
+              <a:t>3/15/21</a:t>
             </a:fld>
             <a:endParaRPr lang="en-US"/>
           </a:p>
@@ -1945,7 +1945,7 @@
           <a:p>
             <a:fld id="{79212C04-F6AE-AE48-B29D-E5DED656B647}" type="datetimeFigureOut">
               <a:rPr lang="en-US" smtClean="0"/>
-              <a:t>3/14/21</a:t>
+              <a:t>3/15/21</a:t>
             </a:fld>
             <a:endParaRPr lang="en-US"/>
           </a:p>
@@ -2357,7 +2357,7 @@
           <a:p>
             <a:fld id="{79212C04-F6AE-AE48-B29D-E5DED656B647}" type="datetimeFigureOut">
               <a:rPr lang="en-US" smtClean="0"/>
-              <a:t>3/14/21</a:t>
+              <a:t>3/15/21</a:t>
             </a:fld>
             <a:endParaRPr lang="en-US"/>
           </a:p>
@@ -2498,7 +2498,7 @@
           <a:p>
             <a:fld id="{79212C04-F6AE-AE48-B29D-E5DED656B647}" type="datetimeFigureOut">
               <a:rPr lang="en-US" smtClean="0"/>
-              <a:t>3/14/21</a:t>
+              <a:t>3/15/21</a:t>
             </a:fld>
             <a:endParaRPr lang="en-US"/>
           </a:p>
@@ -2611,7 +2611,7 @@
           <a:p>
             <a:fld id="{79212C04-F6AE-AE48-B29D-E5DED656B647}" type="datetimeFigureOut">
               <a:rPr lang="en-US" smtClean="0"/>
-              <a:t>3/14/21</a:t>
+              <a:t>3/15/21</a:t>
             </a:fld>
             <a:endParaRPr lang="en-US"/>
           </a:p>
@@ -2922,7 +2922,7 @@
           <a:p>
             <a:fld id="{79212C04-F6AE-AE48-B29D-E5DED656B647}" type="datetimeFigureOut">
               <a:rPr lang="en-US" smtClean="0"/>
-              <a:t>3/14/21</a:t>
+              <a:t>3/15/21</a:t>
             </a:fld>
             <a:endParaRPr lang="en-US"/>
           </a:p>
@@ -3210,7 +3210,7 @@
           <a:p>
             <a:fld id="{79212C04-F6AE-AE48-B29D-E5DED656B647}" type="datetimeFigureOut">
               <a:rPr lang="en-US" smtClean="0"/>
-              <a:t>3/14/21</a:t>
+              <a:t>3/15/21</a:t>
             </a:fld>
             <a:endParaRPr lang="en-US"/>
           </a:p>
@@ -3451,7 +3451,7 @@
           <a:p>
             <a:fld id="{79212C04-F6AE-AE48-B29D-E5DED656B647}" type="datetimeFigureOut">
               <a:rPr lang="en-US" smtClean="0"/>
-              <a:t>3/14/21</a:t>
+              <a:t>3/15/21</a:t>
             </a:fld>
             <a:endParaRPr lang="en-US"/>
           </a:p>
@@ -17064,7 +17064,7 @@
                   </a:schemeClr>
                 </a:solidFill>
               </a:rPr>
-              <a:t>Releases and experiments powered by AIOps</a:t>
+              <a:t>Releases and experiments powered by AI</a:t>
             </a:r>
           </a:p>
         </p:txBody>

</xml_diff>

<commit_message>
new feedback loop (#548)
</commit_message>
<xml_diff>
--- a/mkdocs/src/assets/images/iter8++images.pptx
+++ b/mkdocs/src/assets/images/iter8++images.pptx
@@ -220,7 +220,7 @@
           <a:p>
             <a:fld id="{38B78CBE-37FA-D241-BB4C-CAC5D3B25F49}" type="datetimeFigureOut">
               <a:rPr lang="en-US" smtClean="0"/>
-              <a:t>3/16/21</a:t>
+              <a:t>3/17/21</a:t>
             </a:fld>
             <a:endParaRPr lang="en-US"/>
           </a:p>
@@ -802,7 +802,7 @@
           <a:p>
             <a:fld id="{79212C04-F6AE-AE48-B29D-E5DED656B647}" type="datetimeFigureOut">
               <a:rPr lang="en-US" smtClean="0"/>
-              <a:t>3/16/21</a:t>
+              <a:t>3/17/21</a:t>
             </a:fld>
             <a:endParaRPr lang="en-US"/>
           </a:p>
@@ -1000,7 +1000,7 @@
           <a:p>
             <a:fld id="{79212C04-F6AE-AE48-B29D-E5DED656B647}" type="datetimeFigureOut">
               <a:rPr lang="en-US" smtClean="0"/>
-              <a:t>3/16/21</a:t>
+              <a:t>3/17/21</a:t>
             </a:fld>
             <a:endParaRPr lang="en-US"/>
           </a:p>
@@ -1208,7 +1208,7 @@
           <a:p>
             <a:fld id="{79212C04-F6AE-AE48-B29D-E5DED656B647}" type="datetimeFigureOut">
               <a:rPr lang="en-US" smtClean="0"/>
-              <a:t>3/16/21</a:t>
+              <a:t>3/17/21</a:t>
             </a:fld>
             <a:endParaRPr lang="en-US"/>
           </a:p>
@@ -1406,7 +1406,7 @@
           <a:p>
             <a:fld id="{79212C04-F6AE-AE48-B29D-E5DED656B647}" type="datetimeFigureOut">
               <a:rPr lang="en-US" smtClean="0"/>
-              <a:t>3/16/21</a:t>
+              <a:t>3/17/21</a:t>
             </a:fld>
             <a:endParaRPr lang="en-US"/>
           </a:p>
@@ -1681,7 +1681,7 @@
           <a:p>
             <a:fld id="{79212C04-F6AE-AE48-B29D-E5DED656B647}" type="datetimeFigureOut">
               <a:rPr lang="en-US" smtClean="0"/>
-              <a:t>3/16/21</a:t>
+              <a:t>3/17/21</a:t>
             </a:fld>
             <a:endParaRPr lang="en-US"/>
           </a:p>
@@ -1946,7 +1946,7 @@
           <a:p>
             <a:fld id="{79212C04-F6AE-AE48-B29D-E5DED656B647}" type="datetimeFigureOut">
               <a:rPr lang="en-US" smtClean="0"/>
-              <a:t>3/16/21</a:t>
+              <a:t>3/17/21</a:t>
             </a:fld>
             <a:endParaRPr lang="en-US"/>
           </a:p>
@@ -2358,7 +2358,7 @@
           <a:p>
             <a:fld id="{79212C04-F6AE-AE48-B29D-E5DED656B647}" type="datetimeFigureOut">
               <a:rPr lang="en-US" smtClean="0"/>
-              <a:t>3/16/21</a:t>
+              <a:t>3/17/21</a:t>
             </a:fld>
             <a:endParaRPr lang="en-US"/>
           </a:p>
@@ -2499,7 +2499,7 @@
           <a:p>
             <a:fld id="{79212C04-F6AE-AE48-B29D-E5DED656B647}" type="datetimeFigureOut">
               <a:rPr lang="en-US" smtClean="0"/>
-              <a:t>3/16/21</a:t>
+              <a:t>3/17/21</a:t>
             </a:fld>
             <a:endParaRPr lang="en-US"/>
           </a:p>
@@ -2612,7 +2612,7 @@
           <a:p>
             <a:fld id="{79212C04-F6AE-AE48-B29D-E5DED656B647}" type="datetimeFigureOut">
               <a:rPr lang="en-US" smtClean="0"/>
-              <a:t>3/16/21</a:t>
+              <a:t>3/17/21</a:t>
             </a:fld>
             <a:endParaRPr lang="en-US"/>
           </a:p>
@@ -2923,7 +2923,7 @@
           <a:p>
             <a:fld id="{79212C04-F6AE-AE48-B29D-E5DED656B647}" type="datetimeFigureOut">
               <a:rPr lang="en-US" smtClean="0"/>
-              <a:t>3/16/21</a:t>
+              <a:t>3/17/21</a:t>
             </a:fld>
             <a:endParaRPr lang="en-US"/>
           </a:p>
@@ -3211,7 +3211,7 @@
           <a:p>
             <a:fld id="{79212C04-F6AE-AE48-B29D-E5DED656B647}" type="datetimeFigureOut">
               <a:rPr lang="en-US" smtClean="0"/>
-              <a:t>3/16/21</a:t>
+              <a:t>3/17/21</a:t>
             </a:fld>
             <a:endParaRPr lang="en-US"/>
           </a:p>
@@ -3452,7 +3452,7 @@
           <a:p>
             <a:fld id="{79212C04-F6AE-AE48-B29D-E5DED656B647}" type="datetimeFigureOut">
               <a:rPr lang="en-US" smtClean="0"/>
-              <a:t>3/16/21</a:t>
+              <a:t>3/17/21</a:t>
             </a:fld>
             <a:endParaRPr lang="en-US"/>
           </a:p>
@@ -42173,52 +42173,6 @@
       </p:sp>
       <p:cxnSp>
         <p:nvCxnSpPr>
-          <p:cNvPr id="30" name="Straight Arrow Connector 29">
-            <a:extLst>
-              <a:ext uri="{FF2B5EF4-FFF2-40B4-BE49-F238E27FC236}">
-                <a16:creationId xmlns:a16="http://schemas.microsoft.com/office/drawing/2014/main" id="{04142743-4CDC-3B4A-B06D-29E6BD5C9AA3}"/>
-              </a:ext>
-            </a:extLst>
-          </p:cNvPr>
-          <p:cNvCxnSpPr>
-            <a:cxnSpLocks/>
-            <a:stCxn id="26" idx="0"/>
-            <a:endCxn id="27" idx="1"/>
-          </p:cNvCxnSpPr>
-          <p:nvPr/>
-        </p:nvCxnSpPr>
-        <p:spPr>
-          <a:xfrm flipV="1">
-            <a:off x="4481295" y="1674741"/>
-            <a:ext cx="1317622" cy="253487"/>
-          </a:xfrm>
-          <a:prstGeom prst="straightConnector1">
-            <a:avLst/>
-          </a:prstGeom>
-          <a:ln w="25400">
-            <a:solidFill>
-              <a:srgbClr val="7030A0"/>
-            </a:solidFill>
-            <a:tailEnd type="triangle"/>
-          </a:ln>
-        </p:spPr>
-        <p:style>
-          <a:lnRef idx="1">
-            <a:schemeClr val="accent1"/>
-          </a:lnRef>
-          <a:fillRef idx="0">
-            <a:schemeClr val="accent1"/>
-          </a:fillRef>
-          <a:effectRef idx="0">
-            <a:schemeClr val="accent1"/>
-          </a:effectRef>
-          <a:fontRef idx="minor">
-            <a:schemeClr val="tx1"/>
-          </a:fontRef>
-        </p:style>
-      </p:cxnSp>
-      <p:cxnSp>
-        <p:nvCxnSpPr>
           <p:cNvPr id="33" name="Straight Arrow Connector 32">
             <a:extLst>
               <a:ext uri="{FF2B5EF4-FFF2-40B4-BE49-F238E27FC236}">
@@ -42237,52 +42191,6 @@
           <a:xfrm>
             <a:off x="6507129" y="2033329"/>
             <a:ext cx="0" cy="517892"/>
-          </a:xfrm>
-          <a:prstGeom prst="straightConnector1">
-            <a:avLst/>
-          </a:prstGeom>
-          <a:ln w="25400">
-            <a:solidFill>
-              <a:srgbClr val="7030A0"/>
-            </a:solidFill>
-            <a:tailEnd type="triangle"/>
-          </a:ln>
-        </p:spPr>
-        <p:style>
-          <a:lnRef idx="1">
-            <a:schemeClr val="accent1"/>
-          </a:lnRef>
-          <a:fillRef idx="0">
-            <a:schemeClr val="accent1"/>
-          </a:fillRef>
-          <a:effectRef idx="0">
-            <a:schemeClr val="accent1"/>
-          </a:effectRef>
-          <a:fontRef idx="minor">
-            <a:schemeClr val="tx1"/>
-          </a:fontRef>
-        </p:style>
-      </p:cxnSp>
-      <p:cxnSp>
-        <p:nvCxnSpPr>
-          <p:cNvPr id="37" name="Straight Arrow Connector 36">
-            <a:extLst>
-              <a:ext uri="{FF2B5EF4-FFF2-40B4-BE49-F238E27FC236}">
-                <a16:creationId xmlns:a16="http://schemas.microsoft.com/office/drawing/2014/main" id="{17EE05E4-726E-E44B-8E60-384C03BA0AF4}"/>
-              </a:ext>
-            </a:extLst>
-          </p:cNvPr>
-          <p:cNvCxnSpPr>
-            <a:cxnSpLocks/>
-            <a:stCxn id="28" idx="1"/>
-            <a:endCxn id="26" idx="2"/>
-          </p:cNvCxnSpPr>
-          <p:nvPr/>
-        </p:nvCxnSpPr>
-        <p:spPr>
-          <a:xfrm flipH="1" flipV="1">
-            <a:off x="4481295" y="2645405"/>
-            <a:ext cx="1044633" cy="264405"/>
           </a:xfrm>
           <a:prstGeom prst="straightConnector1">
             <a:avLst/>
@@ -42885,6 +42793,98 @@
           <a:xfrm rot="16200000" flipH="1">
             <a:off x="5866718" y="3046050"/>
             <a:ext cx="433812" cy="1131382"/>
+          </a:xfrm>
+          <a:prstGeom prst="bentConnector2">
+            <a:avLst/>
+          </a:prstGeom>
+          <a:ln w="25400">
+            <a:solidFill>
+              <a:srgbClr val="7030A0"/>
+            </a:solidFill>
+            <a:tailEnd type="stealth" w="lg" len="lg"/>
+          </a:ln>
+        </p:spPr>
+        <p:style>
+          <a:lnRef idx="1">
+            <a:schemeClr val="accent1"/>
+          </a:lnRef>
+          <a:fillRef idx="0">
+            <a:schemeClr val="accent1"/>
+          </a:fillRef>
+          <a:effectRef idx="0">
+            <a:schemeClr val="accent1"/>
+          </a:effectRef>
+          <a:fontRef idx="minor">
+            <a:schemeClr val="tx1"/>
+          </a:fontRef>
+        </p:style>
+      </p:cxnSp>
+      <p:cxnSp>
+        <p:nvCxnSpPr>
+          <p:cNvPr id="3" name="Elbow Connector 2">
+            <a:extLst>
+              <a:ext uri="{FF2B5EF4-FFF2-40B4-BE49-F238E27FC236}">
+                <a16:creationId xmlns:a16="http://schemas.microsoft.com/office/drawing/2014/main" id="{55D910AA-1959-1F4C-A43E-13575E0D53EF}"/>
+              </a:ext>
+            </a:extLst>
+          </p:cNvPr>
+          <p:cNvCxnSpPr>
+            <a:endCxn id="27" idx="1"/>
+          </p:cNvCxnSpPr>
+          <p:nvPr/>
+        </p:nvCxnSpPr>
+        <p:spPr>
+          <a:xfrm flipV="1">
+            <a:off x="4481295" y="1674741"/>
+            <a:ext cx="1317622" cy="253487"/>
+          </a:xfrm>
+          <a:prstGeom prst="bentConnector3">
+            <a:avLst>
+              <a:gd name="adj1" fmla="val -254"/>
+            </a:avLst>
+          </a:prstGeom>
+          <a:ln w="25400">
+            <a:solidFill>
+              <a:srgbClr val="7030A0"/>
+            </a:solidFill>
+            <a:tailEnd type="stealth" w="lg" len="lg"/>
+          </a:ln>
+        </p:spPr>
+        <p:style>
+          <a:lnRef idx="1">
+            <a:schemeClr val="accent1"/>
+          </a:lnRef>
+          <a:fillRef idx="0">
+            <a:schemeClr val="accent1"/>
+          </a:fillRef>
+          <a:effectRef idx="0">
+            <a:schemeClr val="accent1"/>
+          </a:effectRef>
+          <a:fontRef idx="minor">
+            <a:schemeClr val="tx1"/>
+          </a:fontRef>
+        </p:style>
+      </p:cxnSp>
+      <p:cxnSp>
+        <p:nvCxnSpPr>
+          <p:cNvPr id="29" name="Elbow Connector 28">
+            <a:extLst>
+              <a:ext uri="{FF2B5EF4-FFF2-40B4-BE49-F238E27FC236}">
+                <a16:creationId xmlns:a16="http://schemas.microsoft.com/office/drawing/2014/main" id="{01744BBB-CC9C-5A46-926E-ED149D548DDE}"/>
+              </a:ext>
+            </a:extLst>
+          </p:cNvPr>
+          <p:cNvCxnSpPr>
+            <a:cxnSpLocks/>
+            <a:stCxn id="28" idx="1"/>
+            <a:endCxn id="26" idx="2"/>
+          </p:cNvCxnSpPr>
+          <p:nvPr/>
+        </p:nvCxnSpPr>
+        <p:spPr>
+          <a:xfrm rot="10800000">
+            <a:off x="4481296" y="2645406"/>
+            <a:ext cx="1044633" cy="264405"/>
           </a:xfrm>
           <a:prstGeom prst="bentConnector2">
             <a:avLst/>

</xml_diff>